<commit_message>
Deleted slide 13 since it was a repeat of slide 6
</commit_message>
<xml_diff>
--- a/week6/week6.pptx
+++ b/week6/week6.pptx
@@ -17,15 +17,14 @@
     <p:sldId id="280" r:id="rId11"/>
     <p:sldId id="281" r:id="rId12"/>
     <p:sldId id="282" r:id="rId13"/>
-    <p:sldId id="283" r:id="rId14"/>
-    <p:sldId id="286" r:id="rId15"/>
-    <p:sldId id="284" r:id="rId16"/>
-    <p:sldId id="285" r:id="rId17"/>
-    <p:sldId id="287" r:id="rId18"/>
-    <p:sldId id="288" r:id="rId19"/>
-    <p:sldId id="289" r:id="rId20"/>
-    <p:sldId id="290" r:id="rId21"/>
-    <p:sldId id="291" r:id="rId22"/>
+    <p:sldId id="286" r:id="rId14"/>
+    <p:sldId id="284" r:id="rId15"/>
+    <p:sldId id="285" r:id="rId16"/>
+    <p:sldId id="287" r:id="rId17"/>
+    <p:sldId id="288" r:id="rId18"/>
+    <p:sldId id="289" r:id="rId19"/>
+    <p:sldId id="290" r:id="rId20"/>
+    <p:sldId id="291" r:id="rId21"/>
   </p:sldIdLst>
   <p:sldSz cx="12192000" cy="6858000"/>
   <p:notesSz cx="6858000" cy="9144000"/>
@@ -145,7 +144,6 @@
             <p14:sldId id="280"/>
             <p14:sldId id="281"/>
             <p14:sldId id="282"/>
-            <p14:sldId id="283"/>
             <p14:sldId id="286"/>
           </p14:sldIdLst>
         </p14:section>
@@ -7564,785 +7562,6 @@
           <a:p>
             <a:r>
               <a:rPr lang="en-GB" dirty="0"/>
-              <a:t>Modules that are now installed !</a:t>
-            </a:r>
-          </a:p>
-        </p:txBody>
-      </p:sp>
-      <p:sp>
-        <p:nvSpPr>
-          <p:cNvPr id="3" name="Content Placeholder 2"/>
-          <p:cNvSpPr>
-            <a:spLocks noGrp="1"/>
-          </p:cNvSpPr>
-          <p:nvPr>
-            <p:ph idx="1"/>
-          </p:nvPr>
-        </p:nvSpPr>
-        <p:spPr>
-          <a:xfrm>
-            <a:off x="1103312" y="1377417"/>
-            <a:ext cx="3930007" cy="3491146"/>
-          </a:xfrm>
-        </p:spPr>
-        <p:txBody>
-          <a:bodyPr>
-            <a:normAutofit/>
-          </a:bodyPr>
-          <a:lstStyle/>
-          <a:p>
-            <a:r>
-              <a:rPr lang="en-GB" dirty="0"/>
-              <a:t>You can always import standard library modules. They come with Python.</a:t>
-            </a:r>
-          </a:p>
-          <a:p>
-            <a:r>
-              <a:rPr lang="en-GB" dirty="0"/>
-              <a:t>If you try and import a </a:t>
-            </a:r>
-            <a:r>
-              <a:rPr lang="en-GB" dirty="0" err="1"/>
-              <a:t>PyPi</a:t>
-            </a:r>
-            <a:r>
-              <a:rPr lang="en-GB" dirty="0"/>
-              <a:t> module without installing it, your program will fail.</a:t>
-            </a:r>
-          </a:p>
-          <a:p>
-            <a:endParaRPr lang="en-GB" dirty="0"/>
-          </a:p>
-          <a:p>
-            <a:r>
-              <a:rPr lang="en-GB" dirty="0"/>
-              <a:t>You haven't installed the pillow module.</a:t>
-            </a:r>
-          </a:p>
-        </p:txBody>
-      </p:sp>
-      <p:sp>
-        <p:nvSpPr>
-          <p:cNvPr id="4" name="Content Placeholder 2"/>
-          <p:cNvSpPr txBox="1">
-            <a:spLocks/>
-          </p:cNvSpPr>
-          <p:nvPr/>
-        </p:nvSpPr>
-        <p:spPr>
-          <a:xfrm>
-            <a:off x="1103312" y="5068199"/>
-            <a:ext cx="5251622" cy="1450125"/>
-          </a:xfrm>
-          <a:prstGeom prst="rect">
-            <a:avLst/>
-          </a:prstGeom>
-        </p:spPr>
-        <p:txBody>
-          <a:bodyPr vert="horz" lIns="91440" tIns="45720" rIns="91440" bIns="45720" rtlCol="0">
-            <a:normAutofit/>
-          </a:bodyPr>
-          <a:lstStyle>
-            <a:lvl1pPr marL="342900" indent="-342900" algn="l" defTabSz="457200" rtl="0" eaLnBrk="1" latinLnBrk="0" hangingPunct="1">
-              <a:spcBef>
-                <a:spcPts val="1000"/>
-              </a:spcBef>
-              <a:spcAft>
-                <a:spcPts val="0"/>
-              </a:spcAft>
-              <a:buClr>
-                <a:schemeClr val="bg2">
-                  <a:lumMod val="40000"/>
-                  <a:lumOff val="60000"/>
-                </a:schemeClr>
-              </a:buClr>
-              <a:buSzPct val="80000"/>
-              <a:buFont typeface="Wingdings 3" charset="2"/>
-              <a:buChar char=""/>
-              <a:defRPr sz="2000" b="0" i="0" kern="1200">
-                <a:solidFill>
-                  <a:schemeClr val="tx1"/>
-                </a:solidFill>
-                <a:latin typeface="+mj-lt"/>
-                <a:ea typeface="+mj-ea"/>
-                <a:cs typeface="+mj-cs"/>
-              </a:defRPr>
-            </a:lvl1pPr>
-            <a:lvl2pPr marL="742950" indent="-285750" algn="l" defTabSz="457200" rtl="0" eaLnBrk="1" latinLnBrk="0" hangingPunct="1">
-              <a:spcBef>
-                <a:spcPts val="1000"/>
-              </a:spcBef>
-              <a:spcAft>
-                <a:spcPts val="0"/>
-              </a:spcAft>
-              <a:buClr>
-                <a:schemeClr val="bg2">
-                  <a:lumMod val="40000"/>
-                  <a:lumOff val="60000"/>
-                </a:schemeClr>
-              </a:buClr>
-              <a:buSzPct val="80000"/>
-              <a:buFont typeface="Wingdings 3" charset="2"/>
-              <a:buChar char=""/>
-              <a:defRPr sz="1800" b="0" i="0" kern="1200">
-                <a:solidFill>
-                  <a:schemeClr val="tx1"/>
-                </a:solidFill>
-                <a:latin typeface="+mj-lt"/>
-                <a:ea typeface="+mj-ea"/>
-                <a:cs typeface="+mj-cs"/>
-              </a:defRPr>
-            </a:lvl2pPr>
-            <a:lvl3pPr marL="1143000" indent="-228600" algn="l" defTabSz="457200" rtl="0" eaLnBrk="1" latinLnBrk="0" hangingPunct="1">
-              <a:spcBef>
-                <a:spcPts val="1000"/>
-              </a:spcBef>
-              <a:spcAft>
-                <a:spcPts val="0"/>
-              </a:spcAft>
-              <a:buClr>
-                <a:schemeClr val="bg2">
-                  <a:lumMod val="40000"/>
-                  <a:lumOff val="60000"/>
-                </a:schemeClr>
-              </a:buClr>
-              <a:buSzPct val="80000"/>
-              <a:buFont typeface="Wingdings 3" charset="2"/>
-              <a:buChar char=""/>
-              <a:defRPr sz="1600" b="0" i="0" kern="1200">
-                <a:solidFill>
-                  <a:schemeClr val="tx1"/>
-                </a:solidFill>
-                <a:latin typeface="+mj-lt"/>
-                <a:ea typeface="+mj-ea"/>
-                <a:cs typeface="+mj-cs"/>
-              </a:defRPr>
-            </a:lvl3pPr>
-            <a:lvl4pPr marL="1600200" indent="-228600" algn="l" defTabSz="457200" rtl="0" eaLnBrk="1" latinLnBrk="0" hangingPunct="1">
-              <a:spcBef>
-                <a:spcPts val="1000"/>
-              </a:spcBef>
-              <a:spcAft>
-                <a:spcPts val="0"/>
-              </a:spcAft>
-              <a:buClr>
-                <a:schemeClr val="bg2">
-                  <a:lumMod val="40000"/>
-                  <a:lumOff val="60000"/>
-                </a:schemeClr>
-              </a:buClr>
-              <a:buSzPct val="80000"/>
-              <a:buFont typeface="Wingdings 3" charset="2"/>
-              <a:buChar char=""/>
-              <a:defRPr sz="1400" b="0" i="0" kern="1200">
-                <a:solidFill>
-                  <a:schemeClr val="tx1"/>
-                </a:solidFill>
-                <a:latin typeface="+mj-lt"/>
-                <a:ea typeface="+mj-ea"/>
-                <a:cs typeface="+mj-cs"/>
-              </a:defRPr>
-            </a:lvl4pPr>
-            <a:lvl5pPr marL="2057400" indent="-228600" algn="l" defTabSz="457200" rtl="0" eaLnBrk="1" latinLnBrk="0" hangingPunct="1">
-              <a:spcBef>
-                <a:spcPts val="1000"/>
-              </a:spcBef>
-              <a:spcAft>
-                <a:spcPts val="0"/>
-              </a:spcAft>
-              <a:buClr>
-                <a:schemeClr val="bg2">
-                  <a:lumMod val="40000"/>
-                  <a:lumOff val="60000"/>
-                </a:schemeClr>
-              </a:buClr>
-              <a:buSzPct val="80000"/>
-              <a:buFont typeface="Wingdings 3" charset="2"/>
-              <a:buChar char=""/>
-              <a:defRPr sz="1400" b="0" i="0" kern="1200">
-                <a:solidFill>
-                  <a:schemeClr val="tx1"/>
-                </a:solidFill>
-                <a:latin typeface="+mj-lt"/>
-                <a:ea typeface="+mj-ea"/>
-                <a:cs typeface="+mj-cs"/>
-              </a:defRPr>
-            </a:lvl5pPr>
-            <a:lvl6pPr marL="2506000" indent="-228600" algn="l" defTabSz="457200" rtl="0" eaLnBrk="1" latinLnBrk="0" hangingPunct="1">
-              <a:spcBef>
-                <a:spcPts val="1000"/>
-              </a:spcBef>
-              <a:spcAft>
-                <a:spcPts val="0"/>
-              </a:spcAft>
-              <a:buClr>
-                <a:schemeClr val="bg2">
-                  <a:lumMod val="40000"/>
-                  <a:lumOff val="60000"/>
-                </a:schemeClr>
-              </a:buClr>
-              <a:buSzPct val="80000"/>
-              <a:buFont typeface="Wingdings 3" charset="2"/>
-              <a:buChar char=""/>
-              <a:defRPr sz="1400" b="0" i="0" kern="1200">
-                <a:solidFill>
-                  <a:schemeClr val="tx1"/>
-                </a:solidFill>
-                <a:latin typeface="+mj-lt"/>
-                <a:ea typeface="+mj-ea"/>
-                <a:cs typeface="+mj-cs"/>
-              </a:defRPr>
-            </a:lvl6pPr>
-            <a:lvl7pPr marL="2971800" indent="-228600" algn="l" defTabSz="457200" rtl="0" eaLnBrk="1" latinLnBrk="0" hangingPunct="1">
-              <a:spcBef>
-                <a:spcPts val="1000"/>
-              </a:spcBef>
-              <a:spcAft>
-                <a:spcPts val="0"/>
-              </a:spcAft>
-              <a:buClr>
-                <a:schemeClr val="bg2">
-                  <a:lumMod val="40000"/>
-                  <a:lumOff val="60000"/>
-                </a:schemeClr>
-              </a:buClr>
-              <a:buSzPct val="80000"/>
-              <a:buFont typeface="Wingdings 3" charset="2"/>
-              <a:buChar char=""/>
-              <a:defRPr sz="1400" b="0" i="0" kern="1200">
-                <a:solidFill>
-                  <a:schemeClr val="tx1"/>
-                </a:solidFill>
-                <a:latin typeface="+mj-lt"/>
-                <a:ea typeface="+mj-ea"/>
-                <a:cs typeface="+mj-cs"/>
-              </a:defRPr>
-            </a:lvl7pPr>
-            <a:lvl8pPr marL="3429000" indent="-228600" algn="l" defTabSz="457200" rtl="0" eaLnBrk="1" latinLnBrk="0" hangingPunct="1">
-              <a:spcBef>
-                <a:spcPts val="1000"/>
-              </a:spcBef>
-              <a:spcAft>
-                <a:spcPts val="0"/>
-              </a:spcAft>
-              <a:buClr>
-                <a:schemeClr val="bg2">
-                  <a:lumMod val="40000"/>
-                  <a:lumOff val="60000"/>
-                </a:schemeClr>
-              </a:buClr>
-              <a:buSzPct val="80000"/>
-              <a:buFont typeface="Wingdings 3" charset="2"/>
-              <a:buChar char=""/>
-              <a:defRPr sz="1400" b="0" i="0" kern="1200">
-                <a:solidFill>
-                  <a:schemeClr val="tx1"/>
-                </a:solidFill>
-                <a:latin typeface="+mj-lt"/>
-                <a:ea typeface="+mj-ea"/>
-                <a:cs typeface="+mj-cs"/>
-              </a:defRPr>
-            </a:lvl8pPr>
-            <a:lvl9pPr marL="3886200" indent="-228600" algn="l" defTabSz="457200" rtl="0" eaLnBrk="1" latinLnBrk="0" hangingPunct="1">
-              <a:spcBef>
-                <a:spcPts val="1000"/>
-              </a:spcBef>
-              <a:spcAft>
-                <a:spcPts val="0"/>
-              </a:spcAft>
-              <a:buClr>
-                <a:schemeClr val="bg2">
-                  <a:lumMod val="40000"/>
-                  <a:lumOff val="60000"/>
-                </a:schemeClr>
-              </a:buClr>
-              <a:buSzPct val="80000"/>
-              <a:buFont typeface="Wingdings 3" charset="2"/>
-              <a:buChar char=""/>
-              <a:defRPr sz="1400" b="0" i="0" kern="1200">
-                <a:solidFill>
-                  <a:schemeClr val="tx1"/>
-                </a:solidFill>
-                <a:latin typeface="+mj-lt"/>
-                <a:ea typeface="+mj-ea"/>
-                <a:cs typeface="+mj-cs"/>
-              </a:defRPr>
-            </a:lvl9pPr>
-          </a:lstStyle>
-          <a:p>
-            <a:r>
-              <a:rPr lang="en-GB" dirty="0">
-                <a:solidFill>
-                  <a:srgbClr val="FFFF00"/>
-                </a:solidFill>
-              </a:rPr>
-              <a:t>Task: Type this program in and run it.</a:t>
-            </a:r>
-          </a:p>
-          <a:p>
-            <a:r>
-              <a:rPr lang="en-GB" dirty="0">
-                <a:solidFill>
-                  <a:srgbClr val="FFFF00"/>
-                </a:solidFill>
-              </a:rPr>
-              <a:t>What do you think will happen ?</a:t>
-            </a:r>
-          </a:p>
-          <a:p>
-            <a:r>
-              <a:rPr lang="en-GB" dirty="0">
-                <a:solidFill>
-                  <a:srgbClr val="FFFF00"/>
-                </a:solidFill>
-              </a:rPr>
-              <a:t>Is that what happened ?</a:t>
-            </a:r>
-          </a:p>
-        </p:txBody>
-      </p:sp>
-      <p:sp>
-        <p:nvSpPr>
-          <p:cNvPr id="5" name="Content Placeholder 2"/>
-          <p:cNvSpPr txBox="1">
-            <a:spLocks/>
-          </p:cNvSpPr>
-          <p:nvPr/>
-        </p:nvSpPr>
-        <p:spPr>
-          <a:xfrm>
-            <a:off x="6120827" y="1377416"/>
-            <a:ext cx="5535714" cy="5140907"/>
-          </a:xfrm>
-          <a:prstGeom prst="rect">
-            <a:avLst/>
-          </a:prstGeom>
-        </p:spPr>
-        <p:txBody>
-          <a:bodyPr vert="horz" lIns="91440" tIns="45720" rIns="91440" bIns="45720" rtlCol="0">
-            <a:normAutofit/>
-          </a:bodyPr>
-          <a:lstStyle>
-            <a:lvl1pPr marL="342900" indent="-342900" algn="l" defTabSz="457200" rtl="0" eaLnBrk="1" latinLnBrk="0" hangingPunct="1">
-              <a:spcBef>
-                <a:spcPts val="1000"/>
-              </a:spcBef>
-              <a:spcAft>
-                <a:spcPts val="0"/>
-              </a:spcAft>
-              <a:buClr>
-                <a:schemeClr val="bg2">
-                  <a:lumMod val="40000"/>
-                  <a:lumOff val="60000"/>
-                </a:schemeClr>
-              </a:buClr>
-              <a:buSzPct val="80000"/>
-              <a:buFont typeface="Wingdings 3" charset="2"/>
-              <a:buChar char=""/>
-              <a:defRPr sz="2000" b="0" i="0" kern="1200">
-                <a:solidFill>
-                  <a:schemeClr val="tx1"/>
-                </a:solidFill>
-                <a:latin typeface="+mj-lt"/>
-                <a:ea typeface="+mj-ea"/>
-                <a:cs typeface="+mj-cs"/>
-              </a:defRPr>
-            </a:lvl1pPr>
-            <a:lvl2pPr marL="742950" indent="-285750" algn="l" defTabSz="457200" rtl="0" eaLnBrk="1" latinLnBrk="0" hangingPunct="1">
-              <a:spcBef>
-                <a:spcPts val="1000"/>
-              </a:spcBef>
-              <a:spcAft>
-                <a:spcPts val="0"/>
-              </a:spcAft>
-              <a:buClr>
-                <a:schemeClr val="bg2">
-                  <a:lumMod val="40000"/>
-                  <a:lumOff val="60000"/>
-                </a:schemeClr>
-              </a:buClr>
-              <a:buSzPct val="80000"/>
-              <a:buFont typeface="Wingdings 3" charset="2"/>
-              <a:buChar char=""/>
-              <a:defRPr sz="1800" b="0" i="0" kern="1200">
-                <a:solidFill>
-                  <a:schemeClr val="tx1"/>
-                </a:solidFill>
-                <a:latin typeface="+mj-lt"/>
-                <a:ea typeface="+mj-ea"/>
-                <a:cs typeface="+mj-cs"/>
-              </a:defRPr>
-            </a:lvl2pPr>
-            <a:lvl3pPr marL="1143000" indent="-228600" algn="l" defTabSz="457200" rtl="0" eaLnBrk="1" latinLnBrk="0" hangingPunct="1">
-              <a:spcBef>
-                <a:spcPts val="1000"/>
-              </a:spcBef>
-              <a:spcAft>
-                <a:spcPts val="0"/>
-              </a:spcAft>
-              <a:buClr>
-                <a:schemeClr val="bg2">
-                  <a:lumMod val="40000"/>
-                  <a:lumOff val="60000"/>
-                </a:schemeClr>
-              </a:buClr>
-              <a:buSzPct val="80000"/>
-              <a:buFont typeface="Wingdings 3" charset="2"/>
-              <a:buChar char=""/>
-              <a:defRPr sz="1600" b="0" i="0" kern="1200">
-                <a:solidFill>
-                  <a:schemeClr val="tx1"/>
-                </a:solidFill>
-                <a:latin typeface="+mj-lt"/>
-                <a:ea typeface="+mj-ea"/>
-                <a:cs typeface="+mj-cs"/>
-              </a:defRPr>
-            </a:lvl3pPr>
-            <a:lvl4pPr marL="1600200" indent="-228600" algn="l" defTabSz="457200" rtl="0" eaLnBrk="1" latinLnBrk="0" hangingPunct="1">
-              <a:spcBef>
-                <a:spcPts val="1000"/>
-              </a:spcBef>
-              <a:spcAft>
-                <a:spcPts val="0"/>
-              </a:spcAft>
-              <a:buClr>
-                <a:schemeClr val="bg2">
-                  <a:lumMod val="40000"/>
-                  <a:lumOff val="60000"/>
-                </a:schemeClr>
-              </a:buClr>
-              <a:buSzPct val="80000"/>
-              <a:buFont typeface="Wingdings 3" charset="2"/>
-              <a:buChar char=""/>
-              <a:defRPr sz="1400" b="0" i="0" kern="1200">
-                <a:solidFill>
-                  <a:schemeClr val="tx1"/>
-                </a:solidFill>
-                <a:latin typeface="+mj-lt"/>
-                <a:ea typeface="+mj-ea"/>
-                <a:cs typeface="+mj-cs"/>
-              </a:defRPr>
-            </a:lvl4pPr>
-            <a:lvl5pPr marL="2057400" indent="-228600" algn="l" defTabSz="457200" rtl="0" eaLnBrk="1" latinLnBrk="0" hangingPunct="1">
-              <a:spcBef>
-                <a:spcPts val="1000"/>
-              </a:spcBef>
-              <a:spcAft>
-                <a:spcPts val="0"/>
-              </a:spcAft>
-              <a:buClr>
-                <a:schemeClr val="bg2">
-                  <a:lumMod val="40000"/>
-                  <a:lumOff val="60000"/>
-                </a:schemeClr>
-              </a:buClr>
-              <a:buSzPct val="80000"/>
-              <a:buFont typeface="Wingdings 3" charset="2"/>
-              <a:buChar char=""/>
-              <a:defRPr sz="1400" b="0" i="0" kern="1200">
-                <a:solidFill>
-                  <a:schemeClr val="tx1"/>
-                </a:solidFill>
-                <a:latin typeface="+mj-lt"/>
-                <a:ea typeface="+mj-ea"/>
-                <a:cs typeface="+mj-cs"/>
-              </a:defRPr>
-            </a:lvl5pPr>
-            <a:lvl6pPr marL="2506000" indent="-228600" algn="l" defTabSz="457200" rtl="0" eaLnBrk="1" latinLnBrk="0" hangingPunct="1">
-              <a:spcBef>
-                <a:spcPts val="1000"/>
-              </a:spcBef>
-              <a:spcAft>
-                <a:spcPts val="0"/>
-              </a:spcAft>
-              <a:buClr>
-                <a:schemeClr val="bg2">
-                  <a:lumMod val="40000"/>
-                  <a:lumOff val="60000"/>
-                </a:schemeClr>
-              </a:buClr>
-              <a:buSzPct val="80000"/>
-              <a:buFont typeface="Wingdings 3" charset="2"/>
-              <a:buChar char=""/>
-              <a:defRPr sz="1400" b="0" i="0" kern="1200">
-                <a:solidFill>
-                  <a:schemeClr val="tx1"/>
-                </a:solidFill>
-                <a:latin typeface="+mj-lt"/>
-                <a:ea typeface="+mj-ea"/>
-                <a:cs typeface="+mj-cs"/>
-              </a:defRPr>
-            </a:lvl6pPr>
-            <a:lvl7pPr marL="2971800" indent="-228600" algn="l" defTabSz="457200" rtl="0" eaLnBrk="1" latinLnBrk="0" hangingPunct="1">
-              <a:spcBef>
-                <a:spcPts val="1000"/>
-              </a:spcBef>
-              <a:spcAft>
-                <a:spcPts val="0"/>
-              </a:spcAft>
-              <a:buClr>
-                <a:schemeClr val="bg2">
-                  <a:lumMod val="40000"/>
-                  <a:lumOff val="60000"/>
-                </a:schemeClr>
-              </a:buClr>
-              <a:buSzPct val="80000"/>
-              <a:buFont typeface="Wingdings 3" charset="2"/>
-              <a:buChar char=""/>
-              <a:defRPr sz="1400" b="0" i="0" kern="1200">
-                <a:solidFill>
-                  <a:schemeClr val="tx1"/>
-                </a:solidFill>
-                <a:latin typeface="+mj-lt"/>
-                <a:ea typeface="+mj-ea"/>
-                <a:cs typeface="+mj-cs"/>
-              </a:defRPr>
-            </a:lvl7pPr>
-            <a:lvl8pPr marL="3429000" indent="-228600" algn="l" defTabSz="457200" rtl="0" eaLnBrk="1" latinLnBrk="0" hangingPunct="1">
-              <a:spcBef>
-                <a:spcPts val="1000"/>
-              </a:spcBef>
-              <a:spcAft>
-                <a:spcPts val="0"/>
-              </a:spcAft>
-              <a:buClr>
-                <a:schemeClr val="bg2">
-                  <a:lumMod val="40000"/>
-                  <a:lumOff val="60000"/>
-                </a:schemeClr>
-              </a:buClr>
-              <a:buSzPct val="80000"/>
-              <a:buFont typeface="Wingdings 3" charset="2"/>
-              <a:buChar char=""/>
-              <a:defRPr sz="1400" b="0" i="0" kern="1200">
-                <a:solidFill>
-                  <a:schemeClr val="tx1"/>
-                </a:solidFill>
-                <a:latin typeface="+mj-lt"/>
-                <a:ea typeface="+mj-ea"/>
-                <a:cs typeface="+mj-cs"/>
-              </a:defRPr>
-            </a:lvl8pPr>
-            <a:lvl9pPr marL="3886200" indent="-228600" algn="l" defTabSz="457200" rtl="0" eaLnBrk="1" latinLnBrk="0" hangingPunct="1">
-              <a:spcBef>
-                <a:spcPts val="1000"/>
-              </a:spcBef>
-              <a:spcAft>
-                <a:spcPts val="0"/>
-              </a:spcAft>
-              <a:buClr>
-                <a:schemeClr val="bg2">
-                  <a:lumMod val="40000"/>
-                  <a:lumOff val="60000"/>
-                </a:schemeClr>
-              </a:buClr>
-              <a:buSzPct val="80000"/>
-              <a:buFont typeface="Wingdings 3" charset="2"/>
-              <a:buChar char=""/>
-              <a:defRPr sz="1400" b="0" i="0" kern="1200">
-                <a:solidFill>
-                  <a:schemeClr val="tx1"/>
-                </a:solidFill>
-                <a:latin typeface="+mj-lt"/>
-                <a:ea typeface="+mj-ea"/>
-                <a:cs typeface="+mj-cs"/>
-              </a:defRPr>
-            </a:lvl9pPr>
-          </a:lstStyle>
-          <a:p>
-            <a:pPr marL="0" indent="0">
-              <a:buNone/>
-            </a:pPr>
-            <a:r>
-              <a:rPr lang="en-GB" sz="1200" dirty="0">
-                <a:latin typeface="Courier New" panose="02070309020205020404" pitchFamily="49" charset="0"/>
-                <a:cs typeface="Courier New" panose="02070309020205020404" pitchFamily="49" charset="0"/>
-              </a:rPr>
-              <a:t># Week6, Program2</a:t>
-            </a:r>
-          </a:p>
-          <a:p>
-            <a:pPr marL="0" indent="0">
-              <a:buNone/>
-            </a:pPr>
-            <a:endParaRPr lang="en-GB" sz="1200" dirty="0">
-              <a:latin typeface="Courier New" panose="02070309020205020404" pitchFamily="49" charset="0"/>
-              <a:cs typeface="Courier New" panose="02070309020205020404" pitchFamily="49" charset="0"/>
-            </a:endParaRPr>
-          </a:p>
-          <a:p>
-            <a:pPr marL="0" indent="0">
-              <a:buNone/>
-            </a:pPr>
-            <a:r>
-              <a:rPr lang="en-GB" sz="1200" dirty="0">
-                <a:latin typeface="Courier New" panose="02070309020205020404" pitchFamily="49" charset="0"/>
-                <a:cs typeface="Courier New" panose="02070309020205020404" pitchFamily="49" charset="0"/>
-              </a:rPr>
-              <a:t>print("No modules are imported")</a:t>
-            </a:r>
-          </a:p>
-          <a:p>
-            <a:pPr marL="0" indent="0">
-              <a:buNone/>
-            </a:pPr>
-            <a:endParaRPr lang="en-GB" sz="1200" dirty="0">
-              <a:latin typeface="Courier New" panose="02070309020205020404" pitchFamily="49" charset="0"/>
-              <a:cs typeface="Courier New" panose="02070309020205020404" pitchFamily="49" charset="0"/>
-            </a:endParaRPr>
-          </a:p>
-          <a:p>
-            <a:pPr marL="0" indent="0">
-              <a:buNone/>
-            </a:pPr>
-            <a:r>
-              <a:rPr lang="en-GB" sz="1200" dirty="0">
-                <a:latin typeface="Courier New" panose="02070309020205020404" pitchFamily="49" charset="0"/>
-                <a:cs typeface="Courier New" panose="02070309020205020404" pitchFamily="49" charset="0"/>
-              </a:rPr>
-              <a:t>import random</a:t>
-            </a:r>
-          </a:p>
-          <a:p>
-            <a:pPr marL="0" indent="0">
-              <a:buNone/>
-            </a:pPr>
-            <a:r>
-              <a:rPr lang="en-GB" sz="1200" dirty="0">
-                <a:latin typeface="Courier New" panose="02070309020205020404" pitchFamily="49" charset="0"/>
-                <a:cs typeface="Courier New" panose="02070309020205020404" pitchFamily="49" charset="0"/>
-              </a:rPr>
-              <a:t>print("I've imported the random module")</a:t>
-            </a:r>
-          </a:p>
-          <a:p>
-            <a:pPr marL="0" indent="0">
-              <a:buNone/>
-            </a:pPr>
-            <a:r>
-              <a:rPr lang="en-GB" sz="1200" dirty="0">
-                <a:latin typeface="Courier New" panose="02070309020205020404" pitchFamily="49" charset="0"/>
-                <a:cs typeface="Courier New" panose="02070309020205020404" pitchFamily="49" charset="0"/>
-              </a:rPr>
-              <a:t>print(</a:t>
-            </a:r>
-            <a:r>
-              <a:rPr lang="en-GB" sz="1200" dirty="0" err="1">
-                <a:latin typeface="Courier New" panose="02070309020205020404" pitchFamily="49" charset="0"/>
-                <a:cs typeface="Courier New" panose="02070309020205020404" pitchFamily="49" charset="0"/>
-              </a:rPr>
-              <a:t>f"And</a:t>
-            </a:r>
-            <a:r>
-              <a:rPr lang="en-GB" sz="1200" dirty="0">
-                <a:latin typeface="Courier New" panose="02070309020205020404" pitchFamily="49" charset="0"/>
-                <a:cs typeface="Courier New" panose="02070309020205020404" pitchFamily="49" charset="0"/>
-              </a:rPr>
-              <a:t> rolled a die and got a {</a:t>
-            </a:r>
-            <a:r>
-              <a:rPr lang="en-GB" sz="1200" dirty="0" err="1">
-                <a:latin typeface="Courier New" panose="02070309020205020404" pitchFamily="49" charset="0"/>
-                <a:cs typeface="Courier New" panose="02070309020205020404" pitchFamily="49" charset="0"/>
-              </a:rPr>
-              <a:t>random.randint</a:t>
-            </a:r>
-            <a:r>
-              <a:rPr lang="en-GB" sz="1200" dirty="0">
-                <a:latin typeface="Courier New" panose="02070309020205020404" pitchFamily="49" charset="0"/>
-                <a:cs typeface="Courier New" panose="02070309020205020404" pitchFamily="49" charset="0"/>
-              </a:rPr>
-              <a:t>(1,6)}")</a:t>
-            </a:r>
-          </a:p>
-          <a:p>
-            <a:pPr marL="0" indent="0">
-              <a:buNone/>
-            </a:pPr>
-            <a:endParaRPr lang="en-GB" sz="1200" dirty="0">
-              <a:latin typeface="Courier New" panose="02070309020205020404" pitchFamily="49" charset="0"/>
-              <a:cs typeface="Courier New" panose="02070309020205020404" pitchFamily="49" charset="0"/>
-            </a:endParaRPr>
-          </a:p>
-          <a:p>
-            <a:pPr marL="0" indent="0">
-              <a:buNone/>
-            </a:pPr>
-            <a:r>
-              <a:rPr lang="en-GB" sz="1200" dirty="0">
-                <a:latin typeface="Courier New" panose="02070309020205020404" pitchFamily="49" charset="0"/>
-                <a:cs typeface="Courier New" panose="02070309020205020404" pitchFamily="49" charset="0"/>
-              </a:rPr>
-              <a:t>import PIL</a:t>
-            </a:r>
-          </a:p>
-          <a:p>
-            <a:pPr marL="0" indent="0">
-              <a:buNone/>
-            </a:pPr>
-            <a:r>
-              <a:rPr lang="en-GB" sz="1200" dirty="0">
-                <a:latin typeface="Courier New" panose="02070309020205020404" pitchFamily="49" charset="0"/>
-                <a:cs typeface="Courier New" panose="02070309020205020404" pitchFamily="49" charset="0"/>
-              </a:rPr>
-              <a:t>print("I've imported the PIL (Pillow) module")</a:t>
-            </a:r>
-          </a:p>
-          <a:p>
-            <a:pPr marL="0" indent="0">
-              <a:buNone/>
-            </a:pPr>
-            <a:endParaRPr lang="en-GB" dirty="0"/>
-          </a:p>
-        </p:txBody>
-      </p:sp>
-    </p:spTree>
-    <p:extLst>
-      <p:ext uri="{BB962C8B-B14F-4D97-AF65-F5344CB8AC3E}">
-        <p14:creationId xmlns:p14="http://schemas.microsoft.com/office/powerpoint/2010/main" val="3705080962"/>
-      </p:ext>
-    </p:extLst>
-  </p:cSld>
-  <p:clrMapOvr>
-    <a:masterClrMapping/>
-  </p:clrMapOvr>
-</p:sld>
-</file>
-
-<file path=ppt/slides/slide14.xml><?xml version="1.0" encoding="utf-8"?>
-<p:sld xmlns:a="http://schemas.openxmlformats.org/drawingml/2006/main" xmlns:r="http://schemas.openxmlformats.org/officeDocument/2006/relationships" xmlns:p="http://schemas.openxmlformats.org/presentationml/2006/main">
-  <p:cSld>
-    <p:spTree>
-      <p:nvGrpSpPr>
-        <p:cNvPr id="1" name=""/>
-        <p:cNvGrpSpPr/>
-        <p:nvPr/>
-      </p:nvGrpSpPr>
-      <p:grpSpPr>
-        <a:xfrm>
-          <a:off x="0" y="0"/>
-          <a:ext cx="0" cy="0"/>
-          <a:chOff x="0" y="0"/>
-          <a:chExt cx="0" cy="0"/>
-        </a:xfrm>
-      </p:grpSpPr>
-      <p:sp>
-        <p:nvSpPr>
-          <p:cNvPr id="2" name="Title 1"/>
-          <p:cNvSpPr>
-            <a:spLocks noGrp="1"/>
-          </p:cNvSpPr>
-          <p:nvPr>
-            <p:ph type="title"/>
-          </p:nvPr>
-        </p:nvSpPr>
-        <p:spPr/>
-        <p:txBody>
-          <a:bodyPr/>
-          <a:lstStyle/>
-          <a:p>
-            <a:r>
-              <a:rPr lang="en-GB" dirty="0"/>
               <a:t>Importing Part of a Module</a:t>
             </a:r>
           </a:p>
@@ -8463,7 +7682,7 @@
 </p:sld>
 </file>
 
-<file path=ppt/slides/slide15.xml><?xml version="1.0" encoding="utf-8"?>
+<file path=ppt/slides/slide14.xml><?xml version="1.0" encoding="utf-8"?>
 <p:sld xmlns:a="http://schemas.openxmlformats.org/drawingml/2006/main" xmlns:r="http://schemas.openxmlformats.org/officeDocument/2006/relationships" xmlns:p="http://schemas.openxmlformats.org/presentationml/2006/main">
   <p:cSld>
     <p:spTree>
@@ -8874,6 +8093,753 @@
 </p:sld>
 </file>
 
+<file path=ppt/slides/slide15.xml><?xml version="1.0" encoding="utf-8"?>
+<p:sld xmlns:a="http://schemas.openxmlformats.org/drawingml/2006/main" xmlns:r="http://schemas.openxmlformats.org/officeDocument/2006/relationships" xmlns:p="http://schemas.openxmlformats.org/presentationml/2006/main">
+  <p:cSld>
+    <p:spTree>
+      <p:nvGrpSpPr>
+        <p:cNvPr id="1" name=""/>
+        <p:cNvGrpSpPr/>
+        <p:nvPr/>
+      </p:nvGrpSpPr>
+      <p:grpSpPr>
+        <a:xfrm>
+          <a:off x="0" y="0"/>
+          <a:ext cx="0" cy="0"/>
+          <a:chOff x="0" y="0"/>
+          <a:chExt cx="0" cy="0"/>
+        </a:xfrm>
+      </p:grpSpPr>
+      <p:sp>
+        <p:nvSpPr>
+          <p:cNvPr id="2" name="Title 1"/>
+          <p:cNvSpPr>
+            <a:spLocks noGrp="1"/>
+          </p:cNvSpPr>
+          <p:nvPr>
+            <p:ph type="title"/>
+          </p:nvPr>
+        </p:nvSpPr>
+        <p:spPr/>
+        <p:txBody>
+          <a:bodyPr/>
+          <a:lstStyle/>
+          <a:p>
+            <a:r>
+              <a:rPr lang="en-GB" dirty="0"/>
+              <a:t>A simple image program.</a:t>
+            </a:r>
+          </a:p>
+        </p:txBody>
+      </p:sp>
+      <p:sp>
+        <p:nvSpPr>
+          <p:cNvPr id="3" name="Content Placeholder 2"/>
+          <p:cNvSpPr>
+            <a:spLocks noGrp="1"/>
+          </p:cNvSpPr>
+          <p:nvPr>
+            <p:ph idx="1"/>
+          </p:nvPr>
+        </p:nvSpPr>
+        <p:spPr>
+          <a:xfrm>
+            <a:off x="1103312" y="2244506"/>
+            <a:ext cx="5172360" cy="1711477"/>
+          </a:xfrm>
+        </p:spPr>
+        <p:txBody>
+          <a:bodyPr>
+            <a:normAutofit/>
+          </a:bodyPr>
+          <a:lstStyle/>
+          <a:p>
+            <a:r>
+              <a:rPr lang="en-GB" dirty="0"/>
+              <a:t>This program imports the PIL/pillow module, which lets Python work on images.</a:t>
+            </a:r>
+          </a:p>
+          <a:p>
+            <a:r>
+              <a:rPr lang="en-GB" dirty="0"/>
+              <a:t>Then it manipulates the image.</a:t>
+            </a:r>
+          </a:p>
+        </p:txBody>
+      </p:sp>
+      <p:sp>
+        <p:nvSpPr>
+          <p:cNvPr id="6" name="Content Placeholder 2"/>
+          <p:cNvSpPr txBox="1">
+            <a:spLocks/>
+          </p:cNvSpPr>
+          <p:nvPr/>
+        </p:nvSpPr>
+        <p:spPr>
+          <a:xfrm>
+            <a:off x="1103312" y="5068199"/>
+            <a:ext cx="5251622" cy="1450125"/>
+          </a:xfrm>
+          <a:prstGeom prst="rect">
+            <a:avLst/>
+          </a:prstGeom>
+        </p:spPr>
+        <p:txBody>
+          <a:bodyPr vert="horz" lIns="91440" tIns="45720" rIns="91440" bIns="45720" rtlCol="0">
+            <a:normAutofit/>
+          </a:bodyPr>
+          <a:lstStyle>
+            <a:lvl1pPr marL="342900" indent="-342900" algn="l" defTabSz="457200" rtl="0" eaLnBrk="1" latinLnBrk="0" hangingPunct="1">
+              <a:spcBef>
+                <a:spcPts val="1000"/>
+              </a:spcBef>
+              <a:spcAft>
+                <a:spcPts val="0"/>
+              </a:spcAft>
+              <a:buClr>
+                <a:schemeClr val="bg2">
+                  <a:lumMod val="40000"/>
+                  <a:lumOff val="60000"/>
+                </a:schemeClr>
+              </a:buClr>
+              <a:buSzPct val="80000"/>
+              <a:buFont typeface="Wingdings 3" charset="2"/>
+              <a:buChar char=""/>
+              <a:defRPr sz="2000" b="0" i="0" kern="1200">
+                <a:solidFill>
+                  <a:schemeClr val="tx1"/>
+                </a:solidFill>
+                <a:latin typeface="+mj-lt"/>
+                <a:ea typeface="+mj-ea"/>
+                <a:cs typeface="+mj-cs"/>
+              </a:defRPr>
+            </a:lvl1pPr>
+            <a:lvl2pPr marL="742950" indent="-285750" algn="l" defTabSz="457200" rtl="0" eaLnBrk="1" latinLnBrk="0" hangingPunct="1">
+              <a:spcBef>
+                <a:spcPts val="1000"/>
+              </a:spcBef>
+              <a:spcAft>
+                <a:spcPts val="0"/>
+              </a:spcAft>
+              <a:buClr>
+                <a:schemeClr val="bg2">
+                  <a:lumMod val="40000"/>
+                  <a:lumOff val="60000"/>
+                </a:schemeClr>
+              </a:buClr>
+              <a:buSzPct val="80000"/>
+              <a:buFont typeface="Wingdings 3" charset="2"/>
+              <a:buChar char=""/>
+              <a:defRPr sz="1800" b="0" i="0" kern="1200">
+                <a:solidFill>
+                  <a:schemeClr val="tx1"/>
+                </a:solidFill>
+                <a:latin typeface="+mj-lt"/>
+                <a:ea typeface="+mj-ea"/>
+                <a:cs typeface="+mj-cs"/>
+              </a:defRPr>
+            </a:lvl2pPr>
+            <a:lvl3pPr marL="1143000" indent="-228600" algn="l" defTabSz="457200" rtl="0" eaLnBrk="1" latinLnBrk="0" hangingPunct="1">
+              <a:spcBef>
+                <a:spcPts val="1000"/>
+              </a:spcBef>
+              <a:spcAft>
+                <a:spcPts val="0"/>
+              </a:spcAft>
+              <a:buClr>
+                <a:schemeClr val="bg2">
+                  <a:lumMod val="40000"/>
+                  <a:lumOff val="60000"/>
+                </a:schemeClr>
+              </a:buClr>
+              <a:buSzPct val="80000"/>
+              <a:buFont typeface="Wingdings 3" charset="2"/>
+              <a:buChar char=""/>
+              <a:defRPr sz="1600" b="0" i="0" kern="1200">
+                <a:solidFill>
+                  <a:schemeClr val="tx1"/>
+                </a:solidFill>
+                <a:latin typeface="+mj-lt"/>
+                <a:ea typeface="+mj-ea"/>
+                <a:cs typeface="+mj-cs"/>
+              </a:defRPr>
+            </a:lvl3pPr>
+            <a:lvl4pPr marL="1600200" indent="-228600" algn="l" defTabSz="457200" rtl="0" eaLnBrk="1" latinLnBrk="0" hangingPunct="1">
+              <a:spcBef>
+                <a:spcPts val="1000"/>
+              </a:spcBef>
+              <a:spcAft>
+                <a:spcPts val="0"/>
+              </a:spcAft>
+              <a:buClr>
+                <a:schemeClr val="bg2">
+                  <a:lumMod val="40000"/>
+                  <a:lumOff val="60000"/>
+                </a:schemeClr>
+              </a:buClr>
+              <a:buSzPct val="80000"/>
+              <a:buFont typeface="Wingdings 3" charset="2"/>
+              <a:buChar char=""/>
+              <a:defRPr sz="1400" b="0" i="0" kern="1200">
+                <a:solidFill>
+                  <a:schemeClr val="tx1"/>
+                </a:solidFill>
+                <a:latin typeface="+mj-lt"/>
+                <a:ea typeface="+mj-ea"/>
+                <a:cs typeface="+mj-cs"/>
+              </a:defRPr>
+            </a:lvl4pPr>
+            <a:lvl5pPr marL="2057400" indent="-228600" algn="l" defTabSz="457200" rtl="0" eaLnBrk="1" latinLnBrk="0" hangingPunct="1">
+              <a:spcBef>
+                <a:spcPts val="1000"/>
+              </a:spcBef>
+              <a:spcAft>
+                <a:spcPts val="0"/>
+              </a:spcAft>
+              <a:buClr>
+                <a:schemeClr val="bg2">
+                  <a:lumMod val="40000"/>
+                  <a:lumOff val="60000"/>
+                </a:schemeClr>
+              </a:buClr>
+              <a:buSzPct val="80000"/>
+              <a:buFont typeface="Wingdings 3" charset="2"/>
+              <a:buChar char=""/>
+              <a:defRPr sz="1400" b="0" i="0" kern="1200">
+                <a:solidFill>
+                  <a:schemeClr val="tx1"/>
+                </a:solidFill>
+                <a:latin typeface="+mj-lt"/>
+                <a:ea typeface="+mj-ea"/>
+                <a:cs typeface="+mj-cs"/>
+              </a:defRPr>
+            </a:lvl5pPr>
+            <a:lvl6pPr marL="2506000" indent="-228600" algn="l" defTabSz="457200" rtl="0" eaLnBrk="1" latinLnBrk="0" hangingPunct="1">
+              <a:spcBef>
+                <a:spcPts val="1000"/>
+              </a:spcBef>
+              <a:spcAft>
+                <a:spcPts val="0"/>
+              </a:spcAft>
+              <a:buClr>
+                <a:schemeClr val="bg2">
+                  <a:lumMod val="40000"/>
+                  <a:lumOff val="60000"/>
+                </a:schemeClr>
+              </a:buClr>
+              <a:buSzPct val="80000"/>
+              <a:buFont typeface="Wingdings 3" charset="2"/>
+              <a:buChar char=""/>
+              <a:defRPr sz="1400" b="0" i="0" kern="1200">
+                <a:solidFill>
+                  <a:schemeClr val="tx1"/>
+                </a:solidFill>
+                <a:latin typeface="+mj-lt"/>
+                <a:ea typeface="+mj-ea"/>
+                <a:cs typeface="+mj-cs"/>
+              </a:defRPr>
+            </a:lvl6pPr>
+            <a:lvl7pPr marL="2971800" indent="-228600" algn="l" defTabSz="457200" rtl="0" eaLnBrk="1" latinLnBrk="0" hangingPunct="1">
+              <a:spcBef>
+                <a:spcPts val="1000"/>
+              </a:spcBef>
+              <a:spcAft>
+                <a:spcPts val="0"/>
+              </a:spcAft>
+              <a:buClr>
+                <a:schemeClr val="bg2">
+                  <a:lumMod val="40000"/>
+                  <a:lumOff val="60000"/>
+                </a:schemeClr>
+              </a:buClr>
+              <a:buSzPct val="80000"/>
+              <a:buFont typeface="Wingdings 3" charset="2"/>
+              <a:buChar char=""/>
+              <a:defRPr sz="1400" b="0" i="0" kern="1200">
+                <a:solidFill>
+                  <a:schemeClr val="tx1"/>
+                </a:solidFill>
+                <a:latin typeface="+mj-lt"/>
+                <a:ea typeface="+mj-ea"/>
+                <a:cs typeface="+mj-cs"/>
+              </a:defRPr>
+            </a:lvl7pPr>
+            <a:lvl8pPr marL="3429000" indent="-228600" algn="l" defTabSz="457200" rtl="0" eaLnBrk="1" latinLnBrk="0" hangingPunct="1">
+              <a:spcBef>
+                <a:spcPts val="1000"/>
+              </a:spcBef>
+              <a:spcAft>
+                <a:spcPts val="0"/>
+              </a:spcAft>
+              <a:buClr>
+                <a:schemeClr val="bg2">
+                  <a:lumMod val="40000"/>
+                  <a:lumOff val="60000"/>
+                </a:schemeClr>
+              </a:buClr>
+              <a:buSzPct val="80000"/>
+              <a:buFont typeface="Wingdings 3" charset="2"/>
+              <a:buChar char=""/>
+              <a:defRPr sz="1400" b="0" i="0" kern="1200">
+                <a:solidFill>
+                  <a:schemeClr val="tx1"/>
+                </a:solidFill>
+                <a:latin typeface="+mj-lt"/>
+                <a:ea typeface="+mj-ea"/>
+                <a:cs typeface="+mj-cs"/>
+              </a:defRPr>
+            </a:lvl8pPr>
+            <a:lvl9pPr marL="3886200" indent="-228600" algn="l" defTabSz="457200" rtl="0" eaLnBrk="1" latinLnBrk="0" hangingPunct="1">
+              <a:spcBef>
+                <a:spcPts val="1000"/>
+              </a:spcBef>
+              <a:spcAft>
+                <a:spcPts val="0"/>
+              </a:spcAft>
+              <a:buClr>
+                <a:schemeClr val="bg2">
+                  <a:lumMod val="40000"/>
+                  <a:lumOff val="60000"/>
+                </a:schemeClr>
+              </a:buClr>
+              <a:buSzPct val="80000"/>
+              <a:buFont typeface="Wingdings 3" charset="2"/>
+              <a:buChar char=""/>
+              <a:defRPr sz="1400" b="0" i="0" kern="1200">
+                <a:solidFill>
+                  <a:schemeClr val="tx1"/>
+                </a:solidFill>
+                <a:latin typeface="+mj-lt"/>
+                <a:ea typeface="+mj-ea"/>
+                <a:cs typeface="+mj-cs"/>
+              </a:defRPr>
+            </a:lvl9pPr>
+          </a:lstStyle>
+          <a:p>
+            <a:r>
+              <a:rPr lang="en-GB" dirty="0">
+                <a:solidFill>
+                  <a:srgbClr val="FFFF00"/>
+                </a:solidFill>
+              </a:rPr>
+              <a:t>Task: Read this program and try and work out what it will do.</a:t>
+            </a:r>
+          </a:p>
+          <a:p>
+            <a:r>
+              <a:rPr lang="en-GB" dirty="0">
+                <a:solidFill>
+                  <a:srgbClr val="FFFF00"/>
+                </a:solidFill>
+              </a:rPr>
+              <a:t>Type it in and run it. Is that what happened ?</a:t>
+            </a:r>
+          </a:p>
+        </p:txBody>
+      </p:sp>
+      <p:sp>
+        <p:nvSpPr>
+          <p:cNvPr id="7" name="Content Placeholder 2"/>
+          <p:cNvSpPr txBox="1">
+            <a:spLocks/>
+          </p:cNvSpPr>
+          <p:nvPr/>
+        </p:nvSpPr>
+        <p:spPr>
+          <a:xfrm>
+            <a:off x="6120827" y="1377416"/>
+            <a:ext cx="5535714" cy="5140907"/>
+          </a:xfrm>
+          <a:prstGeom prst="rect">
+            <a:avLst/>
+          </a:prstGeom>
+        </p:spPr>
+        <p:txBody>
+          <a:bodyPr vert="horz" lIns="91440" tIns="45720" rIns="91440" bIns="45720" rtlCol="0">
+            <a:normAutofit/>
+          </a:bodyPr>
+          <a:lstStyle>
+            <a:lvl1pPr marL="342900" indent="-342900" algn="l" defTabSz="457200" rtl="0" eaLnBrk="1" latinLnBrk="0" hangingPunct="1">
+              <a:spcBef>
+                <a:spcPts val="1000"/>
+              </a:spcBef>
+              <a:spcAft>
+                <a:spcPts val="0"/>
+              </a:spcAft>
+              <a:buClr>
+                <a:schemeClr val="bg2">
+                  <a:lumMod val="40000"/>
+                  <a:lumOff val="60000"/>
+                </a:schemeClr>
+              </a:buClr>
+              <a:buSzPct val="80000"/>
+              <a:buFont typeface="Wingdings 3" charset="2"/>
+              <a:buChar char=""/>
+              <a:defRPr sz="2000" b="0" i="0" kern="1200">
+                <a:solidFill>
+                  <a:schemeClr val="tx1"/>
+                </a:solidFill>
+                <a:latin typeface="+mj-lt"/>
+                <a:ea typeface="+mj-ea"/>
+                <a:cs typeface="+mj-cs"/>
+              </a:defRPr>
+            </a:lvl1pPr>
+            <a:lvl2pPr marL="742950" indent="-285750" algn="l" defTabSz="457200" rtl="0" eaLnBrk="1" latinLnBrk="0" hangingPunct="1">
+              <a:spcBef>
+                <a:spcPts val="1000"/>
+              </a:spcBef>
+              <a:spcAft>
+                <a:spcPts val="0"/>
+              </a:spcAft>
+              <a:buClr>
+                <a:schemeClr val="bg2">
+                  <a:lumMod val="40000"/>
+                  <a:lumOff val="60000"/>
+                </a:schemeClr>
+              </a:buClr>
+              <a:buSzPct val="80000"/>
+              <a:buFont typeface="Wingdings 3" charset="2"/>
+              <a:buChar char=""/>
+              <a:defRPr sz="1800" b="0" i="0" kern="1200">
+                <a:solidFill>
+                  <a:schemeClr val="tx1"/>
+                </a:solidFill>
+                <a:latin typeface="+mj-lt"/>
+                <a:ea typeface="+mj-ea"/>
+                <a:cs typeface="+mj-cs"/>
+              </a:defRPr>
+            </a:lvl2pPr>
+            <a:lvl3pPr marL="1143000" indent="-228600" algn="l" defTabSz="457200" rtl="0" eaLnBrk="1" latinLnBrk="0" hangingPunct="1">
+              <a:spcBef>
+                <a:spcPts val="1000"/>
+              </a:spcBef>
+              <a:spcAft>
+                <a:spcPts val="0"/>
+              </a:spcAft>
+              <a:buClr>
+                <a:schemeClr val="bg2">
+                  <a:lumMod val="40000"/>
+                  <a:lumOff val="60000"/>
+                </a:schemeClr>
+              </a:buClr>
+              <a:buSzPct val="80000"/>
+              <a:buFont typeface="Wingdings 3" charset="2"/>
+              <a:buChar char=""/>
+              <a:defRPr sz="1600" b="0" i="0" kern="1200">
+                <a:solidFill>
+                  <a:schemeClr val="tx1"/>
+                </a:solidFill>
+                <a:latin typeface="+mj-lt"/>
+                <a:ea typeface="+mj-ea"/>
+                <a:cs typeface="+mj-cs"/>
+              </a:defRPr>
+            </a:lvl3pPr>
+            <a:lvl4pPr marL="1600200" indent="-228600" algn="l" defTabSz="457200" rtl="0" eaLnBrk="1" latinLnBrk="0" hangingPunct="1">
+              <a:spcBef>
+                <a:spcPts val="1000"/>
+              </a:spcBef>
+              <a:spcAft>
+                <a:spcPts val="0"/>
+              </a:spcAft>
+              <a:buClr>
+                <a:schemeClr val="bg2">
+                  <a:lumMod val="40000"/>
+                  <a:lumOff val="60000"/>
+                </a:schemeClr>
+              </a:buClr>
+              <a:buSzPct val="80000"/>
+              <a:buFont typeface="Wingdings 3" charset="2"/>
+              <a:buChar char=""/>
+              <a:defRPr sz="1400" b="0" i="0" kern="1200">
+                <a:solidFill>
+                  <a:schemeClr val="tx1"/>
+                </a:solidFill>
+                <a:latin typeface="+mj-lt"/>
+                <a:ea typeface="+mj-ea"/>
+                <a:cs typeface="+mj-cs"/>
+              </a:defRPr>
+            </a:lvl4pPr>
+            <a:lvl5pPr marL="2057400" indent="-228600" algn="l" defTabSz="457200" rtl="0" eaLnBrk="1" latinLnBrk="0" hangingPunct="1">
+              <a:spcBef>
+                <a:spcPts val="1000"/>
+              </a:spcBef>
+              <a:spcAft>
+                <a:spcPts val="0"/>
+              </a:spcAft>
+              <a:buClr>
+                <a:schemeClr val="bg2">
+                  <a:lumMod val="40000"/>
+                  <a:lumOff val="60000"/>
+                </a:schemeClr>
+              </a:buClr>
+              <a:buSzPct val="80000"/>
+              <a:buFont typeface="Wingdings 3" charset="2"/>
+              <a:buChar char=""/>
+              <a:defRPr sz="1400" b="0" i="0" kern="1200">
+                <a:solidFill>
+                  <a:schemeClr val="tx1"/>
+                </a:solidFill>
+                <a:latin typeface="+mj-lt"/>
+                <a:ea typeface="+mj-ea"/>
+                <a:cs typeface="+mj-cs"/>
+              </a:defRPr>
+            </a:lvl5pPr>
+            <a:lvl6pPr marL="2506000" indent="-228600" algn="l" defTabSz="457200" rtl="0" eaLnBrk="1" latinLnBrk="0" hangingPunct="1">
+              <a:spcBef>
+                <a:spcPts val="1000"/>
+              </a:spcBef>
+              <a:spcAft>
+                <a:spcPts val="0"/>
+              </a:spcAft>
+              <a:buClr>
+                <a:schemeClr val="bg2">
+                  <a:lumMod val="40000"/>
+                  <a:lumOff val="60000"/>
+                </a:schemeClr>
+              </a:buClr>
+              <a:buSzPct val="80000"/>
+              <a:buFont typeface="Wingdings 3" charset="2"/>
+              <a:buChar char=""/>
+              <a:defRPr sz="1400" b="0" i="0" kern="1200">
+                <a:solidFill>
+                  <a:schemeClr val="tx1"/>
+                </a:solidFill>
+                <a:latin typeface="+mj-lt"/>
+                <a:ea typeface="+mj-ea"/>
+                <a:cs typeface="+mj-cs"/>
+              </a:defRPr>
+            </a:lvl6pPr>
+            <a:lvl7pPr marL="2971800" indent="-228600" algn="l" defTabSz="457200" rtl="0" eaLnBrk="1" latinLnBrk="0" hangingPunct="1">
+              <a:spcBef>
+                <a:spcPts val="1000"/>
+              </a:spcBef>
+              <a:spcAft>
+                <a:spcPts val="0"/>
+              </a:spcAft>
+              <a:buClr>
+                <a:schemeClr val="bg2">
+                  <a:lumMod val="40000"/>
+                  <a:lumOff val="60000"/>
+                </a:schemeClr>
+              </a:buClr>
+              <a:buSzPct val="80000"/>
+              <a:buFont typeface="Wingdings 3" charset="2"/>
+              <a:buChar char=""/>
+              <a:defRPr sz="1400" b="0" i="0" kern="1200">
+                <a:solidFill>
+                  <a:schemeClr val="tx1"/>
+                </a:solidFill>
+                <a:latin typeface="+mj-lt"/>
+                <a:ea typeface="+mj-ea"/>
+                <a:cs typeface="+mj-cs"/>
+              </a:defRPr>
+            </a:lvl7pPr>
+            <a:lvl8pPr marL="3429000" indent="-228600" algn="l" defTabSz="457200" rtl="0" eaLnBrk="1" latinLnBrk="0" hangingPunct="1">
+              <a:spcBef>
+                <a:spcPts val="1000"/>
+              </a:spcBef>
+              <a:spcAft>
+                <a:spcPts val="0"/>
+              </a:spcAft>
+              <a:buClr>
+                <a:schemeClr val="bg2">
+                  <a:lumMod val="40000"/>
+                  <a:lumOff val="60000"/>
+                </a:schemeClr>
+              </a:buClr>
+              <a:buSzPct val="80000"/>
+              <a:buFont typeface="Wingdings 3" charset="2"/>
+              <a:buChar char=""/>
+              <a:defRPr sz="1400" b="0" i="0" kern="1200">
+                <a:solidFill>
+                  <a:schemeClr val="tx1"/>
+                </a:solidFill>
+                <a:latin typeface="+mj-lt"/>
+                <a:ea typeface="+mj-ea"/>
+                <a:cs typeface="+mj-cs"/>
+              </a:defRPr>
+            </a:lvl8pPr>
+            <a:lvl9pPr marL="3886200" indent="-228600" algn="l" defTabSz="457200" rtl="0" eaLnBrk="1" latinLnBrk="0" hangingPunct="1">
+              <a:spcBef>
+                <a:spcPts val="1000"/>
+              </a:spcBef>
+              <a:spcAft>
+                <a:spcPts val="0"/>
+              </a:spcAft>
+              <a:buClr>
+                <a:schemeClr val="bg2">
+                  <a:lumMod val="40000"/>
+                  <a:lumOff val="60000"/>
+                </a:schemeClr>
+              </a:buClr>
+              <a:buSzPct val="80000"/>
+              <a:buFont typeface="Wingdings 3" charset="2"/>
+              <a:buChar char=""/>
+              <a:defRPr sz="1400" b="0" i="0" kern="1200">
+                <a:solidFill>
+                  <a:schemeClr val="tx1"/>
+                </a:solidFill>
+                <a:latin typeface="+mj-lt"/>
+                <a:ea typeface="+mj-ea"/>
+                <a:cs typeface="+mj-cs"/>
+              </a:defRPr>
+            </a:lvl9pPr>
+          </a:lstStyle>
+          <a:p>
+            <a:pPr marL="0" indent="0">
+              <a:buNone/>
+            </a:pPr>
+            <a:endParaRPr lang="en-GB" dirty="0"/>
+          </a:p>
+        </p:txBody>
+      </p:sp>
+      <p:sp>
+        <p:nvSpPr>
+          <p:cNvPr id="5" name="Rectangle 4"/>
+          <p:cNvSpPr/>
+          <p:nvPr/>
+        </p:nvSpPr>
+        <p:spPr>
+          <a:xfrm>
+            <a:off x="6354933" y="2244506"/>
+            <a:ext cx="5705521" cy="2062103"/>
+          </a:xfrm>
+          <a:prstGeom prst="rect">
+            <a:avLst/>
+          </a:prstGeom>
+        </p:spPr>
+        <p:txBody>
+          <a:bodyPr wrap="square">
+            <a:spAutoFit/>
+          </a:bodyPr>
+          <a:lstStyle/>
+          <a:p>
+            <a:r>
+              <a:rPr lang="en-GB" sz="1600" dirty="0">
+                <a:latin typeface="Courier New" panose="02070309020205020404" pitchFamily="49" charset="0"/>
+                <a:cs typeface="Courier New" panose="02070309020205020404" pitchFamily="49" charset="0"/>
+              </a:rPr>
+              <a:t># Week6, Program3</a:t>
+            </a:r>
+          </a:p>
+          <a:p>
+            <a:endParaRPr lang="en-GB" sz="1600" dirty="0">
+              <a:latin typeface="Courier New" panose="02070309020205020404" pitchFamily="49" charset="0"/>
+              <a:cs typeface="Courier New" panose="02070309020205020404" pitchFamily="49" charset="0"/>
+            </a:endParaRPr>
+          </a:p>
+          <a:p>
+            <a:r>
+              <a:rPr lang="en-GB" sz="1600" dirty="0">
+                <a:latin typeface="Courier New" panose="02070309020205020404" pitchFamily="49" charset="0"/>
+                <a:cs typeface="Courier New" panose="02070309020205020404" pitchFamily="49" charset="0"/>
+              </a:rPr>
+              <a:t>from PIL import Image</a:t>
+            </a:r>
+          </a:p>
+          <a:p>
+            <a:endParaRPr lang="en-GB" sz="1600" dirty="0">
+              <a:latin typeface="Courier New" panose="02070309020205020404" pitchFamily="49" charset="0"/>
+              <a:cs typeface="Courier New" panose="02070309020205020404" pitchFamily="49" charset="0"/>
+            </a:endParaRPr>
+          </a:p>
+          <a:p>
+            <a:r>
+              <a:rPr lang="en-GB" sz="1600" dirty="0" err="1">
+                <a:latin typeface="Courier New" panose="02070309020205020404" pitchFamily="49" charset="0"/>
+                <a:cs typeface="Courier New" panose="02070309020205020404" pitchFamily="49" charset="0"/>
+              </a:rPr>
+              <a:t>myimage</a:t>
+            </a:r>
+            <a:r>
+              <a:rPr lang="en-GB" sz="1600" dirty="0">
+                <a:latin typeface="Courier New" panose="02070309020205020404" pitchFamily="49" charset="0"/>
+                <a:cs typeface="Courier New" panose="02070309020205020404" pitchFamily="49" charset="0"/>
+              </a:rPr>
+              <a:t> = </a:t>
+            </a:r>
+            <a:r>
+              <a:rPr lang="en-GB" sz="1600" dirty="0" err="1">
+                <a:latin typeface="Courier New" panose="02070309020205020404" pitchFamily="49" charset="0"/>
+                <a:cs typeface="Courier New" panose="02070309020205020404" pitchFamily="49" charset="0"/>
+              </a:rPr>
+              <a:t>Image.open</a:t>
+            </a:r>
+            <a:r>
+              <a:rPr lang="en-GB" sz="1600" dirty="0">
+                <a:latin typeface="Courier New" panose="02070309020205020404" pitchFamily="49" charset="0"/>
+                <a:cs typeface="Courier New" panose="02070309020205020404" pitchFamily="49" charset="0"/>
+              </a:rPr>
+              <a:t>("london.jpg")</a:t>
+            </a:r>
+          </a:p>
+          <a:p>
+            <a:r>
+              <a:rPr lang="en-GB" sz="1600" dirty="0" err="1">
+                <a:latin typeface="Courier New" panose="02070309020205020404" pitchFamily="49" charset="0"/>
+                <a:cs typeface="Courier New" panose="02070309020205020404" pitchFamily="49" charset="0"/>
+              </a:rPr>
+              <a:t>flipped_image</a:t>
+            </a:r>
+            <a:r>
+              <a:rPr lang="en-GB" sz="1600" dirty="0">
+                <a:latin typeface="Courier New" panose="02070309020205020404" pitchFamily="49" charset="0"/>
+                <a:cs typeface="Courier New" panose="02070309020205020404" pitchFamily="49" charset="0"/>
+              </a:rPr>
+              <a:t> = </a:t>
+            </a:r>
+            <a:r>
+              <a:rPr lang="en-GB" sz="1600" dirty="0" err="1">
+                <a:latin typeface="Courier New" panose="02070309020205020404" pitchFamily="49" charset="0"/>
+                <a:cs typeface="Courier New" panose="02070309020205020404" pitchFamily="49" charset="0"/>
+              </a:rPr>
+              <a:t>myimage.rotate</a:t>
+            </a:r>
+            <a:r>
+              <a:rPr lang="en-GB" sz="1600" dirty="0">
+                <a:latin typeface="Courier New" panose="02070309020205020404" pitchFamily="49" charset="0"/>
+                <a:cs typeface="Courier New" panose="02070309020205020404" pitchFamily="49" charset="0"/>
+              </a:rPr>
+              <a:t>(180)</a:t>
+            </a:r>
+          </a:p>
+          <a:p>
+            <a:r>
+              <a:rPr lang="en-GB" sz="1600" dirty="0" err="1">
+                <a:latin typeface="Courier New" panose="02070309020205020404" pitchFamily="49" charset="0"/>
+                <a:cs typeface="Courier New" panose="02070309020205020404" pitchFamily="49" charset="0"/>
+              </a:rPr>
+              <a:t>flipped_image.show</a:t>
+            </a:r>
+            <a:r>
+              <a:rPr lang="en-GB" sz="1600" dirty="0">
+                <a:latin typeface="Courier New" panose="02070309020205020404" pitchFamily="49" charset="0"/>
+                <a:cs typeface="Courier New" panose="02070309020205020404" pitchFamily="49" charset="0"/>
+              </a:rPr>
+              <a:t>()</a:t>
+            </a:r>
+          </a:p>
+          <a:p>
+            <a:endParaRPr lang="en-GB" sz="1600" dirty="0">
+              <a:latin typeface="Courier New" panose="02070309020205020404" pitchFamily="49" charset="0"/>
+              <a:cs typeface="Courier New" panose="02070309020205020404" pitchFamily="49" charset="0"/>
+            </a:endParaRPr>
+          </a:p>
+        </p:txBody>
+      </p:sp>
+    </p:spTree>
+    <p:extLst>
+      <p:ext uri="{BB962C8B-B14F-4D97-AF65-F5344CB8AC3E}">
+        <p14:creationId xmlns:p14="http://schemas.microsoft.com/office/powerpoint/2010/main" val="1931979711"/>
+      </p:ext>
+    </p:extLst>
+  </p:cSld>
+  <p:clrMapOvr>
+    <a:masterClrMapping/>
+  </p:clrMapOvr>
+</p:sld>
+</file>
+
 <file path=ppt/slides/slide16.xml><?xml version="1.0" encoding="utf-8"?>
 <p:sld xmlns:a="http://schemas.openxmlformats.org/drawingml/2006/main" xmlns:r="http://schemas.openxmlformats.org/officeDocument/2006/relationships" xmlns:p="http://schemas.openxmlformats.org/presentationml/2006/main">
   <p:cSld>
@@ -8908,7 +8874,7 @@
           <a:p>
             <a:r>
               <a:rPr lang="en-GB" dirty="0"/>
-              <a:t>A simple image program.</a:t>
+              <a:t>Loading the image.</a:t>
             </a:r>
           </a:p>
         </p:txBody>
@@ -8926,7 +8892,7 @@
         <p:spPr>
           <a:xfrm>
             <a:off x="1103312" y="2244506"/>
-            <a:ext cx="5172360" cy="1711477"/>
+            <a:ext cx="5172360" cy="2693254"/>
           </a:xfrm>
         </p:spPr>
         <p:txBody>
@@ -8944,6 +8910,12 @@
             <a:r>
               <a:rPr lang="en-GB" dirty="0"/>
               <a:t>Then it manipulates the image.</a:t>
+            </a:r>
+          </a:p>
+          <a:p>
+            <a:r>
+              <a:rPr lang="en-GB" dirty="0"/>
+              <a:t>Can you work out what the manipulation is going to be ?</a:t>
             </a:r>
           </a:p>
         </p:txBody>
@@ -9483,7 +9455,7 @@
         <p:spPr>
           <a:xfrm>
             <a:off x="6354933" y="2244506"/>
-            <a:ext cx="5705521" cy="2062103"/>
+            <a:ext cx="5705521" cy="1846659"/>
           </a:xfrm>
           <a:prstGeom prst="rect">
             <a:avLst/>
@@ -9500,7 +9472,7 @@
                 <a:latin typeface="Courier New" panose="02070309020205020404" pitchFamily="49" charset="0"/>
                 <a:cs typeface="Courier New" panose="02070309020205020404" pitchFamily="49" charset="0"/>
               </a:rPr>
-              <a:t># Week6, Program3</a:t>
+              <a:t># Week6, Program4</a:t>
             </a:r>
           </a:p>
           <a:p>
@@ -9560,7 +9532,7 @@
                 <a:latin typeface="Courier New" panose="02070309020205020404" pitchFamily="49" charset="0"/>
                 <a:cs typeface="Courier New" panose="02070309020205020404" pitchFamily="49" charset="0"/>
               </a:rPr>
-              <a:t>flipped_image</a:t>
+              <a:t>turned_image</a:t>
             </a:r>
             <a:r>
               <a:rPr lang="en-GB" sz="1600" dirty="0">
@@ -9590,7 +9562,7 @@
                 <a:latin typeface="Courier New" panose="02070309020205020404" pitchFamily="49" charset="0"/>
                 <a:cs typeface="Courier New" panose="02070309020205020404" pitchFamily="49" charset="0"/>
               </a:rPr>
-              <a:t>flipped_image.show</a:t>
+              <a:t>turned_image.show</a:t>
             </a:r>
             <a:r>
               <a:rPr lang="en-GB" sz="1600" dirty="0">
@@ -9600,18 +9572,12 @@
               <a:t>()</a:t>
             </a:r>
           </a:p>
-          <a:p>
-            <a:endParaRPr lang="en-GB" sz="1600" dirty="0">
-              <a:latin typeface="Courier New" panose="02070309020205020404" pitchFamily="49" charset="0"/>
-              <a:cs typeface="Courier New" panose="02070309020205020404" pitchFamily="49" charset="0"/>
-            </a:endParaRPr>
-          </a:p>
         </p:txBody>
       </p:sp>
     </p:spTree>
     <p:extLst>
       <p:ext uri="{BB962C8B-B14F-4D97-AF65-F5344CB8AC3E}">
-        <p14:creationId xmlns:p14="http://schemas.microsoft.com/office/powerpoint/2010/main" val="1931979711"/>
+        <p14:creationId xmlns:p14="http://schemas.microsoft.com/office/powerpoint/2010/main" val="2911429569"/>
       </p:ext>
     </p:extLst>
   </p:cSld>
@@ -9655,7 +9621,7 @@
           <a:p>
             <a:r>
               <a:rPr lang="en-GB" dirty="0"/>
-              <a:t>Loading the image.</a:t>
+              <a:t>Manipulating the image mode.</a:t>
             </a:r>
           </a:p>
         </p:txBody>
@@ -9678,26 +9644,34 @@
         </p:spPr>
         <p:txBody>
           <a:bodyPr>
-            <a:normAutofit/>
+            <a:normAutofit fontScale="92500" lnSpcReduction="20000"/>
           </a:bodyPr>
           <a:lstStyle/>
           <a:p>
             <a:r>
               <a:rPr lang="en-GB" dirty="0"/>
-              <a:t>This program imports the PIL/pillow module, which lets Python work on images.</a:t>
+              <a:t>This program is similar to the previous one.</a:t>
             </a:r>
           </a:p>
           <a:p>
             <a:r>
               <a:rPr lang="en-GB" dirty="0"/>
-              <a:t>Then it manipulates the image.</a:t>
-            </a:r>
-          </a:p>
-          <a:p>
-            <a:r>
-              <a:rPr lang="en-GB" dirty="0"/>
-              <a:t>Can you work out what the manipulation is going to be ?</a:t>
-            </a:r>
+              <a:t>Instead of rotating the image, we convert it to greyscale (black, white and shades of grey only).</a:t>
+            </a:r>
+          </a:p>
+          <a:p>
+            <a:pPr lvl="1"/>
+            <a:r>
+              <a:rPr lang="en-GB" i="1" dirty="0"/>
+              <a:t>If you want to learn about other modes, look it up at </a:t>
+            </a:r>
+            <a:r>
+              <a:rPr lang="en-GB" i="1" dirty="0">
+                <a:hlinkClick r:id="rId2"/>
+              </a:rPr>
+              <a:t>https://pillow.readthedocs.io/en/3.1.x/reference/Image.html#PIL.Image.Image.convert</a:t>
+            </a:r>
+            <a:endParaRPr lang="en-GB" i="1" dirty="0"/>
           </a:p>
         </p:txBody>
       </p:sp>
@@ -10236,7 +10210,7 @@
         <p:spPr>
           <a:xfrm>
             <a:off x="6354933" y="2244506"/>
-            <a:ext cx="5705521" cy="1846659"/>
+            <a:ext cx="5705521" cy="2062103"/>
           </a:xfrm>
           <a:prstGeom prst="rect">
             <a:avLst/>
@@ -10253,7 +10227,7 @@
                 <a:latin typeface="Courier New" panose="02070309020205020404" pitchFamily="49" charset="0"/>
                 <a:cs typeface="Courier New" panose="02070309020205020404" pitchFamily="49" charset="0"/>
               </a:rPr>
-              <a:t># Week6, Program4</a:t>
+              <a:t># Week6, Program5</a:t>
             </a:r>
           </a:p>
           <a:p>
@@ -10313,7 +10287,7 @@
                 <a:latin typeface="Courier New" panose="02070309020205020404" pitchFamily="49" charset="0"/>
                 <a:cs typeface="Courier New" panose="02070309020205020404" pitchFamily="49" charset="0"/>
               </a:rPr>
-              <a:t>turned_image</a:t>
+              <a:t>greyscale_image</a:t>
             </a:r>
             <a:r>
               <a:rPr lang="en-GB" sz="1600" dirty="0">
@@ -10327,14 +10301,14 @@
                 <a:latin typeface="Courier New" panose="02070309020205020404" pitchFamily="49" charset="0"/>
                 <a:cs typeface="Courier New" panose="02070309020205020404" pitchFamily="49" charset="0"/>
               </a:rPr>
-              <a:t>myimage.rotate</a:t>
+              <a:t>myimage.convert</a:t>
             </a:r>
             <a:r>
               <a:rPr lang="en-GB" sz="1600" dirty="0">
                 <a:latin typeface="Courier New" panose="02070309020205020404" pitchFamily="49" charset="0"/>
                 <a:cs typeface="Courier New" panose="02070309020205020404" pitchFamily="49" charset="0"/>
               </a:rPr>
-              <a:t>(180)</a:t>
+              <a:t>('L')</a:t>
             </a:r>
           </a:p>
           <a:p>
@@ -10343,7 +10317,7 @@
                 <a:latin typeface="Courier New" panose="02070309020205020404" pitchFamily="49" charset="0"/>
                 <a:cs typeface="Courier New" panose="02070309020205020404" pitchFamily="49" charset="0"/>
               </a:rPr>
-              <a:t>turned_image.show</a:t>
+              <a:t>greyscale_image.show</a:t>
             </a:r>
             <a:r>
               <a:rPr lang="en-GB" sz="1600" dirty="0">
@@ -10353,12 +10327,18 @@
               <a:t>()</a:t>
             </a:r>
           </a:p>
+          <a:p>
+            <a:endParaRPr lang="en-GB" sz="1600" dirty="0">
+              <a:latin typeface="Courier New" panose="02070309020205020404" pitchFamily="49" charset="0"/>
+              <a:cs typeface="Courier New" panose="02070309020205020404" pitchFamily="49" charset="0"/>
+            </a:endParaRPr>
+          </a:p>
         </p:txBody>
       </p:sp>
     </p:spTree>
     <p:extLst>
       <p:ext uri="{BB962C8B-B14F-4D97-AF65-F5344CB8AC3E}">
-        <p14:creationId xmlns:p14="http://schemas.microsoft.com/office/powerpoint/2010/main" val="2911429569"/>
+        <p14:creationId xmlns:p14="http://schemas.microsoft.com/office/powerpoint/2010/main" val="473115049"/>
       </p:ext>
     </p:extLst>
   </p:cSld>
@@ -10401,8 +10381,8 @@
           <a:lstStyle/>
           <a:p>
             <a:r>
-              <a:rPr lang="en-GB" dirty="0"/>
-              <a:t>Manipulating the image mode.</a:t>
+              <a:rPr lang="en-GB" sz="4000" dirty="0"/>
+              <a:t>Printing Information About An Image.</a:t>
             </a:r>
           </a:p>
         </p:txBody>
@@ -10425,34 +10405,20 @@
         </p:spPr>
         <p:txBody>
           <a:bodyPr>
-            <a:normAutofit fontScale="92500" lnSpcReduction="20000"/>
+            <a:normAutofit/>
           </a:bodyPr>
           <a:lstStyle/>
           <a:p>
             <a:r>
               <a:rPr lang="en-GB" dirty="0"/>
-              <a:t>This program is similar to the previous one.</a:t>
+              <a:t>Pillow can tell you things about your image.</a:t>
             </a:r>
           </a:p>
           <a:p>
             <a:r>
               <a:rPr lang="en-GB" dirty="0"/>
-              <a:t>Instead of rotating the image, we convert it to greyscale (black, white and shades of grey only).</a:t>
-            </a:r>
-          </a:p>
-          <a:p>
-            <a:pPr lvl="1"/>
-            <a:r>
-              <a:rPr lang="en-GB" i="1" dirty="0"/>
-              <a:t>If you want to learn about other modes, look it up at </a:t>
-            </a:r>
-            <a:r>
-              <a:rPr lang="en-GB" i="1" dirty="0">
-                <a:hlinkClick r:id="rId2"/>
-              </a:rPr>
-              <a:t>https://pillow.readthedocs.io/en/3.1.x/reference/Image.html#PIL.Image.Image.convert</a:t>
-            </a:r>
-            <a:endParaRPr lang="en-GB" i="1" dirty="0"/>
+              <a:t>This program shows some examples.</a:t>
+            </a:r>
           </a:p>
         </p:txBody>
       </p:sp>
@@ -10991,7 +10957,7 @@
         <p:spPr>
           <a:xfrm>
             <a:off x="6354933" y="2244506"/>
-            <a:ext cx="5705521" cy="2062103"/>
+            <a:ext cx="5705521" cy="1969770"/>
           </a:xfrm>
           <a:prstGeom prst="rect">
             <a:avLst/>
@@ -11004,122 +10970,204 @@
           <a:lstStyle/>
           <a:p>
             <a:r>
-              <a:rPr lang="en-GB" sz="1600" dirty="0">
+              <a:rPr lang="en-GB" sz="1200" dirty="0">
                 <a:latin typeface="Courier New" panose="02070309020205020404" pitchFamily="49" charset="0"/>
                 <a:cs typeface="Courier New" panose="02070309020205020404" pitchFamily="49" charset="0"/>
               </a:rPr>
-              <a:t># Week6, Program5</a:t>
-            </a:r>
-          </a:p>
-          <a:p>
-            <a:endParaRPr lang="en-GB" sz="1600" dirty="0">
+              <a:t># Week6, Program6</a:t>
+            </a:r>
+          </a:p>
+          <a:p>
+            <a:endParaRPr lang="en-GB" sz="1200" dirty="0">
               <a:latin typeface="Courier New" panose="02070309020205020404" pitchFamily="49" charset="0"/>
               <a:cs typeface="Courier New" panose="02070309020205020404" pitchFamily="49" charset="0"/>
             </a:endParaRPr>
           </a:p>
           <a:p>
             <a:r>
-              <a:rPr lang="en-GB" sz="1600" dirty="0">
+              <a:rPr lang="en-GB" sz="1200" dirty="0">
                 <a:latin typeface="Courier New" panose="02070309020205020404" pitchFamily="49" charset="0"/>
                 <a:cs typeface="Courier New" panose="02070309020205020404" pitchFamily="49" charset="0"/>
               </a:rPr>
-              <a:t>from PIL import Image</a:t>
-            </a:r>
-          </a:p>
-          <a:p>
-            <a:endParaRPr lang="en-GB" sz="1600" dirty="0">
+              <a:t>from PIL import Image, </a:t>
+            </a:r>
+            <a:r>
+              <a:rPr lang="en-GB" sz="1200" dirty="0" err="1">
+                <a:latin typeface="Courier New" panose="02070309020205020404" pitchFamily="49" charset="0"/>
+                <a:cs typeface="Courier New" panose="02070309020205020404" pitchFamily="49" charset="0"/>
+              </a:rPr>
+              <a:t>ImageDraw</a:t>
+            </a:r>
+            <a:endParaRPr lang="en-GB" sz="1200" dirty="0">
               <a:latin typeface="Courier New" panose="02070309020205020404" pitchFamily="49" charset="0"/>
               <a:cs typeface="Courier New" panose="02070309020205020404" pitchFamily="49" charset="0"/>
             </a:endParaRPr>
           </a:p>
           <a:p>
-            <a:r>
-              <a:rPr lang="en-GB" sz="1600" dirty="0" err="1">
-                <a:latin typeface="Courier New" panose="02070309020205020404" pitchFamily="49" charset="0"/>
-                <a:cs typeface="Courier New" panose="02070309020205020404" pitchFamily="49" charset="0"/>
-              </a:rPr>
-              <a:t>myimage</a:t>
-            </a:r>
-            <a:r>
-              <a:rPr lang="en-GB" sz="1600" dirty="0">
-                <a:latin typeface="Courier New" panose="02070309020205020404" pitchFamily="49" charset="0"/>
-                <a:cs typeface="Courier New" panose="02070309020205020404" pitchFamily="49" charset="0"/>
-              </a:rPr>
-              <a:t> = </a:t>
-            </a:r>
-            <a:r>
-              <a:rPr lang="en-GB" sz="1600" dirty="0" err="1">
-                <a:latin typeface="Courier New" panose="02070309020205020404" pitchFamily="49" charset="0"/>
-                <a:cs typeface="Courier New" panose="02070309020205020404" pitchFamily="49" charset="0"/>
-              </a:rPr>
-              <a:t>Image.open</a:t>
-            </a:r>
-            <a:r>
-              <a:rPr lang="en-GB" sz="1600" dirty="0">
-                <a:latin typeface="Courier New" panose="02070309020205020404" pitchFamily="49" charset="0"/>
-                <a:cs typeface="Courier New" panose="02070309020205020404" pitchFamily="49" charset="0"/>
-              </a:rPr>
-              <a:t>("london.jpg")</a:t>
-            </a:r>
-          </a:p>
-          <a:p>
-            <a:r>
-              <a:rPr lang="en-GB" sz="1600" dirty="0" err="1">
-                <a:latin typeface="Courier New" panose="02070309020205020404" pitchFamily="49" charset="0"/>
-                <a:cs typeface="Courier New" panose="02070309020205020404" pitchFamily="49" charset="0"/>
-              </a:rPr>
-              <a:t>greyscale_image</a:t>
-            </a:r>
-            <a:r>
-              <a:rPr lang="en-GB" sz="1600" dirty="0">
-                <a:latin typeface="Courier New" panose="02070309020205020404" pitchFamily="49" charset="0"/>
-                <a:cs typeface="Courier New" panose="02070309020205020404" pitchFamily="49" charset="0"/>
-              </a:rPr>
-              <a:t> = </a:t>
-            </a:r>
-            <a:r>
-              <a:rPr lang="en-GB" sz="1600" dirty="0" err="1">
-                <a:latin typeface="Courier New" panose="02070309020205020404" pitchFamily="49" charset="0"/>
-                <a:cs typeface="Courier New" panose="02070309020205020404" pitchFamily="49" charset="0"/>
-              </a:rPr>
-              <a:t>myimage.convert</a:t>
-            </a:r>
-            <a:r>
-              <a:rPr lang="en-GB" sz="1600" dirty="0">
-                <a:latin typeface="Courier New" panose="02070309020205020404" pitchFamily="49" charset="0"/>
-                <a:cs typeface="Courier New" panose="02070309020205020404" pitchFamily="49" charset="0"/>
-              </a:rPr>
-              <a:t>('L')</a:t>
-            </a:r>
-          </a:p>
-          <a:p>
-            <a:r>
-              <a:rPr lang="en-GB" sz="1600" dirty="0" err="1">
-                <a:latin typeface="Courier New" panose="02070309020205020404" pitchFamily="49" charset="0"/>
-                <a:cs typeface="Courier New" panose="02070309020205020404" pitchFamily="49" charset="0"/>
-              </a:rPr>
-              <a:t>greyscale_image.show</a:t>
-            </a:r>
-            <a:r>
-              <a:rPr lang="en-GB" sz="1600" dirty="0">
-                <a:latin typeface="Courier New" panose="02070309020205020404" pitchFamily="49" charset="0"/>
-                <a:cs typeface="Courier New" panose="02070309020205020404" pitchFamily="49" charset="0"/>
-              </a:rPr>
-              <a:t>()</a:t>
-            </a:r>
-          </a:p>
-          <a:p>
-            <a:endParaRPr lang="en-GB" sz="1600" dirty="0">
+            <a:endParaRPr lang="en-GB" sz="1200" dirty="0">
               <a:latin typeface="Courier New" panose="02070309020205020404" pitchFamily="49" charset="0"/>
               <a:cs typeface="Courier New" panose="02070309020205020404" pitchFamily="49" charset="0"/>
             </a:endParaRPr>
           </a:p>
+          <a:p>
+            <a:r>
+              <a:rPr lang="en-GB" sz="1200" dirty="0" err="1">
+                <a:latin typeface="Courier New" panose="02070309020205020404" pitchFamily="49" charset="0"/>
+                <a:cs typeface="Courier New" panose="02070309020205020404" pitchFamily="49" charset="0"/>
+              </a:rPr>
+              <a:t>myimage</a:t>
+            </a:r>
+            <a:r>
+              <a:rPr lang="en-GB" sz="1200" dirty="0">
+                <a:latin typeface="Courier New" panose="02070309020205020404" pitchFamily="49" charset="0"/>
+                <a:cs typeface="Courier New" panose="02070309020205020404" pitchFamily="49" charset="0"/>
+              </a:rPr>
+              <a:t> = </a:t>
+            </a:r>
+            <a:r>
+              <a:rPr lang="en-GB" sz="1200" dirty="0" err="1">
+                <a:latin typeface="Courier New" panose="02070309020205020404" pitchFamily="49" charset="0"/>
+                <a:cs typeface="Courier New" panose="02070309020205020404" pitchFamily="49" charset="0"/>
+              </a:rPr>
+              <a:t>Image.open</a:t>
+            </a:r>
+            <a:r>
+              <a:rPr lang="en-GB" sz="1200" dirty="0">
+                <a:latin typeface="Courier New" panose="02070309020205020404" pitchFamily="49" charset="0"/>
+                <a:cs typeface="Courier New" panose="02070309020205020404" pitchFamily="49" charset="0"/>
+              </a:rPr>
+              <a:t>("london.jpg")</a:t>
+            </a:r>
+          </a:p>
+          <a:p>
+            <a:endParaRPr lang="en-GB" sz="1200" dirty="0">
+              <a:latin typeface="Courier New" panose="02070309020205020404" pitchFamily="49" charset="0"/>
+              <a:cs typeface="Courier New" panose="02070309020205020404" pitchFamily="49" charset="0"/>
+            </a:endParaRPr>
+          </a:p>
+          <a:p>
+            <a:r>
+              <a:rPr lang="en-GB" sz="1200" dirty="0">
+                <a:latin typeface="Courier New" panose="02070309020205020404" pitchFamily="49" charset="0"/>
+                <a:cs typeface="Courier New" panose="02070309020205020404" pitchFamily="49" charset="0"/>
+              </a:rPr>
+              <a:t>print(</a:t>
+            </a:r>
+            <a:r>
+              <a:rPr lang="en-GB" sz="1200" dirty="0" err="1">
+                <a:latin typeface="Courier New" panose="02070309020205020404" pitchFamily="49" charset="0"/>
+                <a:cs typeface="Courier New" panose="02070309020205020404" pitchFamily="49" charset="0"/>
+              </a:rPr>
+              <a:t>f"This</a:t>
+            </a:r>
+            <a:r>
+              <a:rPr lang="en-GB" sz="1200" dirty="0">
+                <a:latin typeface="Courier New" panose="02070309020205020404" pitchFamily="49" charset="0"/>
+                <a:cs typeface="Courier New" panose="02070309020205020404" pitchFamily="49" charset="0"/>
+              </a:rPr>
+              <a:t> image is {</a:t>
+            </a:r>
+            <a:r>
+              <a:rPr lang="en-GB" sz="1200" dirty="0" err="1">
+                <a:latin typeface="Courier New" panose="02070309020205020404" pitchFamily="49" charset="0"/>
+                <a:cs typeface="Courier New" panose="02070309020205020404" pitchFamily="49" charset="0"/>
+              </a:rPr>
+              <a:t>myimage.width</a:t>
+            </a:r>
+            <a:r>
+              <a:rPr lang="en-GB" sz="1200" dirty="0">
+                <a:latin typeface="Courier New" panose="02070309020205020404" pitchFamily="49" charset="0"/>
+                <a:cs typeface="Courier New" panose="02070309020205020404" pitchFamily="49" charset="0"/>
+              </a:rPr>
+              <a:t>} pixels wide")</a:t>
+            </a:r>
+          </a:p>
+          <a:p>
+            <a:r>
+              <a:rPr lang="en-GB" sz="1200" dirty="0">
+                <a:latin typeface="Courier New" panose="02070309020205020404" pitchFamily="49" charset="0"/>
+                <a:cs typeface="Courier New" panose="02070309020205020404" pitchFamily="49" charset="0"/>
+              </a:rPr>
+              <a:t>print(</a:t>
+            </a:r>
+            <a:r>
+              <a:rPr lang="en-GB" sz="1200" dirty="0" err="1">
+                <a:latin typeface="Courier New" panose="02070309020205020404" pitchFamily="49" charset="0"/>
+                <a:cs typeface="Courier New" panose="02070309020205020404" pitchFamily="49" charset="0"/>
+              </a:rPr>
+              <a:t>f"This</a:t>
+            </a:r>
+            <a:r>
+              <a:rPr lang="en-GB" sz="1200" dirty="0">
+                <a:latin typeface="Courier New" panose="02070309020205020404" pitchFamily="49" charset="0"/>
+                <a:cs typeface="Courier New" panose="02070309020205020404" pitchFamily="49" charset="0"/>
+              </a:rPr>
+              <a:t> image is {</a:t>
+            </a:r>
+            <a:r>
+              <a:rPr lang="en-GB" sz="1200" dirty="0" err="1">
+                <a:latin typeface="Courier New" panose="02070309020205020404" pitchFamily="49" charset="0"/>
+                <a:cs typeface="Courier New" panose="02070309020205020404" pitchFamily="49" charset="0"/>
+              </a:rPr>
+              <a:t>myimage.height</a:t>
+            </a:r>
+            <a:r>
+              <a:rPr lang="en-GB" sz="1200" dirty="0">
+                <a:latin typeface="Courier New" panose="02070309020205020404" pitchFamily="49" charset="0"/>
+                <a:cs typeface="Courier New" panose="02070309020205020404" pitchFamily="49" charset="0"/>
+              </a:rPr>
+              <a:t>} pixels tall")</a:t>
+            </a:r>
+          </a:p>
+          <a:p>
+            <a:r>
+              <a:rPr lang="en-GB" sz="1200" dirty="0">
+                <a:latin typeface="Courier New" panose="02070309020205020404" pitchFamily="49" charset="0"/>
+                <a:cs typeface="Courier New" panose="02070309020205020404" pitchFamily="49" charset="0"/>
+              </a:rPr>
+              <a:t>print(</a:t>
+            </a:r>
+            <a:r>
+              <a:rPr lang="en-GB" sz="1200" dirty="0" err="1">
+                <a:latin typeface="Courier New" panose="02070309020205020404" pitchFamily="49" charset="0"/>
+                <a:cs typeface="Courier New" panose="02070309020205020404" pitchFamily="49" charset="0"/>
+              </a:rPr>
+              <a:t>f"This</a:t>
+            </a:r>
+            <a:r>
+              <a:rPr lang="en-GB" sz="1200" dirty="0">
+                <a:latin typeface="Courier New" panose="02070309020205020404" pitchFamily="49" charset="0"/>
+                <a:cs typeface="Courier New" panose="02070309020205020404" pitchFamily="49" charset="0"/>
+              </a:rPr>
+              <a:t> image is in the {</a:t>
+            </a:r>
+            <a:r>
+              <a:rPr lang="en-GB" sz="1200" dirty="0" err="1">
+                <a:latin typeface="Courier New" panose="02070309020205020404" pitchFamily="49" charset="0"/>
+                <a:cs typeface="Courier New" panose="02070309020205020404" pitchFamily="49" charset="0"/>
+              </a:rPr>
+              <a:t>myimage.format</a:t>
+            </a:r>
+            <a:r>
+              <a:rPr lang="en-GB" sz="1200" dirty="0">
+                <a:latin typeface="Courier New" panose="02070309020205020404" pitchFamily="49" charset="0"/>
+                <a:cs typeface="Courier New" panose="02070309020205020404" pitchFamily="49" charset="0"/>
+              </a:rPr>
+              <a:t>} format")</a:t>
+            </a:r>
+          </a:p>
+          <a:p>
+            <a:endParaRPr lang="en-GB" sz="1400" dirty="0">
+              <a:latin typeface="Courier New" panose="02070309020205020404" pitchFamily="49" charset="0"/>
+              <a:cs typeface="Courier New" panose="02070309020205020404" pitchFamily="49" charset="0"/>
+            </a:endParaRPr>
+          </a:p>
         </p:txBody>
       </p:sp>
     </p:spTree>
     <p:extLst>
       <p:ext uri="{BB962C8B-B14F-4D97-AF65-F5344CB8AC3E}">
-        <p14:creationId xmlns:p14="http://schemas.microsoft.com/office/powerpoint/2010/main" val="473115049"/>
+        <p14:creationId xmlns:p14="http://schemas.microsoft.com/office/powerpoint/2010/main" val="3986779043"/>
       </p:ext>
     </p:extLst>
   </p:cSld>
@@ -11163,7 +11211,7 @@
           <a:p>
             <a:r>
               <a:rPr lang="en-GB" sz="4000" dirty="0"/>
-              <a:t>Printing Information About An Image.</a:t>
+              <a:t>Drawing on an image.</a:t>
             </a:r>
           </a:p>
         </p:txBody>
@@ -11192,13 +11240,22 @@
           <a:p>
             <a:r>
               <a:rPr lang="en-GB" dirty="0"/>
-              <a:t>Pillow can tell you things about your image.</a:t>
+              <a:t>If you want to draw on the image, we need to add a "drawing layer".</a:t>
             </a:r>
           </a:p>
           <a:p>
             <a:r>
               <a:rPr lang="en-GB" dirty="0"/>
-              <a:t>This program shows some examples.</a:t>
+              <a:t>We then draw on this, and Pillow puts everything together.</a:t>
+            </a:r>
+          </a:p>
+          <a:p>
+            <a:endParaRPr lang="en-GB" dirty="0"/>
+          </a:p>
+          <a:p>
+            <a:r>
+              <a:rPr lang="en-GB" dirty="0"/>
+              <a:t>Try and work out what this program will do.</a:t>
             </a:r>
           </a:p>
         </p:txBody>
@@ -11738,7 +11795,7 @@
         <p:spPr>
           <a:xfrm>
             <a:off x="6354933" y="2244506"/>
-            <a:ext cx="5705521" cy="1969770"/>
+            <a:ext cx="5705521" cy="3046988"/>
           </a:xfrm>
           <a:prstGeom prst="rect">
             <a:avLst/>
@@ -11755,7 +11812,7 @@
                 <a:latin typeface="Courier New" panose="02070309020205020404" pitchFamily="49" charset="0"/>
                 <a:cs typeface="Courier New" panose="02070309020205020404" pitchFamily="49" charset="0"/>
               </a:rPr>
-              <a:t># Week6, Program6</a:t>
+              <a:t># Week6, Program7</a:t>
             </a:r>
           </a:p>
           <a:p>
@@ -11792,6 +11849,15 @@
           </a:p>
           <a:p>
             <a:r>
+              <a:rPr lang="en-GB" sz="1200" dirty="0">
+                <a:latin typeface="Courier New" panose="02070309020205020404" pitchFamily="49" charset="0"/>
+                <a:cs typeface="Courier New" panose="02070309020205020404" pitchFamily="49" charset="0"/>
+              </a:rPr>
+              <a:t># Load the image from disk.</a:t>
+            </a:r>
+          </a:p>
+          <a:p>
+            <a:r>
               <a:rPr lang="en-GB" sz="1200" dirty="0" err="1">
                 <a:latin typeface="Courier New" panose="02070309020205020404" pitchFamily="49" charset="0"/>
                 <a:cs typeface="Courier New" panose="02070309020205020404" pitchFamily="49" charset="0"/>
@@ -11832,36 +11898,51 @@
                 <a:latin typeface="Courier New" panose="02070309020205020404" pitchFamily="49" charset="0"/>
                 <a:cs typeface="Courier New" panose="02070309020205020404" pitchFamily="49" charset="0"/>
               </a:rPr>
-              <a:t>print(</a:t>
+              <a:t># Create the drawing layer so we can draw on it.</a:t>
+            </a:r>
+          </a:p>
+          <a:p>
+            <a:r>
+              <a:rPr lang="en-GB" sz="1200" dirty="0">
+                <a:latin typeface="Courier New" panose="02070309020205020404" pitchFamily="49" charset="0"/>
+                <a:cs typeface="Courier New" panose="02070309020205020404" pitchFamily="49" charset="0"/>
+              </a:rPr>
+              <a:t>draw = </a:t>
             </a:r>
             <a:r>
               <a:rPr lang="en-GB" sz="1200" dirty="0" err="1">
                 <a:latin typeface="Courier New" panose="02070309020205020404" pitchFamily="49" charset="0"/>
                 <a:cs typeface="Courier New" panose="02070309020205020404" pitchFamily="49" charset="0"/>
               </a:rPr>
-              <a:t>f"This</a:t>
+              <a:t>ImageDraw.Draw</a:t>
             </a:r>
             <a:r>
               <a:rPr lang="en-GB" sz="1200" dirty="0">
                 <a:latin typeface="Courier New" panose="02070309020205020404" pitchFamily="49" charset="0"/>
                 <a:cs typeface="Courier New" panose="02070309020205020404" pitchFamily="49" charset="0"/>
               </a:rPr>
-              <a:t> image is {</a:t>
+              <a:t>(</a:t>
             </a:r>
             <a:r>
               <a:rPr lang="en-GB" sz="1200" dirty="0" err="1">
                 <a:latin typeface="Courier New" panose="02070309020205020404" pitchFamily="49" charset="0"/>
                 <a:cs typeface="Courier New" panose="02070309020205020404" pitchFamily="49" charset="0"/>
               </a:rPr>
-              <a:t>myimage.width</a:t>
+              <a:t>myimage</a:t>
             </a:r>
             <a:r>
               <a:rPr lang="en-GB" sz="1200" dirty="0">
                 <a:latin typeface="Courier New" panose="02070309020205020404" pitchFamily="49" charset="0"/>
                 <a:cs typeface="Courier New" panose="02070309020205020404" pitchFamily="49" charset="0"/>
               </a:rPr>
-              <a:t>} pixels wide")</a:t>
-            </a:r>
+              <a:t>)</a:t>
+            </a:r>
+          </a:p>
+          <a:p>
+            <a:endParaRPr lang="en-GB" sz="1200" dirty="0">
+              <a:latin typeface="Courier New" panose="02070309020205020404" pitchFamily="49" charset="0"/>
+              <a:cs typeface="Courier New" panose="02070309020205020404" pitchFamily="49" charset="0"/>
+            </a:endParaRPr>
           </a:p>
           <a:p>
             <a:r>
@@ -11869,86 +11950,131 @@
                 <a:latin typeface="Courier New" panose="02070309020205020404" pitchFamily="49" charset="0"/>
                 <a:cs typeface="Courier New" panose="02070309020205020404" pitchFamily="49" charset="0"/>
               </a:rPr>
-              <a:t>print(</a:t>
-            </a:r>
+              <a:t># Draw two lines</a:t>
+            </a:r>
+          </a:p>
+          <a:p>
             <a:r>
               <a:rPr lang="en-GB" sz="1200" dirty="0" err="1">
                 <a:latin typeface="Courier New" panose="02070309020205020404" pitchFamily="49" charset="0"/>
                 <a:cs typeface="Courier New" panose="02070309020205020404" pitchFamily="49" charset="0"/>
               </a:rPr>
-              <a:t>f"This</a:t>
+              <a:t>draw.line</a:t>
             </a:r>
             <a:r>
               <a:rPr lang="en-GB" sz="1200" dirty="0">
                 <a:latin typeface="Courier New" panose="02070309020205020404" pitchFamily="49" charset="0"/>
                 <a:cs typeface="Courier New" panose="02070309020205020404" pitchFamily="49" charset="0"/>
               </a:rPr>
-              <a:t> image is {</a:t>
+              <a:t>([0, 0, </a:t>
             </a:r>
             <a:r>
               <a:rPr lang="en-GB" sz="1200" dirty="0" err="1">
                 <a:latin typeface="Courier New" panose="02070309020205020404" pitchFamily="49" charset="0"/>
                 <a:cs typeface="Courier New" panose="02070309020205020404" pitchFamily="49" charset="0"/>
               </a:rPr>
-              <a:t>myimage.height</a:t>
+              <a:t>myimage.width</a:t>
             </a:r>
             <a:r>
               <a:rPr lang="en-GB" sz="1200" dirty="0">
                 <a:latin typeface="Courier New" panose="02070309020205020404" pitchFamily="49" charset="0"/>
                 <a:cs typeface="Courier New" panose="02070309020205020404" pitchFamily="49" charset="0"/>
               </a:rPr>
-              <a:t>} pixels tall")</a:t>
-            </a:r>
-          </a:p>
-          <a:p>
+              <a:t>, </a:t>
+            </a:r>
+            <a:r>
+              <a:rPr lang="en-GB" sz="1200" dirty="0" err="1">
+                <a:latin typeface="Courier New" panose="02070309020205020404" pitchFamily="49" charset="0"/>
+                <a:cs typeface="Courier New" panose="02070309020205020404" pitchFamily="49" charset="0"/>
+              </a:rPr>
+              <a:t>myimage.height</a:t>
+            </a:r>
             <a:r>
               <a:rPr lang="en-GB" sz="1200" dirty="0">
                 <a:latin typeface="Courier New" panose="02070309020205020404" pitchFamily="49" charset="0"/>
                 <a:cs typeface="Courier New" panose="02070309020205020404" pitchFamily="49" charset="0"/>
               </a:rPr>
-              <a:t>print(</a:t>
-            </a:r>
+              <a:t>], width=10)</a:t>
+            </a:r>
+          </a:p>
+          <a:p>
             <a:r>
               <a:rPr lang="en-GB" sz="1200" dirty="0" err="1">
                 <a:latin typeface="Courier New" panose="02070309020205020404" pitchFamily="49" charset="0"/>
                 <a:cs typeface="Courier New" panose="02070309020205020404" pitchFamily="49" charset="0"/>
               </a:rPr>
-              <a:t>f"This</a:t>
+              <a:t>draw.line</a:t>
             </a:r>
             <a:r>
               <a:rPr lang="en-GB" sz="1200" dirty="0">
                 <a:latin typeface="Courier New" panose="02070309020205020404" pitchFamily="49" charset="0"/>
                 <a:cs typeface="Courier New" panose="02070309020205020404" pitchFamily="49" charset="0"/>
               </a:rPr>
-              <a:t> image is in the {</a:t>
+              <a:t>([0, </a:t>
             </a:r>
             <a:r>
               <a:rPr lang="en-GB" sz="1200" dirty="0" err="1">
                 <a:latin typeface="Courier New" panose="02070309020205020404" pitchFamily="49" charset="0"/>
                 <a:cs typeface="Courier New" panose="02070309020205020404" pitchFamily="49" charset="0"/>
               </a:rPr>
-              <a:t>myimage.format</a:t>
+              <a:t>myimage.height</a:t>
             </a:r>
             <a:r>
               <a:rPr lang="en-GB" sz="1200" dirty="0">
                 <a:latin typeface="Courier New" panose="02070309020205020404" pitchFamily="49" charset="0"/>
                 <a:cs typeface="Courier New" panose="02070309020205020404" pitchFamily="49" charset="0"/>
               </a:rPr>
-              <a:t>} format")</a:t>
-            </a:r>
-          </a:p>
-          <a:p>
-            <a:endParaRPr lang="en-GB" sz="1400" dirty="0">
+              <a:t>, </a:t>
+            </a:r>
+            <a:r>
+              <a:rPr lang="en-GB" sz="1200" dirty="0" err="1">
+                <a:latin typeface="Courier New" panose="02070309020205020404" pitchFamily="49" charset="0"/>
+                <a:cs typeface="Courier New" panose="02070309020205020404" pitchFamily="49" charset="0"/>
+              </a:rPr>
+              <a:t>myimage.width</a:t>
+            </a:r>
+            <a:r>
+              <a:rPr lang="en-GB" sz="1200" dirty="0">
+                <a:latin typeface="Courier New" panose="02070309020205020404" pitchFamily="49" charset="0"/>
+                <a:cs typeface="Courier New" panose="02070309020205020404" pitchFamily="49" charset="0"/>
+              </a:rPr>
+              <a:t>, 0], width=10)</a:t>
+            </a:r>
+          </a:p>
+          <a:p>
+            <a:endParaRPr lang="en-GB" sz="1200" dirty="0">
               <a:latin typeface="Courier New" panose="02070309020205020404" pitchFamily="49" charset="0"/>
               <a:cs typeface="Courier New" panose="02070309020205020404" pitchFamily="49" charset="0"/>
             </a:endParaRPr>
           </a:p>
+          <a:p>
+            <a:r>
+              <a:rPr lang="en-GB" sz="1200" dirty="0" err="1">
+                <a:latin typeface="Courier New" panose="02070309020205020404" pitchFamily="49" charset="0"/>
+                <a:cs typeface="Courier New" panose="02070309020205020404" pitchFamily="49" charset="0"/>
+              </a:rPr>
+              <a:t>myimage.show</a:t>
+            </a:r>
+            <a:r>
+              <a:rPr lang="en-GB" sz="1200" dirty="0">
+                <a:latin typeface="Courier New" panose="02070309020205020404" pitchFamily="49" charset="0"/>
+                <a:cs typeface="Courier New" panose="02070309020205020404" pitchFamily="49" charset="0"/>
+              </a:rPr>
+              <a:t>()</a:t>
+            </a:r>
+          </a:p>
+          <a:p>
+            <a:endParaRPr lang="en-GB" sz="1200" dirty="0">
+              <a:latin typeface="Courier New" panose="02070309020205020404" pitchFamily="49" charset="0"/>
+              <a:cs typeface="Courier New" panose="02070309020205020404" pitchFamily="49" charset="0"/>
+            </a:endParaRPr>
+          </a:p>
         </p:txBody>
       </p:sp>
     </p:spTree>
     <p:extLst>
       <p:ext uri="{BB962C8B-B14F-4D97-AF65-F5344CB8AC3E}">
-        <p14:creationId xmlns:p14="http://schemas.microsoft.com/office/powerpoint/2010/main" val="3986779043"/>
+        <p14:creationId xmlns:p14="http://schemas.microsoft.com/office/powerpoint/2010/main" val="3751857064"/>
       </p:ext>
     </p:extLst>
   </p:cSld>
@@ -12056,913 +12182,6 @@
 </file>
 
 <file path=ppt/slides/slide20.xml><?xml version="1.0" encoding="utf-8"?>
-<p:sld xmlns:a="http://schemas.openxmlformats.org/drawingml/2006/main" xmlns:r="http://schemas.openxmlformats.org/officeDocument/2006/relationships" xmlns:p="http://schemas.openxmlformats.org/presentationml/2006/main">
-  <p:cSld>
-    <p:spTree>
-      <p:nvGrpSpPr>
-        <p:cNvPr id="1" name=""/>
-        <p:cNvGrpSpPr/>
-        <p:nvPr/>
-      </p:nvGrpSpPr>
-      <p:grpSpPr>
-        <a:xfrm>
-          <a:off x="0" y="0"/>
-          <a:ext cx="0" cy="0"/>
-          <a:chOff x="0" y="0"/>
-          <a:chExt cx="0" cy="0"/>
-        </a:xfrm>
-      </p:grpSpPr>
-      <p:sp>
-        <p:nvSpPr>
-          <p:cNvPr id="2" name="Title 1"/>
-          <p:cNvSpPr>
-            <a:spLocks noGrp="1"/>
-          </p:cNvSpPr>
-          <p:nvPr>
-            <p:ph type="title"/>
-          </p:nvPr>
-        </p:nvSpPr>
-        <p:spPr/>
-        <p:txBody>
-          <a:bodyPr/>
-          <a:lstStyle/>
-          <a:p>
-            <a:r>
-              <a:rPr lang="en-GB" sz="4000" dirty="0"/>
-              <a:t>Drawing on an image.</a:t>
-            </a:r>
-          </a:p>
-        </p:txBody>
-      </p:sp>
-      <p:sp>
-        <p:nvSpPr>
-          <p:cNvPr id="3" name="Content Placeholder 2"/>
-          <p:cNvSpPr>
-            <a:spLocks noGrp="1"/>
-          </p:cNvSpPr>
-          <p:nvPr>
-            <p:ph idx="1"/>
-          </p:nvPr>
-        </p:nvSpPr>
-        <p:spPr>
-          <a:xfrm>
-            <a:off x="1103312" y="2244506"/>
-            <a:ext cx="5172360" cy="2693254"/>
-          </a:xfrm>
-        </p:spPr>
-        <p:txBody>
-          <a:bodyPr>
-            <a:normAutofit/>
-          </a:bodyPr>
-          <a:lstStyle/>
-          <a:p>
-            <a:r>
-              <a:rPr lang="en-GB" dirty="0"/>
-              <a:t>If you want to draw on the image, we need to add a "drawing layer".</a:t>
-            </a:r>
-          </a:p>
-          <a:p>
-            <a:r>
-              <a:rPr lang="en-GB" dirty="0"/>
-              <a:t>We then draw on this, and Pillow puts everything together.</a:t>
-            </a:r>
-          </a:p>
-          <a:p>
-            <a:endParaRPr lang="en-GB" dirty="0"/>
-          </a:p>
-          <a:p>
-            <a:r>
-              <a:rPr lang="en-GB" dirty="0"/>
-              <a:t>Try and work out what this program will do.</a:t>
-            </a:r>
-          </a:p>
-        </p:txBody>
-      </p:sp>
-      <p:sp>
-        <p:nvSpPr>
-          <p:cNvPr id="6" name="Content Placeholder 2"/>
-          <p:cNvSpPr txBox="1">
-            <a:spLocks/>
-          </p:cNvSpPr>
-          <p:nvPr/>
-        </p:nvSpPr>
-        <p:spPr>
-          <a:xfrm>
-            <a:off x="1103312" y="5068199"/>
-            <a:ext cx="5251622" cy="1450125"/>
-          </a:xfrm>
-          <a:prstGeom prst="rect">
-            <a:avLst/>
-          </a:prstGeom>
-        </p:spPr>
-        <p:txBody>
-          <a:bodyPr vert="horz" lIns="91440" tIns="45720" rIns="91440" bIns="45720" rtlCol="0">
-            <a:normAutofit/>
-          </a:bodyPr>
-          <a:lstStyle>
-            <a:lvl1pPr marL="342900" indent="-342900" algn="l" defTabSz="457200" rtl="0" eaLnBrk="1" latinLnBrk="0" hangingPunct="1">
-              <a:spcBef>
-                <a:spcPts val="1000"/>
-              </a:spcBef>
-              <a:spcAft>
-                <a:spcPts val="0"/>
-              </a:spcAft>
-              <a:buClr>
-                <a:schemeClr val="bg2">
-                  <a:lumMod val="40000"/>
-                  <a:lumOff val="60000"/>
-                </a:schemeClr>
-              </a:buClr>
-              <a:buSzPct val="80000"/>
-              <a:buFont typeface="Wingdings 3" charset="2"/>
-              <a:buChar char=""/>
-              <a:defRPr sz="2000" b="0" i="0" kern="1200">
-                <a:solidFill>
-                  <a:schemeClr val="tx1"/>
-                </a:solidFill>
-                <a:latin typeface="+mj-lt"/>
-                <a:ea typeface="+mj-ea"/>
-                <a:cs typeface="+mj-cs"/>
-              </a:defRPr>
-            </a:lvl1pPr>
-            <a:lvl2pPr marL="742950" indent="-285750" algn="l" defTabSz="457200" rtl="0" eaLnBrk="1" latinLnBrk="0" hangingPunct="1">
-              <a:spcBef>
-                <a:spcPts val="1000"/>
-              </a:spcBef>
-              <a:spcAft>
-                <a:spcPts val="0"/>
-              </a:spcAft>
-              <a:buClr>
-                <a:schemeClr val="bg2">
-                  <a:lumMod val="40000"/>
-                  <a:lumOff val="60000"/>
-                </a:schemeClr>
-              </a:buClr>
-              <a:buSzPct val="80000"/>
-              <a:buFont typeface="Wingdings 3" charset="2"/>
-              <a:buChar char=""/>
-              <a:defRPr sz="1800" b="0" i="0" kern="1200">
-                <a:solidFill>
-                  <a:schemeClr val="tx1"/>
-                </a:solidFill>
-                <a:latin typeface="+mj-lt"/>
-                <a:ea typeface="+mj-ea"/>
-                <a:cs typeface="+mj-cs"/>
-              </a:defRPr>
-            </a:lvl2pPr>
-            <a:lvl3pPr marL="1143000" indent="-228600" algn="l" defTabSz="457200" rtl="0" eaLnBrk="1" latinLnBrk="0" hangingPunct="1">
-              <a:spcBef>
-                <a:spcPts val="1000"/>
-              </a:spcBef>
-              <a:spcAft>
-                <a:spcPts val="0"/>
-              </a:spcAft>
-              <a:buClr>
-                <a:schemeClr val="bg2">
-                  <a:lumMod val="40000"/>
-                  <a:lumOff val="60000"/>
-                </a:schemeClr>
-              </a:buClr>
-              <a:buSzPct val="80000"/>
-              <a:buFont typeface="Wingdings 3" charset="2"/>
-              <a:buChar char=""/>
-              <a:defRPr sz="1600" b="0" i="0" kern="1200">
-                <a:solidFill>
-                  <a:schemeClr val="tx1"/>
-                </a:solidFill>
-                <a:latin typeface="+mj-lt"/>
-                <a:ea typeface="+mj-ea"/>
-                <a:cs typeface="+mj-cs"/>
-              </a:defRPr>
-            </a:lvl3pPr>
-            <a:lvl4pPr marL="1600200" indent="-228600" algn="l" defTabSz="457200" rtl="0" eaLnBrk="1" latinLnBrk="0" hangingPunct="1">
-              <a:spcBef>
-                <a:spcPts val="1000"/>
-              </a:spcBef>
-              <a:spcAft>
-                <a:spcPts val="0"/>
-              </a:spcAft>
-              <a:buClr>
-                <a:schemeClr val="bg2">
-                  <a:lumMod val="40000"/>
-                  <a:lumOff val="60000"/>
-                </a:schemeClr>
-              </a:buClr>
-              <a:buSzPct val="80000"/>
-              <a:buFont typeface="Wingdings 3" charset="2"/>
-              <a:buChar char=""/>
-              <a:defRPr sz="1400" b="0" i="0" kern="1200">
-                <a:solidFill>
-                  <a:schemeClr val="tx1"/>
-                </a:solidFill>
-                <a:latin typeface="+mj-lt"/>
-                <a:ea typeface="+mj-ea"/>
-                <a:cs typeface="+mj-cs"/>
-              </a:defRPr>
-            </a:lvl4pPr>
-            <a:lvl5pPr marL="2057400" indent="-228600" algn="l" defTabSz="457200" rtl="0" eaLnBrk="1" latinLnBrk="0" hangingPunct="1">
-              <a:spcBef>
-                <a:spcPts val="1000"/>
-              </a:spcBef>
-              <a:spcAft>
-                <a:spcPts val="0"/>
-              </a:spcAft>
-              <a:buClr>
-                <a:schemeClr val="bg2">
-                  <a:lumMod val="40000"/>
-                  <a:lumOff val="60000"/>
-                </a:schemeClr>
-              </a:buClr>
-              <a:buSzPct val="80000"/>
-              <a:buFont typeface="Wingdings 3" charset="2"/>
-              <a:buChar char=""/>
-              <a:defRPr sz="1400" b="0" i="0" kern="1200">
-                <a:solidFill>
-                  <a:schemeClr val="tx1"/>
-                </a:solidFill>
-                <a:latin typeface="+mj-lt"/>
-                <a:ea typeface="+mj-ea"/>
-                <a:cs typeface="+mj-cs"/>
-              </a:defRPr>
-            </a:lvl5pPr>
-            <a:lvl6pPr marL="2506000" indent="-228600" algn="l" defTabSz="457200" rtl="0" eaLnBrk="1" latinLnBrk="0" hangingPunct="1">
-              <a:spcBef>
-                <a:spcPts val="1000"/>
-              </a:spcBef>
-              <a:spcAft>
-                <a:spcPts val="0"/>
-              </a:spcAft>
-              <a:buClr>
-                <a:schemeClr val="bg2">
-                  <a:lumMod val="40000"/>
-                  <a:lumOff val="60000"/>
-                </a:schemeClr>
-              </a:buClr>
-              <a:buSzPct val="80000"/>
-              <a:buFont typeface="Wingdings 3" charset="2"/>
-              <a:buChar char=""/>
-              <a:defRPr sz="1400" b="0" i="0" kern="1200">
-                <a:solidFill>
-                  <a:schemeClr val="tx1"/>
-                </a:solidFill>
-                <a:latin typeface="+mj-lt"/>
-                <a:ea typeface="+mj-ea"/>
-                <a:cs typeface="+mj-cs"/>
-              </a:defRPr>
-            </a:lvl6pPr>
-            <a:lvl7pPr marL="2971800" indent="-228600" algn="l" defTabSz="457200" rtl="0" eaLnBrk="1" latinLnBrk="0" hangingPunct="1">
-              <a:spcBef>
-                <a:spcPts val="1000"/>
-              </a:spcBef>
-              <a:spcAft>
-                <a:spcPts val="0"/>
-              </a:spcAft>
-              <a:buClr>
-                <a:schemeClr val="bg2">
-                  <a:lumMod val="40000"/>
-                  <a:lumOff val="60000"/>
-                </a:schemeClr>
-              </a:buClr>
-              <a:buSzPct val="80000"/>
-              <a:buFont typeface="Wingdings 3" charset="2"/>
-              <a:buChar char=""/>
-              <a:defRPr sz="1400" b="0" i="0" kern="1200">
-                <a:solidFill>
-                  <a:schemeClr val="tx1"/>
-                </a:solidFill>
-                <a:latin typeface="+mj-lt"/>
-                <a:ea typeface="+mj-ea"/>
-                <a:cs typeface="+mj-cs"/>
-              </a:defRPr>
-            </a:lvl7pPr>
-            <a:lvl8pPr marL="3429000" indent="-228600" algn="l" defTabSz="457200" rtl="0" eaLnBrk="1" latinLnBrk="0" hangingPunct="1">
-              <a:spcBef>
-                <a:spcPts val="1000"/>
-              </a:spcBef>
-              <a:spcAft>
-                <a:spcPts val="0"/>
-              </a:spcAft>
-              <a:buClr>
-                <a:schemeClr val="bg2">
-                  <a:lumMod val="40000"/>
-                  <a:lumOff val="60000"/>
-                </a:schemeClr>
-              </a:buClr>
-              <a:buSzPct val="80000"/>
-              <a:buFont typeface="Wingdings 3" charset="2"/>
-              <a:buChar char=""/>
-              <a:defRPr sz="1400" b="0" i="0" kern="1200">
-                <a:solidFill>
-                  <a:schemeClr val="tx1"/>
-                </a:solidFill>
-                <a:latin typeface="+mj-lt"/>
-                <a:ea typeface="+mj-ea"/>
-                <a:cs typeface="+mj-cs"/>
-              </a:defRPr>
-            </a:lvl8pPr>
-            <a:lvl9pPr marL="3886200" indent="-228600" algn="l" defTabSz="457200" rtl="0" eaLnBrk="1" latinLnBrk="0" hangingPunct="1">
-              <a:spcBef>
-                <a:spcPts val="1000"/>
-              </a:spcBef>
-              <a:spcAft>
-                <a:spcPts val="0"/>
-              </a:spcAft>
-              <a:buClr>
-                <a:schemeClr val="bg2">
-                  <a:lumMod val="40000"/>
-                  <a:lumOff val="60000"/>
-                </a:schemeClr>
-              </a:buClr>
-              <a:buSzPct val="80000"/>
-              <a:buFont typeface="Wingdings 3" charset="2"/>
-              <a:buChar char=""/>
-              <a:defRPr sz="1400" b="0" i="0" kern="1200">
-                <a:solidFill>
-                  <a:schemeClr val="tx1"/>
-                </a:solidFill>
-                <a:latin typeface="+mj-lt"/>
-                <a:ea typeface="+mj-ea"/>
-                <a:cs typeface="+mj-cs"/>
-              </a:defRPr>
-            </a:lvl9pPr>
-          </a:lstStyle>
-          <a:p>
-            <a:r>
-              <a:rPr lang="en-GB" dirty="0">
-                <a:solidFill>
-                  <a:srgbClr val="FFFF00"/>
-                </a:solidFill>
-              </a:rPr>
-              <a:t>Task: Read this program and try and work out what it will do.</a:t>
-            </a:r>
-          </a:p>
-          <a:p>
-            <a:r>
-              <a:rPr lang="en-GB" dirty="0">
-                <a:solidFill>
-                  <a:srgbClr val="FFFF00"/>
-                </a:solidFill>
-              </a:rPr>
-              <a:t>Type it in and run it. Is that what happened ?</a:t>
-            </a:r>
-          </a:p>
-        </p:txBody>
-      </p:sp>
-      <p:sp>
-        <p:nvSpPr>
-          <p:cNvPr id="7" name="Content Placeholder 2"/>
-          <p:cNvSpPr txBox="1">
-            <a:spLocks/>
-          </p:cNvSpPr>
-          <p:nvPr/>
-        </p:nvSpPr>
-        <p:spPr>
-          <a:xfrm>
-            <a:off x="6120827" y="1377416"/>
-            <a:ext cx="5535714" cy="5140907"/>
-          </a:xfrm>
-          <a:prstGeom prst="rect">
-            <a:avLst/>
-          </a:prstGeom>
-        </p:spPr>
-        <p:txBody>
-          <a:bodyPr vert="horz" lIns="91440" tIns="45720" rIns="91440" bIns="45720" rtlCol="0">
-            <a:normAutofit/>
-          </a:bodyPr>
-          <a:lstStyle>
-            <a:lvl1pPr marL="342900" indent="-342900" algn="l" defTabSz="457200" rtl="0" eaLnBrk="1" latinLnBrk="0" hangingPunct="1">
-              <a:spcBef>
-                <a:spcPts val="1000"/>
-              </a:spcBef>
-              <a:spcAft>
-                <a:spcPts val="0"/>
-              </a:spcAft>
-              <a:buClr>
-                <a:schemeClr val="bg2">
-                  <a:lumMod val="40000"/>
-                  <a:lumOff val="60000"/>
-                </a:schemeClr>
-              </a:buClr>
-              <a:buSzPct val="80000"/>
-              <a:buFont typeface="Wingdings 3" charset="2"/>
-              <a:buChar char=""/>
-              <a:defRPr sz="2000" b="0" i="0" kern="1200">
-                <a:solidFill>
-                  <a:schemeClr val="tx1"/>
-                </a:solidFill>
-                <a:latin typeface="+mj-lt"/>
-                <a:ea typeface="+mj-ea"/>
-                <a:cs typeface="+mj-cs"/>
-              </a:defRPr>
-            </a:lvl1pPr>
-            <a:lvl2pPr marL="742950" indent="-285750" algn="l" defTabSz="457200" rtl="0" eaLnBrk="1" latinLnBrk="0" hangingPunct="1">
-              <a:spcBef>
-                <a:spcPts val="1000"/>
-              </a:spcBef>
-              <a:spcAft>
-                <a:spcPts val="0"/>
-              </a:spcAft>
-              <a:buClr>
-                <a:schemeClr val="bg2">
-                  <a:lumMod val="40000"/>
-                  <a:lumOff val="60000"/>
-                </a:schemeClr>
-              </a:buClr>
-              <a:buSzPct val="80000"/>
-              <a:buFont typeface="Wingdings 3" charset="2"/>
-              <a:buChar char=""/>
-              <a:defRPr sz="1800" b="0" i="0" kern="1200">
-                <a:solidFill>
-                  <a:schemeClr val="tx1"/>
-                </a:solidFill>
-                <a:latin typeface="+mj-lt"/>
-                <a:ea typeface="+mj-ea"/>
-                <a:cs typeface="+mj-cs"/>
-              </a:defRPr>
-            </a:lvl2pPr>
-            <a:lvl3pPr marL="1143000" indent="-228600" algn="l" defTabSz="457200" rtl="0" eaLnBrk="1" latinLnBrk="0" hangingPunct="1">
-              <a:spcBef>
-                <a:spcPts val="1000"/>
-              </a:spcBef>
-              <a:spcAft>
-                <a:spcPts val="0"/>
-              </a:spcAft>
-              <a:buClr>
-                <a:schemeClr val="bg2">
-                  <a:lumMod val="40000"/>
-                  <a:lumOff val="60000"/>
-                </a:schemeClr>
-              </a:buClr>
-              <a:buSzPct val="80000"/>
-              <a:buFont typeface="Wingdings 3" charset="2"/>
-              <a:buChar char=""/>
-              <a:defRPr sz="1600" b="0" i="0" kern="1200">
-                <a:solidFill>
-                  <a:schemeClr val="tx1"/>
-                </a:solidFill>
-                <a:latin typeface="+mj-lt"/>
-                <a:ea typeface="+mj-ea"/>
-                <a:cs typeface="+mj-cs"/>
-              </a:defRPr>
-            </a:lvl3pPr>
-            <a:lvl4pPr marL="1600200" indent="-228600" algn="l" defTabSz="457200" rtl="0" eaLnBrk="1" latinLnBrk="0" hangingPunct="1">
-              <a:spcBef>
-                <a:spcPts val="1000"/>
-              </a:spcBef>
-              <a:spcAft>
-                <a:spcPts val="0"/>
-              </a:spcAft>
-              <a:buClr>
-                <a:schemeClr val="bg2">
-                  <a:lumMod val="40000"/>
-                  <a:lumOff val="60000"/>
-                </a:schemeClr>
-              </a:buClr>
-              <a:buSzPct val="80000"/>
-              <a:buFont typeface="Wingdings 3" charset="2"/>
-              <a:buChar char=""/>
-              <a:defRPr sz="1400" b="0" i="0" kern="1200">
-                <a:solidFill>
-                  <a:schemeClr val="tx1"/>
-                </a:solidFill>
-                <a:latin typeface="+mj-lt"/>
-                <a:ea typeface="+mj-ea"/>
-                <a:cs typeface="+mj-cs"/>
-              </a:defRPr>
-            </a:lvl4pPr>
-            <a:lvl5pPr marL="2057400" indent="-228600" algn="l" defTabSz="457200" rtl="0" eaLnBrk="1" latinLnBrk="0" hangingPunct="1">
-              <a:spcBef>
-                <a:spcPts val="1000"/>
-              </a:spcBef>
-              <a:spcAft>
-                <a:spcPts val="0"/>
-              </a:spcAft>
-              <a:buClr>
-                <a:schemeClr val="bg2">
-                  <a:lumMod val="40000"/>
-                  <a:lumOff val="60000"/>
-                </a:schemeClr>
-              </a:buClr>
-              <a:buSzPct val="80000"/>
-              <a:buFont typeface="Wingdings 3" charset="2"/>
-              <a:buChar char=""/>
-              <a:defRPr sz="1400" b="0" i="0" kern="1200">
-                <a:solidFill>
-                  <a:schemeClr val="tx1"/>
-                </a:solidFill>
-                <a:latin typeface="+mj-lt"/>
-                <a:ea typeface="+mj-ea"/>
-                <a:cs typeface="+mj-cs"/>
-              </a:defRPr>
-            </a:lvl5pPr>
-            <a:lvl6pPr marL="2506000" indent="-228600" algn="l" defTabSz="457200" rtl="0" eaLnBrk="1" latinLnBrk="0" hangingPunct="1">
-              <a:spcBef>
-                <a:spcPts val="1000"/>
-              </a:spcBef>
-              <a:spcAft>
-                <a:spcPts val="0"/>
-              </a:spcAft>
-              <a:buClr>
-                <a:schemeClr val="bg2">
-                  <a:lumMod val="40000"/>
-                  <a:lumOff val="60000"/>
-                </a:schemeClr>
-              </a:buClr>
-              <a:buSzPct val="80000"/>
-              <a:buFont typeface="Wingdings 3" charset="2"/>
-              <a:buChar char=""/>
-              <a:defRPr sz="1400" b="0" i="0" kern="1200">
-                <a:solidFill>
-                  <a:schemeClr val="tx1"/>
-                </a:solidFill>
-                <a:latin typeface="+mj-lt"/>
-                <a:ea typeface="+mj-ea"/>
-                <a:cs typeface="+mj-cs"/>
-              </a:defRPr>
-            </a:lvl6pPr>
-            <a:lvl7pPr marL="2971800" indent="-228600" algn="l" defTabSz="457200" rtl="0" eaLnBrk="1" latinLnBrk="0" hangingPunct="1">
-              <a:spcBef>
-                <a:spcPts val="1000"/>
-              </a:spcBef>
-              <a:spcAft>
-                <a:spcPts val="0"/>
-              </a:spcAft>
-              <a:buClr>
-                <a:schemeClr val="bg2">
-                  <a:lumMod val="40000"/>
-                  <a:lumOff val="60000"/>
-                </a:schemeClr>
-              </a:buClr>
-              <a:buSzPct val="80000"/>
-              <a:buFont typeface="Wingdings 3" charset="2"/>
-              <a:buChar char=""/>
-              <a:defRPr sz="1400" b="0" i="0" kern="1200">
-                <a:solidFill>
-                  <a:schemeClr val="tx1"/>
-                </a:solidFill>
-                <a:latin typeface="+mj-lt"/>
-                <a:ea typeface="+mj-ea"/>
-                <a:cs typeface="+mj-cs"/>
-              </a:defRPr>
-            </a:lvl7pPr>
-            <a:lvl8pPr marL="3429000" indent="-228600" algn="l" defTabSz="457200" rtl="0" eaLnBrk="1" latinLnBrk="0" hangingPunct="1">
-              <a:spcBef>
-                <a:spcPts val="1000"/>
-              </a:spcBef>
-              <a:spcAft>
-                <a:spcPts val="0"/>
-              </a:spcAft>
-              <a:buClr>
-                <a:schemeClr val="bg2">
-                  <a:lumMod val="40000"/>
-                  <a:lumOff val="60000"/>
-                </a:schemeClr>
-              </a:buClr>
-              <a:buSzPct val="80000"/>
-              <a:buFont typeface="Wingdings 3" charset="2"/>
-              <a:buChar char=""/>
-              <a:defRPr sz="1400" b="0" i="0" kern="1200">
-                <a:solidFill>
-                  <a:schemeClr val="tx1"/>
-                </a:solidFill>
-                <a:latin typeface="+mj-lt"/>
-                <a:ea typeface="+mj-ea"/>
-                <a:cs typeface="+mj-cs"/>
-              </a:defRPr>
-            </a:lvl8pPr>
-            <a:lvl9pPr marL="3886200" indent="-228600" algn="l" defTabSz="457200" rtl="0" eaLnBrk="1" latinLnBrk="0" hangingPunct="1">
-              <a:spcBef>
-                <a:spcPts val="1000"/>
-              </a:spcBef>
-              <a:spcAft>
-                <a:spcPts val="0"/>
-              </a:spcAft>
-              <a:buClr>
-                <a:schemeClr val="bg2">
-                  <a:lumMod val="40000"/>
-                  <a:lumOff val="60000"/>
-                </a:schemeClr>
-              </a:buClr>
-              <a:buSzPct val="80000"/>
-              <a:buFont typeface="Wingdings 3" charset="2"/>
-              <a:buChar char=""/>
-              <a:defRPr sz="1400" b="0" i="0" kern="1200">
-                <a:solidFill>
-                  <a:schemeClr val="tx1"/>
-                </a:solidFill>
-                <a:latin typeface="+mj-lt"/>
-                <a:ea typeface="+mj-ea"/>
-                <a:cs typeface="+mj-cs"/>
-              </a:defRPr>
-            </a:lvl9pPr>
-          </a:lstStyle>
-          <a:p>
-            <a:pPr marL="0" indent="0">
-              <a:buNone/>
-            </a:pPr>
-            <a:endParaRPr lang="en-GB" dirty="0"/>
-          </a:p>
-        </p:txBody>
-      </p:sp>
-      <p:sp>
-        <p:nvSpPr>
-          <p:cNvPr id="5" name="Rectangle 4"/>
-          <p:cNvSpPr/>
-          <p:nvPr/>
-        </p:nvSpPr>
-        <p:spPr>
-          <a:xfrm>
-            <a:off x="6354933" y="2244506"/>
-            <a:ext cx="5705521" cy="3046988"/>
-          </a:xfrm>
-          <a:prstGeom prst="rect">
-            <a:avLst/>
-          </a:prstGeom>
-        </p:spPr>
-        <p:txBody>
-          <a:bodyPr wrap="square">
-            <a:spAutoFit/>
-          </a:bodyPr>
-          <a:lstStyle/>
-          <a:p>
-            <a:r>
-              <a:rPr lang="en-GB" sz="1200" dirty="0">
-                <a:latin typeface="Courier New" panose="02070309020205020404" pitchFamily="49" charset="0"/>
-                <a:cs typeface="Courier New" panose="02070309020205020404" pitchFamily="49" charset="0"/>
-              </a:rPr>
-              <a:t># Week6, Program7</a:t>
-            </a:r>
-          </a:p>
-          <a:p>
-            <a:endParaRPr lang="en-GB" sz="1200" dirty="0">
-              <a:latin typeface="Courier New" panose="02070309020205020404" pitchFamily="49" charset="0"/>
-              <a:cs typeface="Courier New" panose="02070309020205020404" pitchFamily="49" charset="0"/>
-            </a:endParaRPr>
-          </a:p>
-          <a:p>
-            <a:r>
-              <a:rPr lang="en-GB" sz="1200" dirty="0">
-                <a:latin typeface="Courier New" panose="02070309020205020404" pitchFamily="49" charset="0"/>
-                <a:cs typeface="Courier New" panose="02070309020205020404" pitchFamily="49" charset="0"/>
-              </a:rPr>
-              <a:t>from PIL import Image, </a:t>
-            </a:r>
-            <a:r>
-              <a:rPr lang="en-GB" sz="1200" dirty="0" err="1">
-                <a:latin typeface="Courier New" panose="02070309020205020404" pitchFamily="49" charset="0"/>
-                <a:cs typeface="Courier New" panose="02070309020205020404" pitchFamily="49" charset="0"/>
-              </a:rPr>
-              <a:t>ImageDraw</a:t>
-            </a:r>
-            <a:endParaRPr lang="en-GB" sz="1200" dirty="0">
-              <a:latin typeface="Courier New" panose="02070309020205020404" pitchFamily="49" charset="0"/>
-              <a:cs typeface="Courier New" panose="02070309020205020404" pitchFamily="49" charset="0"/>
-            </a:endParaRPr>
-          </a:p>
-          <a:p>
-            <a:endParaRPr lang="en-GB" sz="1200" dirty="0">
-              <a:latin typeface="Courier New" panose="02070309020205020404" pitchFamily="49" charset="0"/>
-              <a:cs typeface="Courier New" panose="02070309020205020404" pitchFamily="49" charset="0"/>
-            </a:endParaRPr>
-          </a:p>
-          <a:p>
-            <a:r>
-              <a:rPr lang="en-GB" sz="1200" dirty="0">
-                <a:latin typeface="Courier New" panose="02070309020205020404" pitchFamily="49" charset="0"/>
-                <a:cs typeface="Courier New" panose="02070309020205020404" pitchFamily="49" charset="0"/>
-              </a:rPr>
-              <a:t># Load the image from disk.</a:t>
-            </a:r>
-          </a:p>
-          <a:p>
-            <a:r>
-              <a:rPr lang="en-GB" sz="1200" dirty="0" err="1">
-                <a:latin typeface="Courier New" panose="02070309020205020404" pitchFamily="49" charset="0"/>
-                <a:cs typeface="Courier New" panose="02070309020205020404" pitchFamily="49" charset="0"/>
-              </a:rPr>
-              <a:t>myimage</a:t>
-            </a:r>
-            <a:r>
-              <a:rPr lang="en-GB" sz="1200" dirty="0">
-                <a:latin typeface="Courier New" panose="02070309020205020404" pitchFamily="49" charset="0"/>
-                <a:cs typeface="Courier New" panose="02070309020205020404" pitchFamily="49" charset="0"/>
-              </a:rPr>
-              <a:t> = </a:t>
-            </a:r>
-            <a:r>
-              <a:rPr lang="en-GB" sz="1200" dirty="0" err="1">
-                <a:latin typeface="Courier New" panose="02070309020205020404" pitchFamily="49" charset="0"/>
-                <a:cs typeface="Courier New" panose="02070309020205020404" pitchFamily="49" charset="0"/>
-              </a:rPr>
-              <a:t>Image.open</a:t>
-            </a:r>
-            <a:r>
-              <a:rPr lang="en-GB" sz="1200" dirty="0">
-                <a:latin typeface="Courier New" panose="02070309020205020404" pitchFamily="49" charset="0"/>
-                <a:cs typeface="Courier New" panose="02070309020205020404" pitchFamily="49" charset="0"/>
-              </a:rPr>
-              <a:t>("london.jpg")</a:t>
-            </a:r>
-          </a:p>
-          <a:p>
-            <a:endParaRPr lang="en-GB" sz="1200" dirty="0">
-              <a:latin typeface="Courier New" panose="02070309020205020404" pitchFamily="49" charset="0"/>
-              <a:cs typeface="Courier New" panose="02070309020205020404" pitchFamily="49" charset="0"/>
-            </a:endParaRPr>
-          </a:p>
-          <a:p>
-            <a:r>
-              <a:rPr lang="en-GB" sz="1200" dirty="0">
-                <a:latin typeface="Courier New" panose="02070309020205020404" pitchFamily="49" charset="0"/>
-                <a:cs typeface="Courier New" panose="02070309020205020404" pitchFamily="49" charset="0"/>
-              </a:rPr>
-              <a:t># Create the drawing layer so we can draw on it.</a:t>
-            </a:r>
-          </a:p>
-          <a:p>
-            <a:r>
-              <a:rPr lang="en-GB" sz="1200" dirty="0">
-                <a:latin typeface="Courier New" panose="02070309020205020404" pitchFamily="49" charset="0"/>
-                <a:cs typeface="Courier New" panose="02070309020205020404" pitchFamily="49" charset="0"/>
-              </a:rPr>
-              <a:t>draw = </a:t>
-            </a:r>
-            <a:r>
-              <a:rPr lang="en-GB" sz="1200" dirty="0" err="1">
-                <a:latin typeface="Courier New" panose="02070309020205020404" pitchFamily="49" charset="0"/>
-                <a:cs typeface="Courier New" panose="02070309020205020404" pitchFamily="49" charset="0"/>
-              </a:rPr>
-              <a:t>ImageDraw.Draw</a:t>
-            </a:r>
-            <a:r>
-              <a:rPr lang="en-GB" sz="1200" dirty="0">
-                <a:latin typeface="Courier New" panose="02070309020205020404" pitchFamily="49" charset="0"/>
-                <a:cs typeface="Courier New" panose="02070309020205020404" pitchFamily="49" charset="0"/>
-              </a:rPr>
-              <a:t>(</a:t>
-            </a:r>
-            <a:r>
-              <a:rPr lang="en-GB" sz="1200" dirty="0" err="1">
-                <a:latin typeface="Courier New" panose="02070309020205020404" pitchFamily="49" charset="0"/>
-                <a:cs typeface="Courier New" panose="02070309020205020404" pitchFamily="49" charset="0"/>
-              </a:rPr>
-              <a:t>myimage</a:t>
-            </a:r>
-            <a:r>
-              <a:rPr lang="en-GB" sz="1200" dirty="0">
-                <a:latin typeface="Courier New" panose="02070309020205020404" pitchFamily="49" charset="0"/>
-                <a:cs typeface="Courier New" panose="02070309020205020404" pitchFamily="49" charset="0"/>
-              </a:rPr>
-              <a:t>)</a:t>
-            </a:r>
-          </a:p>
-          <a:p>
-            <a:endParaRPr lang="en-GB" sz="1200" dirty="0">
-              <a:latin typeface="Courier New" panose="02070309020205020404" pitchFamily="49" charset="0"/>
-              <a:cs typeface="Courier New" panose="02070309020205020404" pitchFamily="49" charset="0"/>
-            </a:endParaRPr>
-          </a:p>
-          <a:p>
-            <a:r>
-              <a:rPr lang="en-GB" sz="1200" dirty="0">
-                <a:latin typeface="Courier New" panose="02070309020205020404" pitchFamily="49" charset="0"/>
-                <a:cs typeface="Courier New" panose="02070309020205020404" pitchFamily="49" charset="0"/>
-              </a:rPr>
-              <a:t># Draw two lines</a:t>
-            </a:r>
-          </a:p>
-          <a:p>
-            <a:r>
-              <a:rPr lang="en-GB" sz="1200" dirty="0" err="1">
-                <a:latin typeface="Courier New" panose="02070309020205020404" pitchFamily="49" charset="0"/>
-                <a:cs typeface="Courier New" panose="02070309020205020404" pitchFamily="49" charset="0"/>
-              </a:rPr>
-              <a:t>draw.line</a:t>
-            </a:r>
-            <a:r>
-              <a:rPr lang="en-GB" sz="1200" dirty="0">
-                <a:latin typeface="Courier New" panose="02070309020205020404" pitchFamily="49" charset="0"/>
-                <a:cs typeface="Courier New" panose="02070309020205020404" pitchFamily="49" charset="0"/>
-              </a:rPr>
-              <a:t>([0, 0, </a:t>
-            </a:r>
-            <a:r>
-              <a:rPr lang="en-GB" sz="1200" dirty="0" err="1">
-                <a:latin typeface="Courier New" panose="02070309020205020404" pitchFamily="49" charset="0"/>
-                <a:cs typeface="Courier New" panose="02070309020205020404" pitchFamily="49" charset="0"/>
-              </a:rPr>
-              <a:t>myimage.width</a:t>
-            </a:r>
-            <a:r>
-              <a:rPr lang="en-GB" sz="1200" dirty="0">
-                <a:latin typeface="Courier New" panose="02070309020205020404" pitchFamily="49" charset="0"/>
-                <a:cs typeface="Courier New" panose="02070309020205020404" pitchFamily="49" charset="0"/>
-              </a:rPr>
-              <a:t>, </a:t>
-            </a:r>
-            <a:r>
-              <a:rPr lang="en-GB" sz="1200" dirty="0" err="1">
-                <a:latin typeface="Courier New" panose="02070309020205020404" pitchFamily="49" charset="0"/>
-                <a:cs typeface="Courier New" panose="02070309020205020404" pitchFamily="49" charset="0"/>
-              </a:rPr>
-              <a:t>myimage.height</a:t>
-            </a:r>
-            <a:r>
-              <a:rPr lang="en-GB" sz="1200" dirty="0">
-                <a:latin typeface="Courier New" panose="02070309020205020404" pitchFamily="49" charset="0"/>
-                <a:cs typeface="Courier New" panose="02070309020205020404" pitchFamily="49" charset="0"/>
-              </a:rPr>
-              <a:t>], width=10)</a:t>
-            </a:r>
-          </a:p>
-          <a:p>
-            <a:r>
-              <a:rPr lang="en-GB" sz="1200" dirty="0" err="1">
-                <a:latin typeface="Courier New" panose="02070309020205020404" pitchFamily="49" charset="0"/>
-                <a:cs typeface="Courier New" panose="02070309020205020404" pitchFamily="49" charset="0"/>
-              </a:rPr>
-              <a:t>draw.line</a:t>
-            </a:r>
-            <a:r>
-              <a:rPr lang="en-GB" sz="1200" dirty="0">
-                <a:latin typeface="Courier New" panose="02070309020205020404" pitchFamily="49" charset="0"/>
-                <a:cs typeface="Courier New" panose="02070309020205020404" pitchFamily="49" charset="0"/>
-              </a:rPr>
-              <a:t>([0, </a:t>
-            </a:r>
-            <a:r>
-              <a:rPr lang="en-GB" sz="1200" dirty="0" err="1">
-                <a:latin typeface="Courier New" panose="02070309020205020404" pitchFamily="49" charset="0"/>
-                <a:cs typeface="Courier New" panose="02070309020205020404" pitchFamily="49" charset="0"/>
-              </a:rPr>
-              <a:t>myimage.height</a:t>
-            </a:r>
-            <a:r>
-              <a:rPr lang="en-GB" sz="1200" dirty="0">
-                <a:latin typeface="Courier New" panose="02070309020205020404" pitchFamily="49" charset="0"/>
-                <a:cs typeface="Courier New" panose="02070309020205020404" pitchFamily="49" charset="0"/>
-              </a:rPr>
-              <a:t>, </a:t>
-            </a:r>
-            <a:r>
-              <a:rPr lang="en-GB" sz="1200" dirty="0" err="1">
-                <a:latin typeface="Courier New" panose="02070309020205020404" pitchFamily="49" charset="0"/>
-                <a:cs typeface="Courier New" panose="02070309020205020404" pitchFamily="49" charset="0"/>
-              </a:rPr>
-              <a:t>myimage.width</a:t>
-            </a:r>
-            <a:r>
-              <a:rPr lang="en-GB" sz="1200" dirty="0">
-                <a:latin typeface="Courier New" panose="02070309020205020404" pitchFamily="49" charset="0"/>
-                <a:cs typeface="Courier New" panose="02070309020205020404" pitchFamily="49" charset="0"/>
-              </a:rPr>
-              <a:t>, 0], width=10)</a:t>
-            </a:r>
-          </a:p>
-          <a:p>
-            <a:endParaRPr lang="en-GB" sz="1200" dirty="0">
-              <a:latin typeface="Courier New" panose="02070309020205020404" pitchFamily="49" charset="0"/>
-              <a:cs typeface="Courier New" panose="02070309020205020404" pitchFamily="49" charset="0"/>
-            </a:endParaRPr>
-          </a:p>
-          <a:p>
-            <a:r>
-              <a:rPr lang="en-GB" sz="1200" dirty="0" err="1">
-                <a:latin typeface="Courier New" panose="02070309020205020404" pitchFamily="49" charset="0"/>
-                <a:cs typeface="Courier New" panose="02070309020205020404" pitchFamily="49" charset="0"/>
-              </a:rPr>
-              <a:t>myimage.show</a:t>
-            </a:r>
-            <a:r>
-              <a:rPr lang="en-GB" sz="1200" dirty="0">
-                <a:latin typeface="Courier New" panose="02070309020205020404" pitchFamily="49" charset="0"/>
-                <a:cs typeface="Courier New" panose="02070309020205020404" pitchFamily="49" charset="0"/>
-              </a:rPr>
-              <a:t>()</a:t>
-            </a:r>
-          </a:p>
-          <a:p>
-            <a:endParaRPr lang="en-GB" sz="1200" dirty="0">
-              <a:latin typeface="Courier New" panose="02070309020205020404" pitchFamily="49" charset="0"/>
-              <a:cs typeface="Courier New" panose="02070309020205020404" pitchFamily="49" charset="0"/>
-            </a:endParaRPr>
-          </a:p>
-        </p:txBody>
-      </p:sp>
-    </p:spTree>
-    <p:extLst>
-      <p:ext uri="{BB962C8B-B14F-4D97-AF65-F5344CB8AC3E}">
-        <p14:creationId xmlns:p14="http://schemas.microsoft.com/office/powerpoint/2010/main" val="3751857064"/>
-      </p:ext>
-    </p:extLst>
-  </p:cSld>
-  <p:clrMapOvr>
-    <a:masterClrMapping/>
-  </p:clrMapOvr>
-</p:sld>
-</file>
-
-<file path=ppt/slides/slide21.xml><?xml version="1.0" encoding="utf-8"?>
 <p:sld xmlns:a="http://schemas.openxmlformats.org/drawingml/2006/main" xmlns:r="http://schemas.openxmlformats.org/officeDocument/2006/relationships" xmlns:p="http://schemas.openxmlformats.org/presentationml/2006/main">
   <p:cSld>
     <p:spTree>

</xml_diff>

<commit_message>
Fixed a few things in week6.
</commit_message>
<xml_diff>
--- a/week6/week6.pptx
+++ b/week6/week6.pptx
@@ -25,6 +25,10 @@
     <p:sldId id="289" r:id="rId19"/>
     <p:sldId id="290" r:id="rId20"/>
     <p:sldId id="291" r:id="rId21"/>
+    <p:sldId id="295" r:id="rId22"/>
+    <p:sldId id="292" r:id="rId23"/>
+    <p:sldId id="293" r:id="rId24"/>
+    <p:sldId id="294" r:id="rId25"/>
   </p:sldIdLst>
   <p:sldSz cx="12192000" cy="6858000"/>
   <p:notesSz cx="6858000" cy="9144000"/>
@@ -156,13 +160,15 @@
             <p14:sldId id="289"/>
             <p14:sldId id="290"/>
             <p14:sldId id="291"/>
+            <p14:sldId id="295"/>
           </p14:sldIdLst>
         </p14:section>
-        <p14:section name="Working With Files" id="{3918F019-2938-49CC-8203-64A62C04FE53}">
-          <p14:sldIdLst/>
-        </p14:section>
         <p14:section name="Homework" id="{725C054A-A747-4480-B224-C761049E2A50}">
-          <p14:sldIdLst/>
+          <p14:sldIdLst>
+            <p14:sldId id="292"/>
+            <p14:sldId id="293"/>
+            <p14:sldId id="294"/>
+          </p14:sldIdLst>
         </p14:section>
         <p14:section name="Next Week" id="{78F99416-6265-4D78-B4A2-14FB48A416B8}">
           <p14:sldIdLst/>
@@ -362,7 +368,7 @@
           <a:p>
             <a:fld id="{4AAD347D-5ACD-4C99-B74B-A9C85AD731AF}" type="datetimeFigureOut">
               <a:rPr lang="en-US" dirty="0"/>
-              <a:t>7/2/2018</a:t>
+              <a:t>7/3/2018</a:t>
             </a:fld>
             <a:endParaRPr lang="en-US" dirty="0"/>
           </a:p>
@@ -632,7 +638,7 @@
           <a:p>
             <a:fld id="{4509A250-FF31-4206-8172-F9D3106AACB1}" type="datetimeFigureOut">
               <a:rPr lang="en-US" dirty="0"/>
-              <a:t>7/2/2018</a:t>
+              <a:t>7/3/2018</a:t>
             </a:fld>
             <a:endParaRPr lang="en-US" dirty="0"/>
           </a:p>
@@ -821,7 +827,7 @@
           <a:p>
             <a:fld id="{4509A250-FF31-4206-8172-F9D3106AACB1}" type="datetimeFigureOut">
               <a:rPr lang="en-US" dirty="0"/>
-              <a:t>7/2/2018</a:t>
+              <a:t>7/3/2018</a:t>
             </a:fld>
             <a:endParaRPr lang="en-US" dirty="0"/>
           </a:p>
@@ -1089,7 +1095,7 @@
           <a:p>
             <a:fld id="{4509A250-FF31-4206-8172-F9D3106AACB1}" type="datetimeFigureOut">
               <a:rPr lang="en-US" dirty="0"/>
-              <a:t>7/2/2018</a:t>
+              <a:t>7/3/2018</a:t>
             </a:fld>
             <a:endParaRPr lang="en-US" dirty="0"/>
           </a:p>
@@ -1425,7 +1431,7 @@
           <a:p>
             <a:fld id="{4509A250-FF31-4206-8172-F9D3106AACB1}" type="datetimeFigureOut">
               <a:rPr lang="en-US" dirty="0"/>
-              <a:t>7/2/2018</a:t>
+              <a:t>7/3/2018</a:t>
             </a:fld>
             <a:endParaRPr lang="en-US" dirty="0"/>
           </a:p>
@@ -2043,7 +2049,7 @@
           <a:p>
             <a:fld id="{4509A250-FF31-4206-8172-F9D3106AACB1}" type="datetimeFigureOut">
               <a:rPr lang="en-US" dirty="0"/>
-              <a:t>7/2/2018</a:t>
+              <a:t>7/3/2018</a:t>
             </a:fld>
             <a:endParaRPr lang="en-US" dirty="0"/>
           </a:p>
@@ -2898,7 +2904,7 @@
           <a:p>
             <a:fld id="{4509A250-FF31-4206-8172-F9D3106AACB1}" type="datetimeFigureOut">
               <a:rPr lang="en-US" dirty="0"/>
-              <a:t>7/2/2018</a:t>
+              <a:t>7/3/2018</a:t>
             </a:fld>
             <a:endParaRPr lang="en-US" dirty="0"/>
           </a:p>
@@ -3063,7 +3069,7 @@
           <a:p>
             <a:fld id="{4509A250-FF31-4206-8172-F9D3106AACB1}" type="datetimeFigureOut">
               <a:rPr lang="en-US" dirty="0"/>
-              <a:t>7/2/2018</a:t>
+              <a:t>7/3/2018</a:t>
             </a:fld>
             <a:endParaRPr lang="en-US" dirty="0"/>
           </a:p>
@@ -3238,7 +3244,7 @@
           <a:p>
             <a:fld id="{4509A250-FF31-4206-8172-F9D3106AACB1}" type="datetimeFigureOut">
               <a:rPr lang="en-US" dirty="0"/>
-              <a:t>7/2/2018</a:t>
+              <a:t>7/3/2018</a:t>
             </a:fld>
             <a:endParaRPr lang="en-US" dirty="0"/>
           </a:p>
@@ -3403,7 +3409,7 @@
           <a:p>
             <a:fld id="{4509A250-FF31-4206-8172-F9D3106AACB1}" type="datetimeFigureOut">
               <a:rPr lang="en-US" dirty="0"/>
-              <a:t>7/2/2018</a:t>
+              <a:t>7/3/2018</a:t>
             </a:fld>
             <a:endParaRPr lang="en-US" dirty="0"/>
           </a:p>
@@ -3645,7 +3651,7 @@
           <a:p>
             <a:fld id="{9796027F-7875-4030-9381-8BD8C4F21935}" type="datetimeFigureOut">
               <a:rPr lang="en-US" dirty="0"/>
-              <a:t>7/2/2018</a:t>
+              <a:t>7/3/2018</a:t>
             </a:fld>
             <a:endParaRPr lang="en-US" dirty="0"/>
           </a:p>
@@ -3932,7 +3938,7 @@
           <a:p>
             <a:fld id="{9796027F-7875-4030-9381-8BD8C4F21935}" type="datetimeFigureOut">
               <a:rPr lang="en-US" dirty="0"/>
-              <a:t>7/2/2018</a:t>
+              <a:t>7/3/2018</a:t>
             </a:fld>
             <a:endParaRPr lang="en-US" dirty="0"/>
           </a:p>
@@ -4371,7 +4377,7 @@
           <a:p>
             <a:fld id="{9796027F-7875-4030-9381-8BD8C4F21935}" type="datetimeFigureOut">
               <a:rPr lang="en-US" dirty="0"/>
-              <a:t>7/2/2018</a:t>
+              <a:t>7/3/2018</a:t>
             </a:fld>
             <a:endParaRPr lang="en-US" dirty="0"/>
           </a:p>
@@ -4484,7 +4490,7 @@
           <a:p>
             <a:fld id="{4509A250-FF31-4206-8172-F9D3106AACB1}" type="datetimeFigureOut">
               <a:rPr lang="en-US" dirty="0"/>
-              <a:t>7/2/2018</a:t>
+              <a:t>7/3/2018</a:t>
             </a:fld>
             <a:endParaRPr lang="en-US" dirty="0"/>
           </a:p>
@@ -4574,7 +4580,7 @@
           <a:p>
             <a:fld id="{4509A250-FF31-4206-8172-F9D3106AACB1}" type="datetimeFigureOut">
               <a:rPr lang="en-US" dirty="0"/>
-              <a:t>7/2/2018</a:t>
+              <a:t>7/3/2018</a:t>
             </a:fld>
             <a:endParaRPr lang="en-US" dirty="0"/>
           </a:p>
@@ -4848,7 +4854,7 @@
           <a:p>
             <a:fld id="{4509A250-FF31-4206-8172-F9D3106AACB1}" type="datetimeFigureOut">
               <a:rPr lang="en-US" dirty="0"/>
-              <a:t>7/2/2018</a:t>
+              <a:t>7/3/2018</a:t>
             </a:fld>
             <a:endParaRPr lang="en-US" dirty="0"/>
           </a:p>
@@ -5118,7 +5124,7 @@
           <a:p>
             <a:fld id="{4509A250-FF31-4206-8172-F9D3106AACB1}" type="datetimeFigureOut">
               <a:rPr lang="en-US" dirty="0"/>
-              <a:t>7/2/2018</a:t>
+              <a:t>7/3/2018</a:t>
             </a:fld>
             <a:endParaRPr lang="en-US" dirty="0"/>
           </a:p>
@@ -5542,7 +5548,7 @@
           <a:p>
             <a:fld id="{4AAD347D-5ACD-4C99-B74B-A9C85AD731AF}" type="datetimeFigureOut">
               <a:rPr lang="en-US" dirty="0"/>
-              <a:t>7/2/2018</a:t>
+              <a:t>7/3/2018</a:t>
             </a:fld>
             <a:endParaRPr lang="en-US" dirty="0"/>
           </a:p>
@@ -7084,7 +7090,7 @@
         <p:spPr>
           <a:xfrm>
             <a:off x="1103313" y="2052919"/>
-            <a:ext cx="3765250" cy="2621718"/>
+            <a:ext cx="4935022" cy="2621718"/>
           </a:xfrm>
         </p:spPr>
         <p:txBody>
@@ -7093,8 +7099,15 @@
           <a:p>
             <a:r>
               <a:rPr lang="en-GB" dirty="0"/>
-              <a:t>This program should look familiar. You used it a few slides ago.</a:t>
-            </a:r>
+              <a:t>This program should look familiar. </a:t>
+            </a:r>
+            <a:r>
+              <a:rPr lang="en-GB" dirty="0" smtClean="0"/>
+              <a:t>It is exactly the same as Program1.</a:t>
+            </a:r>
+          </a:p>
+          <a:p>
+            <a:endParaRPr lang="en-GB" dirty="0"/>
           </a:p>
           <a:p>
             <a:r>
@@ -7115,7 +7128,7 @@
         <p:spPr>
           <a:xfrm>
             <a:off x="1103312" y="5068199"/>
-            <a:ext cx="5251622" cy="1450125"/>
+            <a:ext cx="6912104" cy="1450125"/>
           </a:xfrm>
           <a:prstGeom prst="rect">
             <a:avLst/>
@@ -8161,9 +8174,10 @@
           </a:p>
           <a:p>
             <a:r>
-              <a:rPr lang="en-GB" dirty="0"/>
-              <a:t>Then it manipulates the image.</a:t>
-            </a:r>
+              <a:rPr lang="en-GB" dirty="0" smtClean="0"/>
+              <a:t>Then it just displays it.</a:t>
+            </a:r>
+            <a:endParaRPr lang="en-GB" dirty="0"/>
           </a:p>
         </p:txBody>
       </p:sp>
@@ -8702,7 +8716,7 @@
         <p:spPr>
           <a:xfrm>
             <a:off x="6354933" y="2244506"/>
-            <a:ext cx="5705521" cy="2062103"/>
+            <a:ext cx="5705521" cy="1815882"/>
           </a:xfrm>
           <a:prstGeom prst="rect">
             <a:avLst/>
@@ -8715,11 +8729,18 @@
           <a:lstStyle/>
           <a:p>
             <a:r>
+              <a:rPr lang="en-GB" sz="1600" dirty="0" smtClean="0">
+                <a:latin typeface="Courier New" panose="02070309020205020404" pitchFamily="49" charset="0"/>
+                <a:cs typeface="Courier New" panose="02070309020205020404" pitchFamily="49" charset="0"/>
+              </a:rPr>
+              <a:t># </a:t>
+            </a:r>
+            <a:r>
               <a:rPr lang="en-GB" sz="1600" dirty="0">
                 <a:latin typeface="Courier New" panose="02070309020205020404" pitchFamily="49" charset="0"/>
                 <a:cs typeface="Courier New" panose="02070309020205020404" pitchFamily="49" charset="0"/>
               </a:rPr>
-              <a:t># Week6, Program3</a:t>
+              <a:t>Week6, Program3</a:t>
             </a:r>
           </a:p>
           <a:p>
@@ -8779,37 +8800,7 @@
                 <a:latin typeface="Courier New" panose="02070309020205020404" pitchFamily="49" charset="0"/>
                 <a:cs typeface="Courier New" panose="02070309020205020404" pitchFamily="49" charset="0"/>
               </a:rPr>
-              <a:t>flipped_image</a:t>
-            </a:r>
-            <a:r>
-              <a:rPr lang="en-GB" sz="1600" dirty="0">
-                <a:latin typeface="Courier New" panose="02070309020205020404" pitchFamily="49" charset="0"/>
-                <a:cs typeface="Courier New" panose="02070309020205020404" pitchFamily="49" charset="0"/>
-              </a:rPr>
-              <a:t> = </a:t>
-            </a:r>
-            <a:r>
-              <a:rPr lang="en-GB" sz="1600" dirty="0" err="1">
-                <a:latin typeface="Courier New" panose="02070309020205020404" pitchFamily="49" charset="0"/>
-                <a:cs typeface="Courier New" panose="02070309020205020404" pitchFamily="49" charset="0"/>
-              </a:rPr>
-              <a:t>myimage.rotate</a:t>
-            </a:r>
-            <a:r>
-              <a:rPr lang="en-GB" sz="1600" dirty="0">
-                <a:latin typeface="Courier New" panose="02070309020205020404" pitchFamily="49" charset="0"/>
-                <a:cs typeface="Courier New" panose="02070309020205020404" pitchFamily="49" charset="0"/>
-              </a:rPr>
-              <a:t>(180)</a:t>
-            </a:r>
-          </a:p>
-          <a:p>
-            <a:r>
-              <a:rPr lang="en-GB" sz="1600" dirty="0" err="1">
-                <a:latin typeface="Courier New" panose="02070309020205020404" pitchFamily="49" charset="0"/>
-                <a:cs typeface="Courier New" panose="02070309020205020404" pitchFamily="49" charset="0"/>
-              </a:rPr>
-              <a:t>flipped_image.show</a:t>
+              <a:t>myimage.show</a:t>
             </a:r>
             <a:r>
               <a:rPr lang="en-GB" sz="1600" dirty="0">
@@ -12233,7 +12224,7 @@
         <p:spPr>
           <a:xfrm>
             <a:off x="1103312" y="2244506"/>
-            <a:ext cx="5172360" cy="2693254"/>
+            <a:ext cx="4028861" cy="2693254"/>
           </a:xfrm>
         </p:spPr>
         <p:txBody>
@@ -12303,7 +12294,7 @@
         <p:spPr>
           <a:xfrm>
             <a:off x="1103312" y="5068199"/>
-            <a:ext cx="5251622" cy="1450125"/>
+            <a:ext cx="4103002" cy="1450125"/>
           </a:xfrm>
           <a:prstGeom prst="rect">
             <a:avLst/>
@@ -12311,7 +12302,7 @@
         </p:spPr>
         <p:txBody>
           <a:bodyPr vert="horz" lIns="91440" tIns="45720" rIns="91440" bIns="45720" rtlCol="0">
-            <a:normAutofit/>
+            <a:normAutofit fontScale="92500" lnSpcReduction="20000"/>
           </a:bodyPr>
           <a:lstStyle>
             <a:lvl1pPr marL="342900" indent="-342900" algn="l" defTabSz="457200" rtl="0" eaLnBrk="1" latinLnBrk="0" hangingPunct="1">
@@ -12826,8 +12817,8 @@
         </p:nvSpPr>
         <p:spPr>
           <a:xfrm>
-            <a:off x="6354933" y="2244506"/>
-            <a:ext cx="5705521" cy="3046988"/>
+            <a:off x="5206315" y="2244506"/>
+            <a:ext cx="6854140" cy="3785652"/>
           </a:xfrm>
           <a:prstGeom prst="rect">
             <a:avLst/>
@@ -12840,11 +12831,18 @@
           <a:lstStyle/>
           <a:p>
             <a:r>
+              <a:rPr lang="en-GB" sz="1200" dirty="0" smtClean="0">
+                <a:latin typeface="Courier New" panose="02070309020205020404" pitchFamily="49" charset="0"/>
+                <a:cs typeface="Courier New" panose="02070309020205020404" pitchFamily="49" charset="0"/>
+              </a:rPr>
+              <a:t># </a:t>
+            </a:r>
+            <a:r>
               <a:rPr lang="en-GB" sz="1200" dirty="0">
                 <a:latin typeface="Courier New" panose="02070309020205020404" pitchFamily="49" charset="0"/>
                 <a:cs typeface="Courier New" panose="02070309020205020404" pitchFamily="49" charset="0"/>
               </a:rPr>
-              <a:t># Week6, Program7</a:t>
+              <a:t>Week6, Program8</a:t>
             </a:r>
           </a:p>
           <a:p>
@@ -12868,6 +12866,20 @@
               </a:rPr>
               <a:t>ImageDraw</a:t>
             </a:r>
+            <a:r>
+              <a:rPr lang="en-GB" sz="1200" dirty="0">
+                <a:latin typeface="Courier New" panose="02070309020205020404" pitchFamily="49" charset="0"/>
+                <a:cs typeface="Courier New" panose="02070309020205020404" pitchFamily="49" charset="0"/>
+              </a:rPr>
+              <a:t>, </a:t>
+            </a:r>
+            <a:r>
+              <a:rPr lang="en-GB" sz="1200" dirty="0" err="1">
+                <a:latin typeface="Courier New" panose="02070309020205020404" pitchFamily="49" charset="0"/>
+                <a:cs typeface="Courier New" panose="02070309020205020404" pitchFamily="49" charset="0"/>
+              </a:rPr>
+              <a:t>ImageFont</a:t>
+            </a:r>
             <a:endParaRPr lang="en-GB" sz="1200" dirty="0">
               <a:latin typeface="Courier New" panose="02070309020205020404" pitchFamily="49" charset="0"/>
               <a:cs typeface="Courier New" panose="02070309020205020404" pitchFamily="49" charset="0"/>
@@ -12885,7 +12897,7 @@
                 <a:latin typeface="Courier New" panose="02070309020205020404" pitchFamily="49" charset="0"/>
                 <a:cs typeface="Courier New" panose="02070309020205020404" pitchFamily="49" charset="0"/>
               </a:rPr>
-              <a:t># Load the image from disk.</a:t>
+              <a:t># Load the image.</a:t>
             </a:r>
           </a:p>
           <a:p>
@@ -12930,44 +12942,51 @@
                 <a:latin typeface="Courier New" panose="02070309020205020404" pitchFamily="49" charset="0"/>
                 <a:cs typeface="Courier New" panose="02070309020205020404" pitchFamily="49" charset="0"/>
               </a:rPr>
-              <a:t># Create the drawing layer so we can draw on it.</a:t>
-            </a:r>
-          </a:p>
-          <a:p>
+              <a:t># Load a font (The </a:t>
+            </a:r>
+            <a:r>
+              <a:rPr lang="en-GB" sz="1200" dirty="0" err="1">
+                <a:latin typeface="Courier New" panose="02070309020205020404" pitchFamily="49" charset="0"/>
+                <a:cs typeface="Courier New" panose="02070309020205020404" pitchFamily="49" charset="0"/>
+              </a:rPr>
+              <a:t>arial</a:t>
+            </a:r>
             <a:r>
               <a:rPr lang="en-GB" sz="1200" dirty="0">
                 <a:latin typeface="Courier New" panose="02070309020205020404" pitchFamily="49" charset="0"/>
                 <a:cs typeface="Courier New" panose="02070309020205020404" pitchFamily="49" charset="0"/>
               </a:rPr>
-              <a:t>draw = </a:t>
-            </a:r>
+              <a:t> font from Windows)</a:t>
+            </a:r>
+          </a:p>
+          <a:p>
             <a:r>
               <a:rPr lang="en-GB" sz="1200" dirty="0" err="1">
                 <a:latin typeface="Courier New" panose="02070309020205020404" pitchFamily="49" charset="0"/>
                 <a:cs typeface="Courier New" panose="02070309020205020404" pitchFamily="49" charset="0"/>
               </a:rPr>
-              <a:t>ImageDraw.Draw</a:t>
+              <a:t>myfont</a:t>
             </a:r>
             <a:r>
               <a:rPr lang="en-GB" sz="1200" dirty="0">
                 <a:latin typeface="Courier New" panose="02070309020205020404" pitchFamily="49" charset="0"/>
                 <a:cs typeface="Courier New" panose="02070309020205020404" pitchFamily="49" charset="0"/>
               </a:rPr>
-              <a:t>(</a:t>
+              <a:t> = </a:t>
             </a:r>
             <a:r>
               <a:rPr lang="en-GB" sz="1200" dirty="0" err="1">
                 <a:latin typeface="Courier New" panose="02070309020205020404" pitchFamily="49" charset="0"/>
                 <a:cs typeface="Courier New" panose="02070309020205020404" pitchFamily="49" charset="0"/>
               </a:rPr>
-              <a:t>myimage</a:t>
+              <a:t>ImageFont.truetype</a:t>
             </a:r>
             <a:r>
               <a:rPr lang="en-GB" sz="1200" dirty="0">
                 <a:latin typeface="Courier New" panose="02070309020205020404" pitchFamily="49" charset="0"/>
                 <a:cs typeface="Courier New" panose="02070309020205020404" pitchFamily="49" charset="0"/>
               </a:rPr>
-              <a:t>)</a:t>
+              <a:t>("arial.ttf", size=24)</a:t>
             </a:r>
           </a:p>
           <a:p>
@@ -12982,95 +13001,44 @@
                 <a:latin typeface="Courier New" panose="02070309020205020404" pitchFamily="49" charset="0"/>
                 <a:cs typeface="Courier New" panose="02070309020205020404" pitchFamily="49" charset="0"/>
               </a:rPr>
-              <a:t># Draw two lines</a:t>
-            </a:r>
-          </a:p>
-          <a:p>
+              <a:t># Get a drawing layer to draw on London</a:t>
+            </a:r>
+          </a:p>
+          <a:p>
+            <a:r>
+              <a:rPr lang="en-GB" sz="1200" dirty="0">
+                <a:latin typeface="Courier New" panose="02070309020205020404" pitchFamily="49" charset="0"/>
+                <a:cs typeface="Courier New" panose="02070309020205020404" pitchFamily="49" charset="0"/>
+              </a:rPr>
+              <a:t>dl = </a:t>
+            </a:r>
             <a:r>
               <a:rPr lang="en-GB" sz="1200" dirty="0" err="1">
                 <a:latin typeface="Courier New" panose="02070309020205020404" pitchFamily="49" charset="0"/>
                 <a:cs typeface="Courier New" panose="02070309020205020404" pitchFamily="49" charset="0"/>
               </a:rPr>
-              <a:t>draw.line</a:t>
+              <a:t>ImageDraw.Draw</a:t>
             </a:r>
             <a:r>
               <a:rPr lang="en-GB" sz="1200" dirty="0">
                 <a:latin typeface="Courier New" panose="02070309020205020404" pitchFamily="49" charset="0"/>
                 <a:cs typeface="Courier New" panose="02070309020205020404" pitchFamily="49" charset="0"/>
               </a:rPr>
-              <a:t>([0, 0, </a:t>
+              <a:t>(</a:t>
             </a:r>
             <a:r>
               <a:rPr lang="en-GB" sz="1200" dirty="0" err="1">
                 <a:latin typeface="Courier New" panose="02070309020205020404" pitchFamily="49" charset="0"/>
                 <a:cs typeface="Courier New" panose="02070309020205020404" pitchFamily="49" charset="0"/>
               </a:rPr>
-              <a:t>myimage.width</a:t>
+              <a:t>myimage</a:t>
             </a:r>
             <a:r>
               <a:rPr lang="en-GB" sz="1200" dirty="0">
                 <a:latin typeface="Courier New" panose="02070309020205020404" pitchFamily="49" charset="0"/>
                 <a:cs typeface="Courier New" panose="02070309020205020404" pitchFamily="49" charset="0"/>
               </a:rPr>
-              <a:t>, </a:t>
-            </a:r>
-            <a:r>
-              <a:rPr lang="en-GB" sz="1200" dirty="0" err="1">
-                <a:latin typeface="Courier New" panose="02070309020205020404" pitchFamily="49" charset="0"/>
-                <a:cs typeface="Courier New" panose="02070309020205020404" pitchFamily="49" charset="0"/>
-              </a:rPr>
-              <a:t>myimage.height</a:t>
-            </a:r>
-            <a:r>
-              <a:rPr lang="en-GB" sz="1200" dirty="0">
-                <a:latin typeface="Courier New" panose="02070309020205020404" pitchFamily="49" charset="0"/>
-                <a:cs typeface="Courier New" panose="02070309020205020404" pitchFamily="49" charset="0"/>
-              </a:rPr>
-              <a:t>], width=10)</a:t>
-            </a:r>
-          </a:p>
-          <a:p>
-            <a:r>
-              <a:rPr lang="en-GB" sz="1200" dirty="0" err="1">
-                <a:latin typeface="Courier New" panose="02070309020205020404" pitchFamily="49" charset="0"/>
-                <a:cs typeface="Courier New" panose="02070309020205020404" pitchFamily="49" charset="0"/>
-              </a:rPr>
-              <a:t>draw.line</a:t>
-            </a:r>
-            <a:r>
-              <a:rPr lang="en-GB" sz="1200" dirty="0">
-                <a:latin typeface="Courier New" panose="02070309020205020404" pitchFamily="49" charset="0"/>
-                <a:cs typeface="Courier New" panose="02070309020205020404" pitchFamily="49" charset="0"/>
-              </a:rPr>
-              <a:t>([0, </a:t>
-            </a:r>
-            <a:r>
-              <a:rPr lang="en-GB" sz="1200" dirty="0" err="1">
-                <a:latin typeface="Courier New" panose="02070309020205020404" pitchFamily="49" charset="0"/>
-                <a:cs typeface="Courier New" panose="02070309020205020404" pitchFamily="49" charset="0"/>
-              </a:rPr>
-              <a:t>myimage.height</a:t>
-            </a:r>
-            <a:r>
-              <a:rPr lang="en-GB" sz="1200" dirty="0">
-                <a:latin typeface="Courier New" panose="02070309020205020404" pitchFamily="49" charset="0"/>
-                <a:cs typeface="Courier New" panose="02070309020205020404" pitchFamily="49" charset="0"/>
-              </a:rPr>
-              <a:t>, </a:t>
-            </a:r>
-            <a:r>
-              <a:rPr lang="en-GB" sz="1200" dirty="0" err="1">
-                <a:latin typeface="Courier New" panose="02070309020205020404" pitchFamily="49" charset="0"/>
-                <a:cs typeface="Courier New" panose="02070309020205020404" pitchFamily="49" charset="0"/>
-              </a:rPr>
-              <a:t>myimage.width</a:t>
-            </a:r>
-            <a:r>
-              <a:rPr lang="en-GB" sz="1200" dirty="0">
-                <a:latin typeface="Courier New" panose="02070309020205020404" pitchFamily="49" charset="0"/>
-                <a:cs typeface="Courier New" panose="02070309020205020404" pitchFamily="49" charset="0"/>
-              </a:rPr>
-              <a:t>, 0], width=10)</a:t>
+              <a:t>)</a:t>
             </a:r>
           </a:p>
           <a:p>
@@ -13081,18 +13049,64 @@
           </a:p>
           <a:p>
             <a:r>
+              <a:rPr lang="en-GB" sz="1200" dirty="0">
+                <a:latin typeface="Courier New" panose="02070309020205020404" pitchFamily="49" charset="0"/>
+                <a:cs typeface="Courier New" panose="02070309020205020404" pitchFamily="49" charset="0"/>
+              </a:rPr>
+              <a:t># Draw text in the bottom left.</a:t>
+            </a:r>
+          </a:p>
+          <a:p>
+            <a:r>
               <a:rPr lang="en-GB" sz="1200" dirty="0" err="1">
                 <a:latin typeface="Courier New" panose="02070309020205020404" pitchFamily="49" charset="0"/>
                 <a:cs typeface="Courier New" panose="02070309020205020404" pitchFamily="49" charset="0"/>
               </a:rPr>
-              <a:t>myimage.show</a:t>
+              <a:t>dl.text</a:t>
             </a:r>
             <a:r>
               <a:rPr lang="en-GB" sz="1200" dirty="0">
                 <a:latin typeface="Courier New" panose="02070309020205020404" pitchFamily="49" charset="0"/>
                 <a:cs typeface="Courier New" panose="02070309020205020404" pitchFamily="49" charset="0"/>
               </a:rPr>
-              <a:t>()</a:t>
+              <a:t>((10, </a:t>
+            </a:r>
+            <a:r>
+              <a:rPr lang="en-GB" sz="1200" dirty="0" err="1">
+                <a:latin typeface="Courier New" panose="02070309020205020404" pitchFamily="49" charset="0"/>
+                <a:cs typeface="Courier New" panose="02070309020205020404" pitchFamily="49" charset="0"/>
+              </a:rPr>
+              <a:t>myimage.height</a:t>
+            </a:r>
+            <a:r>
+              <a:rPr lang="en-GB" sz="1200" dirty="0">
+                <a:latin typeface="Courier New" panose="02070309020205020404" pitchFamily="49" charset="0"/>
+                <a:cs typeface="Courier New" panose="02070309020205020404" pitchFamily="49" charset="0"/>
+              </a:rPr>
+              <a:t> - 50), "London, England",</a:t>
+            </a:r>
+          </a:p>
+          <a:p>
+            <a:r>
+              <a:rPr lang="en-GB" sz="1200" dirty="0">
+                <a:latin typeface="Courier New" panose="02070309020205020404" pitchFamily="49" charset="0"/>
+                <a:cs typeface="Courier New" panose="02070309020205020404" pitchFamily="49" charset="0"/>
+              </a:rPr>
+              <a:t>        font=</a:t>
+            </a:r>
+            <a:r>
+              <a:rPr lang="en-GB" sz="1200" dirty="0" err="1">
+                <a:latin typeface="Courier New" panose="02070309020205020404" pitchFamily="49" charset="0"/>
+                <a:cs typeface="Courier New" panose="02070309020205020404" pitchFamily="49" charset="0"/>
+              </a:rPr>
+              <a:t>myfont</a:t>
+            </a:r>
+            <a:r>
+              <a:rPr lang="en-GB" sz="1200" dirty="0">
+                <a:latin typeface="Courier New" panose="02070309020205020404" pitchFamily="49" charset="0"/>
+                <a:cs typeface="Courier New" panose="02070309020205020404" pitchFamily="49" charset="0"/>
+              </a:rPr>
+              <a:t>)</a:t>
             </a:r>
           </a:p>
           <a:p>
@@ -13101,12 +13115,1418 @@
               <a:cs typeface="Courier New" panose="02070309020205020404" pitchFamily="49" charset="0"/>
             </a:endParaRPr>
           </a:p>
+          <a:p>
+            <a:r>
+              <a:rPr lang="en-GB" sz="1200" dirty="0">
+                <a:latin typeface="Courier New" panose="02070309020205020404" pitchFamily="49" charset="0"/>
+                <a:cs typeface="Courier New" panose="02070309020205020404" pitchFamily="49" charset="0"/>
+              </a:rPr>
+              <a:t># Show the image</a:t>
+            </a:r>
+          </a:p>
+          <a:p>
+            <a:r>
+              <a:rPr lang="en-GB" sz="1200" dirty="0" err="1">
+                <a:latin typeface="Courier New" panose="02070309020205020404" pitchFamily="49" charset="0"/>
+                <a:cs typeface="Courier New" panose="02070309020205020404" pitchFamily="49" charset="0"/>
+              </a:rPr>
+              <a:t>myimage.show</a:t>
+            </a:r>
+            <a:r>
+              <a:rPr lang="en-GB" sz="1200" dirty="0">
+                <a:latin typeface="Courier New" panose="02070309020205020404" pitchFamily="49" charset="0"/>
+                <a:cs typeface="Courier New" panose="02070309020205020404" pitchFamily="49" charset="0"/>
+              </a:rPr>
+              <a:t>()</a:t>
+            </a:r>
+          </a:p>
+          <a:p>
+            <a:endParaRPr lang="en-GB" sz="1200" dirty="0">
+              <a:latin typeface="Courier New" panose="02070309020205020404" pitchFamily="49" charset="0"/>
+              <a:cs typeface="Courier New" panose="02070309020205020404" pitchFamily="49" charset="0"/>
+            </a:endParaRPr>
+          </a:p>
         </p:txBody>
       </p:sp>
     </p:spTree>
     <p:extLst>
       <p:ext uri="{BB962C8B-B14F-4D97-AF65-F5344CB8AC3E}">
         <p14:creationId xmlns:p14="http://schemas.microsoft.com/office/powerpoint/2010/main" val="2070172919"/>
+      </p:ext>
+    </p:extLst>
+  </p:cSld>
+  <p:clrMapOvr>
+    <a:masterClrMapping/>
+  </p:clrMapOvr>
+</p:sld>
+</file>
+
+<file path=ppt/slides/slide21.xml><?xml version="1.0" encoding="utf-8"?>
+<p:sld xmlns:a="http://schemas.openxmlformats.org/drawingml/2006/main" xmlns:r="http://schemas.openxmlformats.org/officeDocument/2006/relationships" xmlns:p="http://schemas.openxmlformats.org/presentationml/2006/main">
+  <p:cSld>
+    <p:spTree>
+      <p:nvGrpSpPr>
+        <p:cNvPr id="1" name=""/>
+        <p:cNvGrpSpPr/>
+        <p:nvPr/>
+      </p:nvGrpSpPr>
+      <p:grpSpPr>
+        <a:xfrm>
+          <a:off x="0" y="0"/>
+          <a:ext cx="0" cy="0"/>
+          <a:chOff x="0" y="0"/>
+          <a:chExt cx="0" cy="0"/>
+        </a:xfrm>
+      </p:grpSpPr>
+      <p:sp>
+        <p:nvSpPr>
+          <p:cNvPr id="2" name="Title 1"/>
+          <p:cNvSpPr>
+            <a:spLocks noGrp="1"/>
+          </p:cNvSpPr>
+          <p:nvPr>
+            <p:ph type="title"/>
+          </p:nvPr>
+        </p:nvSpPr>
+        <p:spPr/>
+        <p:txBody>
+          <a:bodyPr/>
+          <a:lstStyle/>
+          <a:p>
+            <a:r>
+              <a:rPr lang="en-GB" sz="4000" dirty="0" smtClean="0"/>
+              <a:t>Building an image from scratch.</a:t>
+            </a:r>
+            <a:endParaRPr lang="en-GB" sz="4000" dirty="0"/>
+          </a:p>
+        </p:txBody>
+      </p:sp>
+      <p:sp>
+        <p:nvSpPr>
+          <p:cNvPr id="3" name="Content Placeholder 2"/>
+          <p:cNvSpPr>
+            <a:spLocks noGrp="1"/>
+          </p:cNvSpPr>
+          <p:nvPr>
+            <p:ph idx="1"/>
+          </p:nvPr>
+        </p:nvSpPr>
+        <p:spPr>
+          <a:xfrm>
+            <a:off x="454526" y="1377415"/>
+            <a:ext cx="4685885" cy="3573525"/>
+          </a:xfrm>
+        </p:spPr>
+        <p:txBody>
+          <a:bodyPr>
+            <a:normAutofit/>
+          </a:bodyPr>
+          <a:lstStyle/>
+          <a:p>
+            <a:r>
+              <a:rPr lang="en-GB" dirty="0" smtClean="0"/>
+              <a:t>This program makes a new 5x5 image.</a:t>
+            </a:r>
+          </a:p>
+          <a:p>
+            <a:r>
+              <a:rPr lang="en-GB" dirty="0" smtClean="0"/>
+              <a:t>Then it colours in some pixels.</a:t>
+            </a:r>
+          </a:p>
+          <a:p>
+            <a:r>
+              <a:rPr lang="en-GB" dirty="0" smtClean="0"/>
+              <a:t>Finally it makes it larger (500x500) so you can see it.</a:t>
+            </a:r>
+            <a:endParaRPr lang="en-GB" dirty="0"/>
+          </a:p>
+        </p:txBody>
+      </p:sp>
+      <p:sp>
+        <p:nvSpPr>
+          <p:cNvPr id="6" name="Content Placeholder 2"/>
+          <p:cNvSpPr txBox="1">
+            <a:spLocks/>
+          </p:cNvSpPr>
+          <p:nvPr/>
+        </p:nvSpPr>
+        <p:spPr>
+          <a:xfrm>
+            <a:off x="454526" y="3789405"/>
+            <a:ext cx="4751788" cy="2728919"/>
+          </a:xfrm>
+          <a:prstGeom prst="rect">
+            <a:avLst/>
+          </a:prstGeom>
+        </p:spPr>
+        <p:txBody>
+          <a:bodyPr vert="horz" lIns="91440" tIns="45720" rIns="91440" bIns="45720" rtlCol="0">
+            <a:normAutofit/>
+          </a:bodyPr>
+          <a:lstStyle>
+            <a:lvl1pPr marL="342900" indent="-342900" algn="l" defTabSz="457200" rtl="0" eaLnBrk="1" latinLnBrk="0" hangingPunct="1">
+              <a:spcBef>
+                <a:spcPts val="1000"/>
+              </a:spcBef>
+              <a:spcAft>
+                <a:spcPts val="0"/>
+              </a:spcAft>
+              <a:buClr>
+                <a:schemeClr val="bg2">
+                  <a:lumMod val="40000"/>
+                  <a:lumOff val="60000"/>
+                </a:schemeClr>
+              </a:buClr>
+              <a:buSzPct val="80000"/>
+              <a:buFont typeface="Wingdings 3" charset="2"/>
+              <a:buChar char=""/>
+              <a:defRPr sz="2000" b="0" i="0" kern="1200">
+                <a:solidFill>
+                  <a:schemeClr val="tx1"/>
+                </a:solidFill>
+                <a:latin typeface="+mj-lt"/>
+                <a:ea typeface="+mj-ea"/>
+                <a:cs typeface="+mj-cs"/>
+              </a:defRPr>
+            </a:lvl1pPr>
+            <a:lvl2pPr marL="742950" indent="-285750" algn="l" defTabSz="457200" rtl="0" eaLnBrk="1" latinLnBrk="0" hangingPunct="1">
+              <a:spcBef>
+                <a:spcPts val="1000"/>
+              </a:spcBef>
+              <a:spcAft>
+                <a:spcPts val="0"/>
+              </a:spcAft>
+              <a:buClr>
+                <a:schemeClr val="bg2">
+                  <a:lumMod val="40000"/>
+                  <a:lumOff val="60000"/>
+                </a:schemeClr>
+              </a:buClr>
+              <a:buSzPct val="80000"/>
+              <a:buFont typeface="Wingdings 3" charset="2"/>
+              <a:buChar char=""/>
+              <a:defRPr sz="1800" b="0" i="0" kern="1200">
+                <a:solidFill>
+                  <a:schemeClr val="tx1"/>
+                </a:solidFill>
+                <a:latin typeface="+mj-lt"/>
+                <a:ea typeface="+mj-ea"/>
+                <a:cs typeface="+mj-cs"/>
+              </a:defRPr>
+            </a:lvl2pPr>
+            <a:lvl3pPr marL="1143000" indent="-228600" algn="l" defTabSz="457200" rtl="0" eaLnBrk="1" latinLnBrk="0" hangingPunct="1">
+              <a:spcBef>
+                <a:spcPts val="1000"/>
+              </a:spcBef>
+              <a:spcAft>
+                <a:spcPts val="0"/>
+              </a:spcAft>
+              <a:buClr>
+                <a:schemeClr val="bg2">
+                  <a:lumMod val="40000"/>
+                  <a:lumOff val="60000"/>
+                </a:schemeClr>
+              </a:buClr>
+              <a:buSzPct val="80000"/>
+              <a:buFont typeface="Wingdings 3" charset="2"/>
+              <a:buChar char=""/>
+              <a:defRPr sz="1600" b="0" i="0" kern="1200">
+                <a:solidFill>
+                  <a:schemeClr val="tx1"/>
+                </a:solidFill>
+                <a:latin typeface="+mj-lt"/>
+                <a:ea typeface="+mj-ea"/>
+                <a:cs typeface="+mj-cs"/>
+              </a:defRPr>
+            </a:lvl3pPr>
+            <a:lvl4pPr marL="1600200" indent="-228600" algn="l" defTabSz="457200" rtl="0" eaLnBrk="1" latinLnBrk="0" hangingPunct="1">
+              <a:spcBef>
+                <a:spcPts val="1000"/>
+              </a:spcBef>
+              <a:spcAft>
+                <a:spcPts val="0"/>
+              </a:spcAft>
+              <a:buClr>
+                <a:schemeClr val="bg2">
+                  <a:lumMod val="40000"/>
+                  <a:lumOff val="60000"/>
+                </a:schemeClr>
+              </a:buClr>
+              <a:buSzPct val="80000"/>
+              <a:buFont typeface="Wingdings 3" charset="2"/>
+              <a:buChar char=""/>
+              <a:defRPr sz="1400" b="0" i="0" kern="1200">
+                <a:solidFill>
+                  <a:schemeClr val="tx1"/>
+                </a:solidFill>
+                <a:latin typeface="+mj-lt"/>
+                <a:ea typeface="+mj-ea"/>
+                <a:cs typeface="+mj-cs"/>
+              </a:defRPr>
+            </a:lvl4pPr>
+            <a:lvl5pPr marL="2057400" indent="-228600" algn="l" defTabSz="457200" rtl="0" eaLnBrk="1" latinLnBrk="0" hangingPunct="1">
+              <a:spcBef>
+                <a:spcPts val="1000"/>
+              </a:spcBef>
+              <a:spcAft>
+                <a:spcPts val="0"/>
+              </a:spcAft>
+              <a:buClr>
+                <a:schemeClr val="bg2">
+                  <a:lumMod val="40000"/>
+                  <a:lumOff val="60000"/>
+                </a:schemeClr>
+              </a:buClr>
+              <a:buSzPct val="80000"/>
+              <a:buFont typeface="Wingdings 3" charset="2"/>
+              <a:buChar char=""/>
+              <a:defRPr sz="1400" b="0" i="0" kern="1200">
+                <a:solidFill>
+                  <a:schemeClr val="tx1"/>
+                </a:solidFill>
+                <a:latin typeface="+mj-lt"/>
+                <a:ea typeface="+mj-ea"/>
+                <a:cs typeface="+mj-cs"/>
+              </a:defRPr>
+            </a:lvl5pPr>
+            <a:lvl6pPr marL="2506000" indent="-228600" algn="l" defTabSz="457200" rtl="0" eaLnBrk="1" latinLnBrk="0" hangingPunct="1">
+              <a:spcBef>
+                <a:spcPts val="1000"/>
+              </a:spcBef>
+              <a:spcAft>
+                <a:spcPts val="0"/>
+              </a:spcAft>
+              <a:buClr>
+                <a:schemeClr val="bg2">
+                  <a:lumMod val="40000"/>
+                  <a:lumOff val="60000"/>
+                </a:schemeClr>
+              </a:buClr>
+              <a:buSzPct val="80000"/>
+              <a:buFont typeface="Wingdings 3" charset="2"/>
+              <a:buChar char=""/>
+              <a:defRPr sz="1400" b="0" i="0" kern="1200">
+                <a:solidFill>
+                  <a:schemeClr val="tx1"/>
+                </a:solidFill>
+                <a:latin typeface="+mj-lt"/>
+                <a:ea typeface="+mj-ea"/>
+                <a:cs typeface="+mj-cs"/>
+              </a:defRPr>
+            </a:lvl6pPr>
+            <a:lvl7pPr marL="2971800" indent="-228600" algn="l" defTabSz="457200" rtl="0" eaLnBrk="1" latinLnBrk="0" hangingPunct="1">
+              <a:spcBef>
+                <a:spcPts val="1000"/>
+              </a:spcBef>
+              <a:spcAft>
+                <a:spcPts val="0"/>
+              </a:spcAft>
+              <a:buClr>
+                <a:schemeClr val="bg2">
+                  <a:lumMod val="40000"/>
+                  <a:lumOff val="60000"/>
+                </a:schemeClr>
+              </a:buClr>
+              <a:buSzPct val="80000"/>
+              <a:buFont typeface="Wingdings 3" charset="2"/>
+              <a:buChar char=""/>
+              <a:defRPr sz="1400" b="0" i="0" kern="1200">
+                <a:solidFill>
+                  <a:schemeClr val="tx1"/>
+                </a:solidFill>
+                <a:latin typeface="+mj-lt"/>
+                <a:ea typeface="+mj-ea"/>
+                <a:cs typeface="+mj-cs"/>
+              </a:defRPr>
+            </a:lvl7pPr>
+            <a:lvl8pPr marL="3429000" indent="-228600" algn="l" defTabSz="457200" rtl="0" eaLnBrk="1" latinLnBrk="0" hangingPunct="1">
+              <a:spcBef>
+                <a:spcPts val="1000"/>
+              </a:spcBef>
+              <a:spcAft>
+                <a:spcPts val="0"/>
+              </a:spcAft>
+              <a:buClr>
+                <a:schemeClr val="bg2">
+                  <a:lumMod val="40000"/>
+                  <a:lumOff val="60000"/>
+                </a:schemeClr>
+              </a:buClr>
+              <a:buSzPct val="80000"/>
+              <a:buFont typeface="Wingdings 3" charset="2"/>
+              <a:buChar char=""/>
+              <a:defRPr sz="1400" b="0" i="0" kern="1200">
+                <a:solidFill>
+                  <a:schemeClr val="tx1"/>
+                </a:solidFill>
+                <a:latin typeface="+mj-lt"/>
+                <a:ea typeface="+mj-ea"/>
+                <a:cs typeface="+mj-cs"/>
+              </a:defRPr>
+            </a:lvl8pPr>
+            <a:lvl9pPr marL="3886200" indent="-228600" algn="l" defTabSz="457200" rtl="0" eaLnBrk="1" latinLnBrk="0" hangingPunct="1">
+              <a:spcBef>
+                <a:spcPts val="1000"/>
+              </a:spcBef>
+              <a:spcAft>
+                <a:spcPts val="0"/>
+              </a:spcAft>
+              <a:buClr>
+                <a:schemeClr val="bg2">
+                  <a:lumMod val="40000"/>
+                  <a:lumOff val="60000"/>
+                </a:schemeClr>
+              </a:buClr>
+              <a:buSzPct val="80000"/>
+              <a:buFont typeface="Wingdings 3" charset="2"/>
+              <a:buChar char=""/>
+              <a:defRPr sz="1400" b="0" i="0" kern="1200">
+                <a:solidFill>
+                  <a:schemeClr val="tx1"/>
+                </a:solidFill>
+                <a:latin typeface="+mj-lt"/>
+                <a:ea typeface="+mj-ea"/>
+                <a:cs typeface="+mj-cs"/>
+              </a:defRPr>
+            </a:lvl9pPr>
+          </a:lstStyle>
+          <a:p>
+            <a:r>
+              <a:rPr lang="en-GB" sz="1800" dirty="0" smtClean="0">
+                <a:solidFill>
+                  <a:srgbClr val="FFFF00"/>
+                </a:solidFill>
+              </a:rPr>
+              <a:t>Task: On pen and paper, try and work out what the pattern will look like when this program is run.</a:t>
+            </a:r>
+          </a:p>
+          <a:p>
+            <a:r>
+              <a:rPr lang="en-GB" sz="1800" dirty="0" smtClean="0">
+                <a:solidFill>
+                  <a:srgbClr val="FFFF00"/>
+                </a:solidFill>
+              </a:rPr>
+              <a:t>Then type it in and run it.</a:t>
+            </a:r>
+          </a:p>
+          <a:p>
+            <a:r>
+              <a:rPr lang="en-GB" sz="1800" dirty="0" smtClean="0">
+                <a:solidFill>
+                  <a:srgbClr val="FFFF00"/>
+                </a:solidFill>
+              </a:rPr>
+              <a:t>Is the pattern what you expected ?</a:t>
+            </a:r>
+            <a:endParaRPr lang="en-GB" sz="1800" dirty="0">
+              <a:solidFill>
+                <a:srgbClr val="FFFF00"/>
+              </a:solidFill>
+            </a:endParaRPr>
+          </a:p>
+        </p:txBody>
+      </p:sp>
+      <p:sp>
+        <p:nvSpPr>
+          <p:cNvPr id="7" name="Content Placeholder 2"/>
+          <p:cNvSpPr txBox="1">
+            <a:spLocks/>
+          </p:cNvSpPr>
+          <p:nvPr/>
+        </p:nvSpPr>
+        <p:spPr>
+          <a:xfrm>
+            <a:off x="6120827" y="1377416"/>
+            <a:ext cx="5535714" cy="5140907"/>
+          </a:xfrm>
+          <a:prstGeom prst="rect">
+            <a:avLst/>
+          </a:prstGeom>
+        </p:spPr>
+        <p:txBody>
+          <a:bodyPr vert="horz" lIns="91440" tIns="45720" rIns="91440" bIns="45720" rtlCol="0">
+            <a:normAutofit/>
+          </a:bodyPr>
+          <a:lstStyle>
+            <a:lvl1pPr marL="342900" indent="-342900" algn="l" defTabSz="457200" rtl="0" eaLnBrk="1" latinLnBrk="0" hangingPunct="1">
+              <a:spcBef>
+                <a:spcPts val="1000"/>
+              </a:spcBef>
+              <a:spcAft>
+                <a:spcPts val="0"/>
+              </a:spcAft>
+              <a:buClr>
+                <a:schemeClr val="bg2">
+                  <a:lumMod val="40000"/>
+                  <a:lumOff val="60000"/>
+                </a:schemeClr>
+              </a:buClr>
+              <a:buSzPct val="80000"/>
+              <a:buFont typeface="Wingdings 3" charset="2"/>
+              <a:buChar char=""/>
+              <a:defRPr sz="2000" b="0" i="0" kern="1200">
+                <a:solidFill>
+                  <a:schemeClr val="tx1"/>
+                </a:solidFill>
+                <a:latin typeface="+mj-lt"/>
+                <a:ea typeface="+mj-ea"/>
+                <a:cs typeface="+mj-cs"/>
+              </a:defRPr>
+            </a:lvl1pPr>
+            <a:lvl2pPr marL="742950" indent="-285750" algn="l" defTabSz="457200" rtl="0" eaLnBrk="1" latinLnBrk="0" hangingPunct="1">
+              <a:spcBef>
+                <a:spcPts val="1000"/>
+              </a:spcBef>
+              <a:spcAft>
+                <a:spcPts val="0"/>
+              </a:spcAft>
+              <a:buClr>
+                <a:schemeClr val="bg2">
+                  <a:lumMod val="40000"/>
+                  <a:lumOff val="60000"/>
+                </a:schemeClr>
+              </a:buClr>
+              <a:buSzPct val="80000"/>
+              <a:buFont typeface="Wingdings 3" charset="2"/>
+              <a:buChar char=""/>
+              <a:defRPr sz="1800" b="0" i="0" kern="1200">
+                <a:solidFill>
+                  <a:schemeClr val="tx1"/>
+                </a:solidFill>
+                <a:latin typeface="+mj-lt"/>
+                <a:ea typeface="+mj-ea"/>
+                <a:cs typeface="+mj-cs"/>
+              </a:defRPr>
+            </a:lvl2pPr>
+            <a:lvl3pPr marL="1143000" indent="-228600" algn="l" defTabSz="457200" rtl="0" eaLnBrk="1" latinLnBrk="0" hangingPunct="1">
+              <a:spcBef>
+                <a:spcPts val="1000"/>
+              </a:spcBef>
+              <a:spcAft>
+                <a:spcPts val="0"/>
+              </a:spcAft>
+              <a:buClr>
+                <a:schemeClr val="bg2">
+                  <a:lumMod val="40000"/>
+                  <a:lumOff val="60000"/>
+                </a:schemeClr>
+              </a:buClr>
+              <a:buSzPct val="80000"/>
+              <a:buFont typeface="Wingdings 3" charset="2"/>
+              <a:buChar char=""/>
+              <a:defRPr sz="1600" b="0" i="0" kern="1200">
+                <a:solidFill>
+                  <a:schemeClr val="tx1"/>
+                </a:solidFill>
+                <a:latin typeface="+mj-lt"/>
+                <a:ea typeface="+mj-ea"/>
+                <a:cs typeface="+mj-cs"/>
+              </a:defRPr>
+            </a:lvl3pPr>
+            <a:lvl4pPr marL="1600200" indent="-228600" algn="l" defTabSz="457200" rtl="0" eaLnBrk="1" latinLnBrk="0" hangingPunct="1">
+              <a:spcBef>
+                <a:spcPts val="1000"/>
+              </a:spcBef>
+              <a:spcAft>
+                <a:spcPts val="0"/>
+              </a:spcAft>
+              <a:buClr>
+                <a:schemeClr val="bg2">
+                  <a:lumMod val="40000"/>
+                  <a:lumOff val="60000"/>
+                </a:schemeClr>
+              </a:buClr>
+              <a:buSzPct val="80000"/>
+              <a:buFont typeface="Wingdings 3" charset="2"/>
+              <a:buChar char=""/>
+              <a:defRPr sz="1400" b="0" i="0" kern="1200">
+                <a:solidFill>
+                  <a:schemeClr val="tx1"/>
+                </a:solidFill>
+                <a:latin typeface="+mj-lt"/>
+                <a:ea typeface="+mj-ea"/>
+                <a:cs typeface="+mj-cs"/>
+              </a:defRPr>
+            </a:lvl4pPr>
+            <a:lvl5pPr marL="2057400" indent="-228600" algn="l" defTabSz="457200" rtl="0" eaLnBrk="1" latinLnBrk="0" hangingPunct="1">
+              <a:spcBef>
+                <a:spcPts val="1000"/>
+              </a:spcBef>
+              <a:spcAft>
+                <a:spcPts val="0"/>
+              </a:spcAft>
+              <a:buClr>
+                <a:schemeClr val="bg2">
+                  <a:lumMod val="40000"/>
+                  <a:lumOff val="60000"/>
+                </a:schemeClr>
+              </a:buClr>
+              <a:buSzPct val="80000"/>
+              <a:buFont typeface="Wingdings 3" charset="2"/>
+              <a:buChar char=""/>
+              <a:defRPr sz="1400" b="0" i="0" kern="1200">
+                <a:solidFill>
+                  <a:schemeClr val="tx1"/>
+                </a:solidFill>
+                <a:latin typeface="+mj-lt"/>
+                <a:ea typeface="+mj-ea"/>
+                <a:cs typeface="+mj-cs"/>
+              </a:defRPr>
+            </a:lvl5pPr>
+            <a:lvl6pPr marL="2506000" indent="-228600" algn="l" defTabSz="457200" rtl="0" eaLnBrk="1" latinLnBrk="0" hangingPunct="1">
+              <a:spcBef>
+                <a:spcPts val="1000"/>
+              </a:spcBef>
+              <a:spcAft>
+                <a:spcPts val="0"/>
+              </a:spcAft>
+              <a:buClr>
+                <a:schemeClr val="bg2">
+                  <a:lumMod val="40000"/>
+                  <a:lumOff val="60000"/>
+                </a:schemeClr>
+              </a:buClr>
+              <a:buSzPct val="80000"/>
+              <a:buFont typeface="Wingdings 3" charset="2"/>
+              <a:buChar char=""/>
+              <a:defRPr sz="1400" b="0" i="0" kern="1200">
+                <a:solidFill>
+                  <a:schemeClr val="tx1"/>
+                </a:solidFill>
+                <a:latin typeface="+mj-lt"/>
+                <a:ea typeface="+mj-ea"/>
+                <a:cs typeface="+mj-cs"/>
+              </a:defRPr>
+            </a:lvl6pPr>
+            <a:lvl7pPr marL="2971800" indent="-228600" algn="l" defTabSz="457200" rtl="0" eaLnBrk="1" latinLnBrk="0" hangingPunct="1">
+              <a:spcBef>
+                <a:spcPts val="1000"/>
+              </a:spcBef>
+              <a:spcAft>
+                <a:spcPts val="0"/>
+              </a:spcAft>
+              <a:buClr>
+                <a:schemeClr val="bg2">
+                  <a:lumMod val="40000"/>
+                  <a:lumOff val="60000"/>
+                </a:schemeClr>
+              </a:buClr>
+              <a:buSzPct val="80000"/>
+              <a:buFont typeface="Wingdings 3" charset="2"/>
+              <a:buChar char=""/>
+              <a:defRPr sz="1400" b="0" i="0" kern="1200">
+                <a:solidFill>
+                  <a:schemeClr val="tx1"/>
+                </a:solidFill>
+                <a:latin typeface="+mj-lt"/>
+                <a:ea typeface="+mj-ea"/>
+                <a:cs typeface="+mj-cs"/>
+              </a:defRPr>
+            </a:lvl7pPr>
+            <a:lvl8pPr marL="3429000" indent="-228600" algn="l" defTabSz="457200" rtl="0" eaLnBrk="1" latinLnBrk="0" hangingPunct="1">
+              <a:spcBef>
+                <a:spcPts val="1000"/>
+              </a:spcBef>
+              <a:spcAft>
+                <a:spcPts val="0"/>
+              </a:spcAft>
+              <a:buClr>
+                <a:schemeClr val="bg2">
+                  <a:lumMod val="40000"/>
+                  <a:lumOff val="60000"/>
+                </a:schemeClr>
+              </a:buClr>
+              <a:buSzPct val="80000"/>
+              <a:buFont typeface="Wingdings 3" charset="2"/>
+              <a:buChar char=""/>
+              <a:defRPr sz="1400" b="0" i="0" kern="1200">
+                <a:solidFill>
+                  <a:schemeClr val="tx1"/>
+                </a:solidFill>
+                <a:latin typeface="+mj-lt"/>
+                <a:ea typeface="+mj-ea"/>
+                <a:cs typeface="+mj-cs"/>
+              </a:defRPr>
+            </a:lvl8pPr>
+            <a:lvl9pPr marL="3886200" indent="-228600" algn="l" defTabSz="457200" rtl="0" eaLnBrk="1" latinLnBrk="0" hangingPunct="1">
+              <a:spcBef>
+                <a:spcPts val="1000"/>
+              </a:spcBef>
+              <a:spcAft>
+                <a:spcPts val="0"/>
+              </a:spcAft>
+              <a:buClr>
+                <a:schemeClr val="bg2">
+                  <a:lumMod val="40000"/>
+                  <a:lumOff val="60000"/>
+                </a:schemeClr>
+              </a:buClr>
+              <a:buSzPct val="80000"/>
+              <a:buFont typeface="Wingdings 3" charset="2"/>
+              <a:buChar char=""/>
+              <a:defRPr sz="1400" b="0" i="0" kern="1200">
+                <a:solidFill>
+                  <a:schemeClr val="tx1"/>
+                </a:solidFill>
+                <a:latin typeface="+mj-lt"/>
+                <a:ea typeface="+mj-ea"/>
+                <a:cs typeface="+mj-cs"/>
+              </a:defRPr>
+            </a:lvl9pPr>
+          </a:lstStyle>
+          <a:p>
+            <a:pPr marL="0" indent="0">
+              <a:buNone/>
+            </a:pPr>
+            <a:endParaRPr lang="en-GB" dirty="0"/>
+          </a:p>
+        </p:txBody>
+      </p:sp>
+      <p:sp>
+        <p:nvSpPr>
+          <p:cNvPr id="5" name="Rectangle 4"/>
+          <p:cNvSpPr/>
+          <p:nvPr/>
+        </p:nvSpPr>
+        <p:spPr>
+          <a:xfrm>
+            <a:off x="5206314" y="1478387"/>
+            <a:ext cx="6854140" cy="4708981"/>
+          </a:xfrm>
+          <a:prstGeom prst="rect">
+            <a:avLst/>
+          </a:prstGeom>
+        </p:spPr>
+        <p:txBody>
+          <a:bodyPr wrap="square">
+            <a:spAutoFit/>
+          </a:bodyPr>
+          <a:lstStyle/>
+          <a:p>
+            <a:r>
+              <a:rPr lang="en-GB" sz="1000" dirty="0" smtClean="0">
+                <a:latin typeface="Courier New" panose="02070309020205020404" pitchFamily="49" charset="0"/>
+                <a:cs typeface="Courier New" panose="02070309020205020404" pitchFamily="49" charset="0"/>
+              </a:rPr>
+              <a:t># </a:t>
+            </a:r>
+            <a:r>
+              <a:rPr lang="en-GB" sz="1000" dirty="0">
+                <a:latin typeface="Courier New" panose="02070309020205020404" pitchFamily="49" charset="0"/>
+                <a:cs typeface="Courier New" panose="02070309020205020404" pitchFamily="49" charset="0"/>
+              </a:rPr>
+              <a:t>Week6, Program9</a:t>
+            </a:r>
+          </a:p>
+          <a:p>
+            <a:endParaRPr lang="en-GB" sz="1000" dirty="0">
+              <a:latin typeface="Courier New" panose="02070309020205020404" pitchFamily="49" charset="0"/>
+              <a:cs typeface="Courier New" panose="02070309020205020404" pitchFamily="49" charset="0"/>
+            </a:endParaRPr>
+          </a:p>
+          <a:p>
+            <a:r>
+              <a:rPr lang="en-GB" sz="1000" dirty="0">
+                <a:latin typeface="Courier New" panose="02070309020205020404" pitchFamily="49" charset="0"/>
+                <a:cs typeface="Courier New" panose="02070309020205020404" pitchFamily="49" charset="0"/>
+              </a:rPr>
+              <a:t>from PIL import Image, </a:t>
+            </a:r>
+            <a:r>
+              <a:rPr lang="en-GB" sz="1000" dirty="0" err="1">
+                <a:latin typeface="Courier New" panose="02070309020205020404" pitchFamily="49" charset="0"/>
+                <a:cs typeface="Courier New" panose="02070309020205020404" pitchFamily="49" charset="0"/>
+              </a:rPr>
+              <a:t>ImageDraw</a:t>
+            </a:r>
+            <a:endParaRPr lang="en-GB" sz="1000" dirty="0">
+              <a:latin typeface="Courier New" panose="02070309020205020404" pitchFamily="49" charset="0"/>
+              <a:cs typeface="Courier New" panose="02070309020205020404" pitchFamily="49" charset="0"/>
+            </a:endParaRPr>
+          </a:p>
+          <a:p>
+            <a:endParaRPr lang="en-GB" sz="1000" dirty="0">
+              <a:latin typeface="Courier New" panose="02070309020205020404" pitchFamily="49" charset="0"/>
+              <a:cs typeface="Courier New" panose="02070309020205020404" pitchFamily="49" charset="0"/>
+            </a:endParaRPr>
+          </a:p>
+          <a:p>
+            <a:r>
+              <a:rPr lang="en-GB" sz="1000" dirty="0">
+                <a:latin typeface="Courier New" panose="02070309020205020404" pitchFamily="49" charset="0"/>
+                <a:cs typeface="Courier New" panose="02070309020205020404" pitchFamily="49" charset="0"/>
+              </a:rPr>
+              <a:t># Make a new image.</a:t>
+            </a:r>
+          </a:p>
+          <a:p>
+            <a:r>
+              <a:rPr lang="en-GB" sz="1000" dirty="0">
+                <a:latin typeface="Courier New" panose="02070309020205020404" pitchFamily="49" charset="0"/>
+                <a:cs typeface="Courier New" panose="02070309020205020404" pitchFamily="49" charset="0"/>
+              </a:rPr>
+              <a:t># It uses Red/Green/Blue colouring.</a:t>
+            </a:r>
+          </a:p>
+          <a:p>
+            <a:r>
+              <a:rPr lang="en-GB" sz="1000" dirty="0">
+                <a:latin typeface="Courier New" panose="02070309020205020404" pitchFamily="49" charset="0"/>
+                <a:cs typeface="Courier New" panose="02070309020205020404" pitchFamily="49" charset="0"/>
+              </a:rPr>
+              <a:t># It is 5x5 pixels in size.</a:t>
+            </a:r>
+          </a:p>
+          <a:p>
+            <a:r>
+              <a:rPr lang="en-GB" sz="1000" dirty="0">
+                <a:latin typeface="Courier New" panose="02070309020205020404" pitchFamily="49" charset="0"/>
+                <a:cs typeface="Courier New" panose="02070309020205020404" pitchFamily="49" charset="0"/>
+              </a:rPr>
+              <a:t>image = </a:t>
+            </a:r>
+            <a:r>
+              <a:rPr lang="en-GB" sz="1000" dirty="0" err="1">
+                <a:latin typeface="Courier New" panose="02070309020205020404" pitchFamily="49" charset="0"/>
+                <a:cs typeface="Courier New" panose="02070309020205020404" pitchFamily="49" charset="0"/>
+              </a:rPr>
+              <a:t>Image.new</a:t>
+            </a:r>
+            <a:r>
+              <a:rPr lang="en-GB" sz="1000" dirty="0">
+                <a:latin typeface="Courier New" panose="02070309020205020404" pitchFamily="49" charset="0"/>
+                <a:cs typeface="Courier New" panose="02070309020205020404" pitchFamily="49" charset="0"/>
+              </a:rPr>
+              <a:t>("RGB", (5,5))</a:t>
+            </a:r>
+          </a:p>
+          <a:p>
+            <a:endParaRPr lang="en-GB" sz="1000" dirty="0">
+              <a:latin typeface="Courier New" panose="02070309020205020404" pitchFamily="49" charset="0"/>
+              <a:cs typeface="Courier New" panose="02070309020205020404" pitchFamily="49" charset="0"/>
+            </a:endParaRPr>
+          </a:p>
+          <a:p>
+            <a:r>
+              <a:rPr lang="en-GB" sz="1000" dirty="0">
+                <a:latin typeface="Courier New" panose="02070309020205020404" pitchFamily="49" charset="0"/>
+                <a:cs typeface="Courier New" panose="02070309020205020404" pitchFamily="49" charset="0"/>
+              </a:rPr>
+              <a:t># Make a drawing layer</a:t>
+            </a:r>
+          </a:p>
+          <a:p>
+            <a:r>
+              <a:rPr lang="en-GB" sz="1000" dirty="0">
+                <a:latin typeface="Courier New" panose="02070309020205020404" pitchFamily="49" charset="0"/>
+                <a:cs typeface="Courier New" panose="02070309020205020404" pitchFamily="49" charset="0"/>
+              </a:rPr>
+              <a:t>draw = </a:t>
+            </a:r>
+            <a:r>
+              <a:rPr lang="en-GB" sz="1000" dirty="0" err="1">
+                <a:latin typeface="Courier New" panose="02070309020205020404" pitchFamily="49" charset="0"/>
+                <a:cs typeface="Courier New" panose="02070309020205020404" pitchFamily="49" charset="0"/>
+              </a:rPr>
+              <a:t>ImageDraw.Draw</a:t>
+            </a:r>
+            <a:r>
+              <a:rPr lang="en-GB" sz="1000" dirty="0">
+                <a:latin typeface="Courier New" panose="02070309020205020404" pitchFamily="49" charset="0"/>
+                <a:cs typeface="Courier New" panose="02070309020205020404" pitchFamily="49" charset="0"/>
+              </a:rPr>
+              <a:t>(image)</a:t>
+            </a:r>
+          </a:p>
+          <a:p>
+            <a:endParaRPr lang="en-GB" sz="1000" dirty="0">
+              <a:latin typeface="Courier New" panose="02070309020205020404" pitchFamily="49" charset="0"/>
+              <a:cs typeface="Courier New" panose="02070309020205020404" pitchFamily="49" charset="0"/>
+            </a:endParaRPr>
+          </a:p>
+          <a:p>
+            <a:r>
+              <a:rPr lang="en-GB" sz="1000" dirty="0">
+                <a:latin typeface="Courier New" panose="02070309020205020404" pitchFamily="49" charset="0"/>
+                <a:cs typeface="Courier New" panose="02070309020205020404" pitchFamily="49" charset="0"/>
+              </a:rPr>
+              <a:t># Draw the red pixels with the list of pairs of </a:t>
+            </a:r>
+            <a:r>
+              <a:rPr lang="en-GB" sz="1000" dirty="0" err="1">
+                <a:latin typeface="Courier New" panose="02070309020205020404" pitchFamily="49" charset="0"/>
+                <a:cs typeface="Courier New" panose="02070309020205020404" pitchFamily="49" charset="0"/>
+              </a:rPr>
+              <a:t>x,y</a:t>
+            </a:r>
+            <a:r>
+              <a:rPr lang="en-GB" sz="1000" dirty="0">
+                <a:latin typeface="Courier New" panose="02070309020205020404" pitchFamily="49" charset="0"/>
+                <a:cs typeface="Courier New" panose="02070309020205020404" pitchFamily="49" charset="0"/>
+              </a:rPr>
+              <a:t> locations</a:t>
+            </a:r>
+          </a:p>
+          <a:p>
+            <a:r>
+              <a:rPr lang="en-GB" sz="1000" dirty="0" err="1">
+                <a:latin typeface="Courier New" panose="02070309020205020404" pitchFamily="49" charset="0"/>
+                <a:cs typeface="Courier New" panose="02070309020205020404" pitchFamily="49" charset="0"/>
+              </a:rPr>
+              <a:t>draw.point</a:t>
+            </a:r>
+            <a:r>
+              <a:rPr lang="en-GB" sz="1000" dirty="0">
+                <a:latin typeface="Courier New" panose="02070309020205020404" pitchFamily="49" charset="0"/>
+                <a:cs typeface="Courier New" panose="02070309020205020404" pitchFamily="49" charset="0"/>
+              </a:rPr>
+              <a:t>([(0,0), (1,0), (2,0), (3,0)], fill=(255,0,0))</a:t>
+            </a:r>
+          </a:p>
+          <a:p>
+            <a:r>
+              <a:rPr lang="en-GB" sz="1000" dirty="0" err="1">
+                <a:latin typeface="Courier New" panose="02070309020205020404" pitchFamily="49" charset="0"/>
+                <a:cs typeface="Courier New" panose="02070309020205020404" pitchFamily="49" charset="0"/>
+              </a:rPr>
+              <a:t>draw.point</a:t>
+            </a:r>
+            <a:r>
+              <a:rPr lang="en-GB" sz="1000" dirty="0">
+                <a:latin typeface="Courier New" panose="02070309020205020404" pitchFamily="49" charset="0"/>
+                <a:cs typeface="Courier New" panose="02070309020205020404" pitchFamily="49" charset="0"/>
+              </a:rPr>
+              <a:t>([(4,0), (4,1), (4,2), (4,3)], fill=(255,0,0))</a:t>
+            </a:r>
+          </a:p>
+          <a:p>
+            <a:endParaRPr lang="en-GB" sz="1000" dirty="0">
+              <a:latin typeface="Courier New" panose="02070309020205020404" pitchFamily="49" charset="0"/>
+              <a:cs typeface="Courier New" panose="02070309020205020404" pitchFamily="49" charset="0"/>
+            </a:endParaRPr>
+          </a:p>
+          <a:p>
+            <a:r>
+              <a:rPr lang="en-GB" sz="1000" dirty="0">
+                <a:latin typeface="Courier New" panose="02070309020205020404" pitchFamily="49" charset="0"/>
+                <a:cs typeface="Courier New" panose="02070309020205020404" pitchFamily="49" charset="0"/>
+              </a:rPr>
+              <a:t># Draw the green pixels</a:t>
+            </a:r>
+          </a:p>
+          <a:p>
+            <a:r>
+              <a:rPr lang="en-GB" sz="1000" dirty="0" err="1">
+                <a:latin typeface="Courier New" panose="02070309020205020404" pitchFamily="49" charset="0"/>
+                <a:cs typeface="Courier New" panose="02070309020205020404" pitchFamily="49" charset="0"/>
+              </a:rPr>
+              <a:t>draw.point</a:t>
+            </a:r>
+            <a:r>
+              <a:rPr lang="en-GB" sz="1000" dirty="0">
+                <a:latin typeface="Courier New" panose="02070309020205020404" pitchFamily="49" charset="0"/>
+                <a:cs typeface="Courier New" panose="02070309020205020404" pitchFamily="49" charset="0"/>
+              </a:rPr>
+              <a:t>([(1,1), (1,2), (1,3)], fill=(0,255,0))</a:t>
+            </a:r>
+          </a:p>
+          <a:p>
+            <a:r>
+              <a:rPr lang="en-GB" sz="1000" dirty="0" err="1">
+                <a:latin typeface="Courier New" panose="02070309020205020404" pitchFamily="49" charset="0"/>
+                <a:cs typeface="Courier New" panose="02070309020205020404" pitchFamily="49" charset="0"/>
+              </a:rPr>
+              <a:t>draw.point</a:t>
+            </a:r>
+            <a:r>
+              <a:rPr lang="en-GB" sz="1000" dirty="0">
+                <a:latin typeface="Courier New" panose="02070309020205020404" pitchFamily="49" charset="0"/>
+                <a:cs typeface="Courier New" panose="02070309020205020404" pitchFamily="49" charset="0"/>
+              </a:rPr>
+              <a:t>([(2,1), (2,2), (2,3)], fill=(0,255,0))</a:t>
+            </a:r>
+          </a:p>
+          <a:p>
+            <a:r>
+              <a:rPr lang="en-GB" sz="1000" dirty="0" err="1">
+                <a:latin typeface="Courier New" panose="02070309020205020404" pitchFamily="49" charset="0"/>
+                <a:cs typeface="Courier New" panose="02070309020205020404" pitchFamily="49" charset="0"/>
+              </a:rPr>
+              <a:t>draw.point</a:t>
+            </a:r>
+            <a:r>
+              <a:rPr lang="en-GB" sz="1000" dirty="0">
+                <a:latin typeface="Courier New" panose="02070309020205020404" pitchFamily="49" charset="0"/>
+                <a:cs typeface="Courier New" panose="02070309020205020404" pitchFamily="49" charset="0"/>
+              </a:rPr>
+              <a:t>([(3,1), (3,2), (3,3)], fill=(0,255,0))</a:t>
+            </a:r>
+          </a:p>
+          <a:p>
+            <a:endParaRPr lang="en-GB" sz="1000" dirty="0">
+              <a:latin typeface="Courier New" panose="02070309020205020404" pitchFamily="49" charset="0"/>
+              <a:cs typeface="Courier New" panose="02070309020205020404" pitchFamily="49" charset="0"/>
+            </a:endParaRPr>
+          </a:p>
+          <a:p>
+            <a:r>
+              <a:rPr lang="en-GB" sz="1000" dirty="0">
+                <a:latin typeface="Courier New" panose="02070309020205020404" pitchFamily="49" charset="0"/>
+                <a:cs typeface="Courier New" panose="02070309020205020404" pitchFamily="49" charset="0"/>
+              </a:rPr>
+              <a:t># Draw the blue pixels</a:t>
+            </a:r>
+          </a:p>
+          <a:p>
+            <a:r>
+              <a:rPr lang="en-GB" sz="1000" dirty="0" err="1">
+                <a:latin typeface="Courier New" panose="02070309020205020404" pitchFamily="49" charset="0"/>
+                <a:cs typeface="Courier New" panose="02070309020205020404" pitchFamily="49" charset="0"/>
+              </a:rPr>
+              <a:t>draw.point</a:t>
+            </a:r>
+            <a:r>
+              <a:rPr lang="en-GB" sz="1000" dirty="0">
+                <a:latin typeface="Courier New" panose="02070309020205020404" pitchFamily="49" charset="0"/>
+                <a:cs typeface="Courier New" panose="02070309020205020404" pitchFamily="49" charset="0"/>
+              </a:rPr>
+              <a:t>([(0,1), (0,2), (0,3), (0,4)], fill=(0,0,255))</a:t>
+            </a:r>
+          </a:p>
+          <a:p>
+            <a:r>
+              <a:rPr lang="en-GB" sz="1000" dirty="0" err="1">
+                <a:latin typeface="Courier New" panose="02070309020205020404" pitchFamily="49" charset="0"/>
+                <a:cs typeface="Courier New" panose="02070309020205020404" pitchFamily="49" charset="0"/>
+              </a:rPr>
+              <a:t>draw.point</a:t>
+            </a:r>
+            <a:r>
+              <a:rPr lang="en-GB" sz="1000" dirty="0">
+                <a:latin typeface="Courier New" panose="02070309020205020404" pitchFamily="49" charset="0"/>
+                <a:cs typeface="Courier New" panose="02070309020205020404" pitchFamily="49" charset="0"/>
+              </a:rPr>
+              <a:t>([(1,4), (2,4), (3,4), (4,4)], fill=(0,0,255))</a:t>
+            </a:r>
+          </a:p>
+          <a:p>
+            <a:endParaRPr lang="en-GB" sz="1000" dirty="0">
+              <a:latin typeface="Courier New" panose="02070309020205020404" pitchFamily="49" charset="0"/>
+              <a:cs typeface="Courier New" panose="02070309020205020404" pitchFamily="49" charset="0"/>
+            </a:endParaRPr>
+          </a:p>
+          <a:p>
+            <a:r>
+              <a:rPr lang="en-GB" sz="1000" dirty="0">
+                <a:latin typeface="Courier New" panose="02070309020205020404" pitchFamily="49" charset="0"/>
+                <a:cs typeface="Courier New" panose="02070309020205020404" pitchFamily="49" charset="0"/>
+              </a:rPr>
+              <a:t># Scale the image to be 500x500 pixels instead of 5x5.</a:t>
+            </a:r>
+          </a:p>
+          <a:p>
+            <a:r>
+              <a:rPr lang="en-GB" sz="1000" dirty="0">
+                <a:latin typeface="Courier New" panose="02070309020205020404" pitchFamily="49" charset="0"/>
+                <a:cs typeface="Courier New" panose="02070309020205020404" pitchFamily="49" charset="0"/>
+              </a:rPr>
+              <a:t># as otherwise it will be too small to see.</a:t>
+            </a:r>
+          </a:p>
+          <a:p>
+            <a:r>
+              <a:rPr lang="en-GB" sz="1000" dirty="0" err="1">
+                <a:latin typeface="Courier New" panose="02070309020205020404" pitchFamily="49" charset="0"/>
+                <a:cs typeface="Courier New" panose="02070309020205020404" pitchFamily="49" charset="0"/>
+              </a:rPr>
+              <a:t>scaled_image</a:t>
+            </a:r>
+            <a:r>
+              <a:rPr lang="en-GB" sz="1000" dirty="0">
+                <a:latin typeface="Courier New" panose="02070309020205020404" pitchFamily="49" charset="0"/>
+                <a:cs typeface="Courier New" panose="02070309020205020404" pitchFamily="49" charset="0"/>
+              </a:rPr>
+              <a:t> = </a:t>
+            </a:r>
+            <a:r>
+              <a:rPr lang="en-GB" sz="1000" dirty="0" err="1">
+                <a:latin typeface="Courier New" panose="02070309020205020404" pitchFamily="49" charset="0"/>
+                <a:cs typeface="Courier New" panose="02070309020205020404" pitchFamily="49" charset="0"/>
+              </a:rPr>
+              <a:t>image.resize</a:t>
+            </a:r>
+            <a:r>
+              <a:rPr lang="en-GB" sz="1000" dirty="0">
+                <a:latin typeface="Courier New" panose="02070309020205020404" pitchFamily="49" charset="0"/>
+                <a:cs typeface="Courier New" panose="02070309020205020404" pitchFamily="49" charset="0"/>
+              </a:rPr>
+              <a:t>((500,500))</a:t>
+            </a:r>
+          </a:p>
+          <a:p>
+            <a:r>
+              <a:rPr lang="en-GB" sz="1000" dirty="0" err="1">
+                <a:latin typeface="Courier New" panose="02070309020205020404" pitchFamily="49" charset="0"/>
+                <a:cs typeface="Courier New" panose="02070309020205020404" pitchFamily="49" charset="0"/>
+              </a:rPr>
+              <a:t>scaled_image.show</a:t>
+            </a:r>
+            <a:r>
+              <a:rPr lang="en-GB" sz="1000" dirty="0">
+                <a:latin typeface="Courier New" panose="02070309020205020404" pitchFamily="49" charset="0"/>
+                <a:cs typeface="Courier New" panose="02070309020205020404" pitchFamily="49" charset="0"/>
+              </a:rPr>
+              <a:t>()</a:t>
+            </a:r>
+          </a:p>
+          <a:p>
+            <a:endParaRPr lang="en-GB" sz="1000" dirty="0">
+              <a:latin typeface="Courier New" panose="02070309020205020404" pitchFamily="49" charset="0"/>
+              <a:cs typeface="Courier New" panose="02070309020205020404" pitchFamily="49" charset="0"/>
+            </a:endParaRPr>
+          </a:p>
+        </p:txBody>
+      </p:sp>
+    </p:spTree>
+    <p:extLst>
+      <p:ext uri="{BB962C8B-B14F-4D97-AF65-F5344CB8AC3E}">
+        <p14:creationId xmlns:p14="http://schemas.microsoft.com/office/powerpoint/2010/main" val="1362103939"/>
+      </p:ext>
+    </p:extLst>
+  </p:cSld>
+  <p:clrMapOvr>
+    <a:masterClrMapping/>
+  </p:clrMapOvr>
+</p:sld>
+</file>
+
+<file path=ppt/slides/slide22.xml><?xml version="1.0" encoding="utf-8"?>
+<p:sld xmlns:a="http://schemas.openxmlformats.org/drawingml/2006/main" xmlns:r="http://schemas.openxmlformats.org/officeDocument/2006/relationships" xmlns:p="http://schemas.openxmlformats.org/presentationml/2006/main">
+  <p:cSld>
+    <p:spTree>
+      <p:nvGrpSpPr>
+        <p:cNvPr id="1" name=""/>
+        <p:cNvGrpSpPr/>
+        <p:nvPr/>
+      </p:nvGrpSpPr>
+      <p:grpSpPr>
+        <a:xfrm>
+          <a:off x="0" y="0"/>
+          <a:ext cx="0" cy="0"/>
+          <a:chOff x="0" y="0"/>
+          <a:chExt cx="0" cy="0"/>
+        </a:xfrm>
+      </p:grpSpPr>
+      <p:sp>
+        <p:nvSpPr>
+          <p:cNvPr id="2" name="Title 1"/>
+          <p:cNvSpPr>
+            <a:spLocks noGrp="1"/>
+          </p:cNvSpPr>
+          <p:nvPr>
+            <p:ph type="title"/>
+          </p:nvPr>
+        </p:nvSpPr>
+        <p:spPr/>
+        <p:txBody>
+          <a:bodyPr/>
+          <a:lstStyle/>
+          <a:p>
+            <a:r>
+              <a:rPr lang="en-GB" dirty="0" smtClean="0"/>
+              <a:t>Homework 1</a:t>
+            </a:r>
+            <a:endParaRPr lang="en-GB" dirty="0"/>
+          </a:p>
+        </p:txBody>
+      </p:sp>
+      <p:sp>
+        <p:nvSpPr>
+          <p:cNvPr id="3" name="Content Placeholder 2"/>
+          <p:cNvSpPr>
+            <a:spLocks noGrp="1"/>
+          </p:cNvSpPr>
+          <p:nvPr>
+            <p:ph idx="1"/>
+          </p:nvPr>
+        </p:nvSpPr>
+        <p:spPr>
+          <a:xfrm>
+            <a:off x="1103312" y="2052918"/>
+            <a:ext cx="5289249" cy="4195481"/>
+          </a:xfrm>
+        </p:spPr>
+        <p:txBody>
+          <a:bodyPr/>
+          <a:lstStyle/>
+          <a:p>
+            <a:r>
+              <a:rPr lang="en-GB" dirty="0" smtClean="0"/>
+              <a:t>On a 500 x 500 pixel canvas.</a:t>
+            </a:r>
+          </a:p>
+          <a:p>
+            <a:r>
+              <a:rPr lang="en-GB" dirty="0" smtClean="0"/>
+              <a:t>Create this "play" button.</a:t>
+            </a:r>
+            <a:endParaRPr lang="en-GB" dirty="0"/>
+          </a:p>
+        </p:txBody>
+      </p:sp>
+      <p:pic>
+        <p:nvPicPr>
+          <p:cNvPr id="4" name="Picture 3"/>
+          <p:cNvPicPr>
+            <a:picLocks noChangeAspect="1"/>
+          </p:cNvPicPr>
+          <p:nvPr/>
+        </p:nvPicPr>
+        <p:blipFill>
+          <a:blip r:embed="rId2"/>
+          <a:stretch>
+            <a:fillRect/>
+          </a:stretch>
+        </p:blipFill>
+        <p:spPr>
+          <a:xfrm>
+            <a:off x="6722719" y="1704974"/>
+            <a:ext cx="4562475" cy="4543425"/>
+          </a:xfrm>
+          <a:prstGeom prst="rect">
+            <a:avLst/>
+          </a:prstGeom>
+        </p:spPr>
+      </p:pic>
+    </p:spTree>
+    <p:extLst>
+      <p:ext uri="{BB962C8B-B14F-4D97-AF65-F5344CB8AC3E}">
+        <p14:creationId xmlns:p14="http://schemas.microsoft.com/office/powerpoint/2010/main" val="1189853217"/>
+      </p:ext>
+    </p:extLst>
+  </p:cSld>
+  <p:clrMapOvr>
+    <a:masterClrMapping/>
+  </p:clrMapOvr>
+</p:sld>
+</file>
+
+<file path=ppt/slides/slide23.xml><?xml version="1.0" encoding="utf-8"?>
+<p:sld xmlns:a="http://schemas.openxmlformats.org/drawingml/2006/main" xmlns:r="http://schemas.openxmlformats.org/officeDocument/2006/relationships" xmlns:p="http://schemas.openxmlformats.org/presentationml/2006/main">
+  <p:cSld>
+    <p:spTree>
+      <p:nvGrpSpPr>
+        <p:cNvPr id="1" name=""/>
+        <p:cNvGrpSpPr/>
+        <p:nvPr/>
+      </p:nvGrpSpPr>
+      <p:grpSpPr>
+        <a:xfrm>
+          <a:off x="0" y="0"/>
+          <a:ext cx="0" cy="0"/>
+          <a:chOff x="0" y="0"/>
+          <a:chExt cx="0" cy="0"/>
+        </a:xfrm>
+      </p:grpSpPr>
+      <p:sp>
+        <p:nvSpPr>
+          <p:cNvPr id="2" name="Title 1"/>
+          <p:cNvSpPr>
+            <a:spLocks noGrp="1"/>
+          </p:cNvSpPr>
+          <p:nvPr>
+            <p:ph type="title"/>
+          </p:nvPr>
+        </p:nvSpPr>
+        <p:spPr/>
+        <p:txBody>
+          <a:bodyPr/>
+          <a:lstStyle/>
+          <a:p>
+            <a:r>
+              <a:rPr lang="en-GB" dirty="0" smtClean="0"/>
+              <a:t>Homework 2</a:t>
+            </a:r>
+            <a:endParaRPr lang="en-GB" dirty="0"/>
+          </a:p>
+        </p:txBody>
+      </p:sp>
+      <p:sp>
+        <p:nvSpPr>
+          <p:cNvPr id="3" name="Content Placeholder 2"/>
+          <p:cNvSpPr>
+            <a:spLocks noGrp="1"/>
+          </p:cNvSpPr>
+          <p:nvPr>
+            <p:ph idx="1"/>
+          </p:nvPr>
+        </p:nvSpPr>
+        <p:spPr>
+          <a:xfrm>
+            <a:off x="1103312" y="2052918"/>
+            <a:ext cx="8559672" cy="4195481"/>
+          </a:xfrm>
+        </p:spPr>
+        <p:txBody>
+          <a:bodyPr/>
+          <a:lstStyle/>
+          <a:p>
+            <a:r>
+              <a:rPr lang="en-GB" dirty="0" smtClean="0"/>
+              <a:t>Watch this </a:t>
+            </a:r>
+            <a:r>
+              <a:rPr lang="en-GB" dirty="0" err="1" smtClean="0"/>
+              <a:t>youtube</a:t>
+            </a:r>
+            <a:r>
+              <a:rPr lang="en-GB" dirty="0" smtClean="0"/>
+              <a:t> video.</a:t>
+            </a:r>
+          </a:p>
+          <a:p>
+            <a:r>
+              <a:rPr lang="en-GB" dirty="0">
+                <a:hlinkClick r:id="rId2"/>
+              </a:rPr>
+              <a:t>https://</a:t>
+            </a:r>
+            <a:r>
+              <a:rPr lang="en-GB" dirty="0" smtClean="0">
+                <a:hlinkClick r:id="rId2"/>
+              </a:rPr>
+              <a:t>www.youtube.com/watch?v=IGlGvSXkRGI</a:t>
+            </a:r>
+            <a:endParaRPr lang="en-GB" dirty="0" smtClean="0"/>
+          </a:p>
+          <a:p>
+            <a:endParaRPr lang="en-GB" dirty="0"/>
+          </a:p>
+          <a:p>
+            <a:r>
+              <a:rPr lang="en-GB" dirty="0" smtClean="0"/>
+              <a:t>Create a program which implements the first image in the video.</a:t>
+            </a:r>
+          </a:p>
+          <a:p>
+            <a:pPr lvl="1"/>
+            <a:r>
+              <a:rPr lang="en-GB" dirty="0" smtClean="0"/>
+              <a:t>(The one with the triangle)</a:t>
+            </a:r>
+          </a:p>
+        </p:txBody>
+      </p:sp>
+    </p:spTree>
+    <p:extLst>
+      <p:ext uri="{BB962C8B-B14F-4D97-AF65-F5344CB8AC3E}">
+        <p14:creationId xmlns:p14="http://schemas.microsoft.com/office/powerpoint/2010/main" val="3439768075"/>
+      </p:ext>
+    </p:extLst>
+  </p:cSld>
+  <p:clrMapOvr>
+    <a:masterClrMapping/>
+  </p:clrMapOvr>
+</p:sld>
+</file>
+
+<file path=ppt/slides/slide24.xml><?xml version="1.0" encoding="utf-8"?>
+<p:sld xmlns:a="http://schemas.openxmlformats.org/drawingml/2006/main" xmlns:r="http://schemas.openxmlformats.org/officeDocument/2006/relationships" xmlns:p="http://schemas.openxmlformats.org/presentationml/2006/main">
+  <p:cSld>
+    <p:spTree>
+      <p:nvGrpSpPr>
+        <p:cNvPr id="1" name=""/>
+        <p:cNvGrpSpPr/>
+        <p:nvPr/>
+      </p:nvGrpSpPr>
+      <p:grpSpPr>
+        <a:xfrm>
+          <a:off x="0" y="0"/>
+          <a:ext cx="0" cy="0"/>
+          <a:chOff x="0" y="0"/>
+          <a:chExt cx="0" cy="0"/>
+        </a:xfrm>
+      </p:grpSpPr>
+      <p:sp>
+        <p:nvSpPr>
+          <p:cNvPr id="2" name="Title 1"/>
+          <p:cNvSpPr>
+            <a:spLocks noGrp="1"/>
+          </p:cNvSpPr>
+          <p:nvPr>
+            <p:ph type="title"/>
+          </p:nvPr>
+        </p:nvSpPr>
+        <p:spPr/>
+        <p:txBody>
+          <a:bodyPr/>
+          <a:lstStyle/>
+          <a:p>
+            <a:r>
+              <a:rPr lang="en-GB" dirty="0" smtClean="0"/>
+              <a:t>Homework 3</a:t>
+            </a:r>
+            <a:endParaRPr lang="en-GB" dirty="0"/>
+          </a:p>
+        </p:txBody>
+      </p:sp>
+      <p:sp>
+        <p:nvSpPr>
+          <p:cNvPr id="3" name="Content Placeholder 2"/>
+          <p:cNvSpPr>
+            <a:spLocks noGrp="1"/>
+          </p:cNvSpPr>
+          <p:nvPr>
+            <p:ph idx="1"/>
+          </p:nvPr>
+        </p:nvSpPr>
+        <p:spPr>
+          <a:xfrm>
+            <a:off x="1103312" y="2052918"/>
+            <a:ext cx="8559672" cy="4195481"/>
+          </a:xfrm>
+        </p:spPr>
+        <p:txBody>
+          <a:bodyPr/>
+          <a:lstStyle/>
+          <a:p>
+            <a:r>
+              <a:rPr lang="en-GB" dirty="0" smtClean="0"/>
+              <a:t>Using Homework2 as a base.</a:t>
+            </a:r>
+          </a:p>
+          <a:p>
+            <a:endParaRPr lang="en-GB" dirty="0"/>
+          </a:p>
+          <a:p>
+            <a:r>
+              <a:rPr lang="en-GB" dirty="0" smtClean="0"/>
+              <a:t>Draw 10,000 "dots".</a:t>
+            </a:r>
+          </a:p>
+          <a:p>
+            <a:r>
+              <a:rPr lang="en-GB" dirty="0" smtClean="0"/>
+              <a:t>Every 500 dots, write a file called imageX.png, where X is the number of dots drawn so far.</a:t>
+            </a:r>
+          </a:p>
+          <a:p>
+            <a:endParaRPr lang="en-GB" dirty="0"/>
+          </a:p>
+          <a:p>
+            <a:r>
+              <a:rPr lang="en-GB" dirty="0" smtClean="0"/>
+              <a:t>Look at the images you have produced to see the pattern developing.</a:t>
+            </a:r>
+          </a:p>
+        </p:txBody>
+      </p:sp>
+    </p:spTree>
+    <p:extLst>
+      <p:ext uri="{BB962C8B-B14F-4D97-AF65-F5344CB8AC3E}">
+        <p14:creationId xmlns:p14="http://schemas.microsoft.com/office/powerpoint/2010/main" val="2639864594"/>
       </p:ext>
     </p:extLst>
   </p:cSld>

</xml_diff>

<commit_message>
Noted homework2 (week6) is hard.
</commit_message>
<xml_diff>
--- a/week6/week6.pptx
+++ b/week6/week6.pptx
@@ -14414,8 +14414,27 @@
             <a:pPr lvl="1"/>
             <a:r>
               <a:rPr lang="en-GB" dirty="0" smtClean="0"/>
-              <a:t>(The one with the triangle)</a:t>
-            </a:r>
+              <a:t>(The one with the triangle</a:t>
+            </a:r>
+            <a:r>
+              <a:rPr lang="en-GB" dirty="0" smtClean="0"/>
+              <a:t>).</a:t>
+            </a:r>
+          </a:p>
+          <a:p>
+            <a:pPr lvl="1"/>
+            <a:endParaRPr lang="en-GB" dirty="0"/>
+          </a:p>
+          <a:p>
+            <a:r>
+              <a:rPr lang="en-GB" dirty="0" smtClean="0"/>
+              <a:t>This is significantly harder than earlier homework assignments, so do your best but don't be afraid to ask </a:t>
+            </a:r>
+            <a:r>
+              <a:rPr lang="en-GB" smtClean="0"/>
+              <a:t>for help !</a:t>
+            </a:r>
+            <a:endParaRPr lang="en-GB" dirty="0" smtClean="0"/>
           </a:p>
         </p:txBody>
       </p:sp>

</xml_diff>